<commit_message>
merged input from Pierre
</commit_message>
<xml_diff>
--- a/120/NMOP/draft-netana-nmop-network-anomaly-architecture-semantics-lifecycle.pptx
+++ b/120/NMOP/draft-netana-nmop-network-anomaly-architecture-semantics-lifecycle.pptx
@@ -131,7 +131,7 @@
 <file path=ppt/revisionInfo.xml><?xml version="1.0" encoding="utf-8"?>
 <p1510:revInfo xmlns:a="http://schemas.openxmlformats.org/drawingml/2006/main" xmlns:r="http://schemas.openxmlformats.org/officeDocument/2006/relationships" xmlns:p1510="http://schemas.microsoft.com/office/powerpoint/2015/10/main">
   <p1510:revLst>
-    <p1510:client id="{D5F81756-EA00-4B65-9234-A0FB2F3D032D}" v="8" dt="2024-07-13T15:47:32.435"/>
+    <p1510:client id="{D5F81756-EA00-4B65-9234-A0FB2F3D032D}" v="10" dt="2024-07-16T10:25:21.879"/>
   </p1510:revLst>
 </p1510:revInfo>
 </file>
@@ -141,7 +141,7 @@
   <pc:docChgLst>
     <pc:chgData name="Graf Thomas, INI-NET-VNC-HCS" userId="487bc3e3-9ce7-4cdd-b7b4-8899ea88d289" providerId="ADAL" clId="{D5F81756-EA00-4B65-9234-A0FB2F3D032D}"/>
     <pc:docChg chg="undo custSel addSld delSld modSld sldOrd delMainMaster">
-      <pc:chgData name="Graf Thomas, INI-NET-VNC-HCS" userId="487bc3e3-9ce7-4cdd-b7b4-8899ea88d289" providerId="ADAL" clId="{D5F81756-EA00-4B65-9234-A0FB2F3D032D}" dt="2024-07-13T16:11:15.469" v="599" actId="20577"/>
+      <pc:chgData name="Graf Thomas, INI-NET-VNC-HCS" userId="487bc3e3-9ce7-4cdd-b7b4-8899ea88d289" providerId="ADAL" clId="{D5F81756-EA00-4B65-9234-A0FB2F3D032D}" dt="2024-07-16T10:26:57.315" v="612" actId="20577"/>
       <pc:docMkLst>
         <pc:docMk/>
       </pc:docMkLst>
@@ -169,13 +169,21 @@
         </pc:spChg>
       </pc:sldChg>
       <pc:sldChg chg="modSp mod">
-        <pc:chgData name="Graf Thomas, INI-NET-VNC-HCS" userId="487bc3e3-9ce7-4cdd-b7b4-8899ea88d289" providerId="ADAL" clId="{D5F81756-EA00-4B65-9234-A0FB2F3D032D}" dt="2024-07-13T16:11:15.469" v="599" actId="20577"/>
+        <pc:chgData name="Graf Thomas, INI-NET-VNC-HCS" userId="487bc3e3-9ce7-4cdd-b7b4-8899ea88d289" providerId="ADAL" clId="{D5F81756-EA00-4B65-9234-A0FB2F3D032D}" dt="2024-07-16T10:25:23.840" v="610"/>
         <pc:sldMkLst>
           <pc:docMk/>
           <pc:sldMk cId="3578665336" sldId="1041"/>
         </pc:sldMkLst>
         <pc:spChg chg="mod">
-          <ac:chgData name="Graf Thomas, INI-NET-VNC-HCS" userId="487bc3e3-9ce7-4cdd-b7b4-8899ea88d289" providerId="ADAL" clId="{D5F81756-EA00-4B65-9234-A0FB2F3D032D}" dt="2024-07-13T16:11:15.469" v="599" actId="20577"/>
+          <ac:chgData name="Graf Thomas, INI-NET-VNC-HCS" userId="487bc3e3-9ce7-4cdd-b7b4-8899ea88d289" providerId="ADAL" clId="{D5F81756-EA00-4B65-9234-A0FB2F3D032D}" dt="2024-07-16T10:23:59.543" v="602" actId="20577"/>
+          <ac:spMkLst>
+            <pc:docMk/>
+            <pc:sldMk cId="3578665336" sldId="1041"/>
+            <ac:spMk id="5" creationId="{C26208B2-0D10-4C23-B2DE-372A62E98644}"/>
+          </ac:spMkLst>
+        </pc:spChg>
+        <pc:spChg chg="mod">
+          <ac:chgData name="Graf Thomas, INI-NET-VNC-HCS" userId="487bc3e3-9ce7-4cdd-b7b4-8899ea88d289" providerId="ADAL" clId="{D5F81756-EA00-4B65-9234-A0FB2F3D032D}" dt="2024-07-16T10:25:23.840" v="610"/>
           <ac:spMkLst>
             <pc:docMk/>
             <pc:sldMk cId="3578665336" sldId="1041"/>
@@ -198,6 +206,21 @@
           </ac:spMkLst>
         </pc:spChg>
       </pc:sldChg>
+      <pc:sldChg chg="modSp mod">
+        <pc:chgData name="Graf Thomas, INI-NET-VNC-HCS" userId="487bc3e3-9ce7-4cdd-b7b4-8899ea88d289" providerId="ADAL" clId="{D5F81756-EA00-4B65-9234-A0FB2F3D032D}" dt="2024-07-16T10:26:57.315" v="612" actId="20577"/>
+        <pc:sldMkLst>
+          <pc:docMk/>
+          <pc:sldMk cId="85069519" sldId="2145706259"/>
+        </pc:sldMkLst>
+        <pc:spChg chg="mod">
+          <ac:chgData name="Graf Thomas, INI-NET-VNC-HCS" userId="487bc3e3-9ce7-4cdd-b7b4-8899ea88d289" providerId="ADAL" clId="{D5F81756-EA00-4B65-9234-A0FB2F3D032D}" dt="2024-07-16T10:26:57.315" v="612" actId="20577"/>
+          <ac:spMkLst>
+            <pc:docMk/>
+            <pc:sldMk cId="85069519" sldId="2145706259"/>
+            <ac:spMk id="13" creationId="{509802C0-BFFB-9B0F-A529-E60CDD518439}"/>
+          </ac:spMkLst>
+        </pc:spChg>
+      </pc:sldChg>
       <pc:sldChg chg="modSp del mod">
         <pc:chgData name="Graf Thomas, INI-NET-VNC-HCS" userId="487bc3e3-9ce7-4cdd-b7b4-8899ea88d289" providerId="ADAL" clId="{D5F81756-EA00-4B65-9234-A0FB2F3D032D}" dt="2024-07-13T15:49:07.497" v="91" actId="47"/>
         <pc:sldMkLst>
@@ -214,7 +237,7 @@
         </pc:spChg>
       </pc:sldChg>
       <pc:sldChg chg="addSp delSp modSp add mod ord">
-        <pc:chgData name="Graf Thomas, INI-NET-VNC-HCS" userId="487bc3e3-9ce7-4cdd-b7b4-8899ea88d289" providerId="ADAL" clId="{D5F81756-EA00-4B65-9234-A0FB2F3D032D}" dt="2024-07-13T16:10:57.757" v="597" actId="20577"/>
+        <pc:chgData name="Graf Thomas, INI-NET-VNC-HCS" userId="487bc3e3-9ce7-4cdd-b7b4-8899ea88d289" providerId="ADAL" clId="{D5F81756-EA00-4B65-9234-A0FB2F3D032D}" dt="2024-07-13T16:18:17.736" v="601" actId="20577"/>
         <pc:sldMkLst>
           <pc:docMk/>
           <pc:sldMk cId="492372888" sldId="2145706282"/>
@@ -316,7 +339,7 @@
           </ac:spMkLst>
         </pc:spChg>
         <pc:spChg chg="add mod">
-          <ac:chgData name="Graf Thomas, INI-NET-VNC-HCS" userId="487bc3e3-9ce7-4cdd-b7b4-8899ea88d289" providerId="ADAL" clId="{D5F81756-EA00-4B65-9234-A0FB2F3D032D}" dt="2024-07-13T16:09:32.658" v="589" actId="20577"/>
+          <ac:chgData name="Graf Thomas, INI-NET-VNC-HCS" userId="487bc3e3-9ce7-4cdd-b7b4-8899ea88d289" providerId="ADAL" clId="{D5F81756-EA00-4B65-9234-A0FB2F3D032D}" dt="2024-07-13T16:18:17.736" v="601" actId="20577"/>
           <ac:spMkLst>
             <pc:docMk/>
             <pc:sldMk cId="492372888" sldId="2145706282"/>
@@ -1405,7 +1428,7 @@
           <a:p>
             <a:fld id="{E5E705E9-673F-4AC4-B29E-A7B26F3B8523}" type="datetimeFigureOut">
               <a:rPr lang="de-CH" smtClean="0"/>
-              <a:t>13.07.2024</a:t>
+              <a:t>16.07.2024</a:t>
             </a:fld>
             <a:endParaRPr lang="de-CH"/>
           </a:p>
@@ -2693,7 +2716,7 @@
           <a:p>
             <a:fld id="{9E9B238C-2335-4007-98C9-471C02CC43B6}" type="datetimeFigureOut">
               <a:rPr lang="de-CH" smtClean="0"/>
-              <a:t>13.07.2024</a:t>
+              <a:t>16.07.2024</a:t>
             </a:fld>
             <a:endParaRPr lang="de-CH"/>
           </a:p>
@@ -2893,7 +2916,7 @@
           <a:p>
             <a:fld id="{9E9B238C-2335-4007-98C9-471C02CC43B6}" type="datetimeFigureOut">
               <a:rPr lang="de-CH" smtClean="0"/>
-              <a:t>13.07.2024</a:t>
+              <a:t>16.07.2024</a:t>
             </a:fld>
             <a:endParaRPr lang="de-CH"/>
           </a:p>
@@ -3103,7 +3126,7 @@
           <a:p>
             <a:fld id="{9E9B238C-2335-4007-98C9-471C02CC43B6}" type="datetimeFigureOut">
               <a:rPr lang="de-CH" smtClean="0"/>
-              <a:t>13.07.2024</a:t>
+              <a:t>16.07.2024</a:t>
             </a:fld>
             <a:endParaRPr lang="de-CH"/>
           </a:p>
@@ -3532,7 +3555,7 @@
           <a:p>
             <a:fld id="{9E9B238C-2335-4007-98C9-471C02CC43B6}" type="datetimeFigureOut">
               <a:rPr lang="de-CH" smtClean="0"/>
-              <a:t>13.07.2024</a:t>
+              <a:t>16.07.2024</a:t>
             </a:fld>
             <a:endParaRPr lang="de-CH"/>
           </a:p>
@@ -3808,7 +3831,7 @@
           <a:p>
             <a:fld id="{9E9B238C-2335-4007-98C9-471C02CC43B6}" type="datetimeFigureOut">
               <a:rPr lang="de-CH" smtClean="0"/>
-              <a:t>13.07.2024</a:t>
+              <a:t>16.07.2024</a:t>
             </a:fld>
             <a:endParaRPr lang="de-CH"/>
           </a:p>
@@ -4076,7 +4099,7 @@
           <a:p>
             <a:fld id="{9E9B238C-2335-4007-98C9-471C02CC43B6}" type="datetimeFigureOut">
               <a:rPr lang="de-CH" smtClean="0"/>
-              <a:t>13.07.2024</a:t>
+              <a:t>16.07.2024</a:t>
             </a:fld>
             <a:endParaRPr lang="de-CH"/>
           </a:p>
@@ -4491,7 +4514,7 @@
           <a:p>
             <a:fld id="{9E9B238C-2335-4007-98C9-471C02CC43B6}" type="datetimeFigureOut">
               <a:rPr lang="de-CH" smtClean="0"/>
-              <a:t>13.07.2024</a:t>
+              <a:t>16.07.2024</a:t>
             </a:fld>
             <a:endParaRPr lang="de-CH"/>
           </a:p>
@@ -4633,7 +4656,7 @@
           <a:p>
             <a:fld id="{9E9B238C-2335-4007-98C9-471C02CC43B6}" type="datetimeFigureOut">
               <a:rPr lang="de-CH" smtClean="0"/>
-              <a:t>13.07.2024</a:t>
+              <a:t>16.07.2024</a:t>
             </a:fld>
             <a:endParaRPr lang="de-CH"/>
           </a:p>
@@ -4746,7 +4769,7 @@
           <a:p>
             <a:fld id="{9E9B238C-2335-4007-98C9-471C02CC43B6}" type="datetimeFigureOut">
               <a:rPr lang="de-CH" smtClean="0"/>
-              <a:t>13.07.2024</a:t>
+              <a:t>16.07.2024</a:t>
             </a:fld>
             <a:endParaRPr lang="de-CH"/>
           </a:p>
@@ -5059,7 +5082,7 @@
           <a:p>
             <a:fld id="{9E9B238C-2335-4007-98C9-471C02CC43B6}" type="datetimeFigureOut">
               <a:rPr lang="de-CH" smtClean="0"/>
-              <a:t>13.07.2024</a:t>
+              <a:t>16.07.2024</a:t>
             </a:fld>
             <a:endParaRPr lang="de-CH"/>
           </a:p>
@@ -5348,7 +5371,7 @@
           <a:p>
             <a:fld id="{9E9B238C-2335-4007-98C9-471C02CC43B6}" type="datetimeFigureOut">
               <a:rPr lang="de-CH" smtClean="0"/>
-              <a:t>13.07.2024</a:t>
+              <a:t>16.07.2024</a:t>
             </a:fld>
             <a:endParaRPr lang="de-CH"/>
           </a:p>
@@ -5591,7 +5614,7 @@
           <a:p>
             <a:fld id="{9E9B238C-2335-4007-98C9-471C02CC43B6}" type="datetimeFigureOut">
               <a:rPr lang="de-CH" smtClean="0"/>
-              <a:t>13.07.2024</a:t>
+              <a:t>16.07.2024</a:t>
             </a:fld>
             <a:endParaRPr lang="de-CH"/>
           </a:p>
@@ -6104,7 +6127,7 @@
                   </a:schemeClr>
                 </a:solidFill>
               </a:rPr>
-              <a:t>	and the relationship to other documents describing</a:t>
+              <a:t>	and the relationships to other documents describing</a:t>
             </a:r>
           </a:p>
           <a:p>
@@ -6180,7 +6203,7 @@
         </p:spPr>
         <p:txBody>
           <a:bodyPr vert="horz" lIns="91440" tIns="45720" rIns="91440" bIns="45720" rtlCol="0">
-            <a:normAutofit fontScale="92500" lnSpcReduction="20000"/>
+            <a:normAutofit fontScale="85000" lnSpcReduction="20000"/>
           </a:bodyPr>
           <a:lstStyle>
             <a:lvl1pPr marL="228600" indent="-228600" algn="l" defTabSz="914400" rtl="0" eaLnBrk="1" latinLnBrk="0" hangingPunct="1">
@@ -6402,6 +6425,17 @@
                 <a:latin typeface="+mj-lt"/>
               </a:rPr>
             </a:br>
+            <a:r>
+              <a:rPr lang="de-CH" sz="1400" dirty="0">
+                <a:latin typeface="+mj-lt"/>
+              </a:rPr>
+              <a:t>alex.huang-feng@insa-lyon.fr</a:t>
+            </a:r>
+            <a:br>
+              <a:rPr lang="de-CH" sz="1400" dirty="0">
+                <a:latin typeface="+mj-lt"/>
+              </a:rPr>
+            </a:br>
             <a:endParaRPr lang="de-CH" sz="1400" dirty="0">
               <a:latin typeface="+mj-lt"/>
             </a:endParaRPr>
@@ -6417,7 +6451,7 @@
               <a:rPr lang="de-CH" sz="1400" dirty="0">
                 <a:latin typeface="+mj-lt"/>
               </a:rPr>
-              <a:t>13. </a:t>
+              <a:t>16. </a:t>
             </a:r>
             <a:r>
               <a:rPr lang="de-CH" sz="1400" dirty="0" err="1">
@@ -14187,14 +14221,24 @@
               <a:rPr lang="en-GB" sz="3600" dirty="0"/>
             </a:br>
             <a:r>
-              <a:rPr lang="en-US" sz="2700" dirty="0">
+              <a:rPr lang="en-US" sz="2700">
                 <a:solidFill>
                   <a:schemeClr val="bg2">
                     <a:lumMod val="75000"/>
                   </a:schemeClr>
                 </a:solidFill>
               </a:rPr>
-              <a:t>Which operational metrics are collected</a:t>
+              <a:t>Which metrics </a:t>
+            </a:r>
+            <a:r>
+              <a:rPr lang="en-US" sz="2700" dirty="0">
+                <a:solidFill>
+                  <a:schemeClr val="bg2">
+                    <a:lumMod val="75000"/>
+                  </a:schemeClr>
+                </a:solidFill>
+              </a:rPr>
+              <a:t>are collected</a:t>
             </a:r>
           </a:p>
         </p:txBody>

</xml_diff>

<commit_message>
merged input from Med
</commit_message>
<xml_diff>
--- a/120/NMOP/draft-netana-nmop-network-anomaly-architecture-semantics-lifecycle.pptx
+++ b/120/NMOP/draft-netana-nmop-network-anomaly-architecture-semantics-lifecycle.pptx
@@ -5,23 +5,24 @@
     <p:sldMasterId id="2147483648" r:id="rId1"/>
   </p:sldMasterIdLst>
   <p:notesMasterIdLst>
-    <p:notesMasterId r:id="rId16"/>
+    <p:notesMasterId r:id="rId17"/>
   </p:notesMasterIdLst>
   <p:sldIdLst>
     <p:sldId id="1041" r:id="rId2"/>
-    <p:sldId id="2145706225" r:id="rId3"/>
-    <p:sldId id="2145706259" r:id="rId4"/>
-    <p:sldId id="2145706226" r:id="rId5"/>
-    <p:sldId id="2145706261" r:id="rId6"/>
-    <p:sldId id="2145706258" r:id="rId7"/>
-    <p:sldId id="2145706240" r:id="rId8"/>
-    <p:sldId id="263" r:id="rId9"/>
-    <p:sldId id="264" r:id="rId10"/>
-    <p:sldId id="2145706262" r:id="rId11"/>
-    <p:sldId id="2145706282" r:id="rId12"/>
-    <p:sldId id="2145706283" r:id="rId13"/>
-    <p:sldId id="2145706242" r:id="rId14"/>
-    <p:sldId id="2145706234" r:id="rId15"/>
+    <p:sldId id="2145706284" r:id="rId3"/>
+    <p:sldId id="2145706225" r:id="rId4"/>
+    <p:sldId id="2145706259" r:id="rId5"/>
+    <p:sldId id="2145706226" r:id="rId6"/>
+    <p:sldId id="2145706261" r:id="rId7"/>
+    <p:sldId id="2145706258" r:id="rId8"/>
+    <p:sldId id="2145706240" r:id="rId9"/>
+    <p:sldId id="263" r:id="rId10"/>
+    <p:sldId id="264" r:id="rId11"/>
+    <p:sldId id="2145706262" r:id="rId12"/>
+    <p:sldId id="2145706282" r:id="rId13"/>
+    <p:sldId id="2145706283" r:id="rId14"/>
+    <p:sldId id="2145706242" r:id="rId15"/>
+    <p:sldId id="256" r:id="rId16"/>
   </p:sldIdLst>
   <p:sldSz cx="12192000" cy="6858000"/>
   <p:notesSz cx="6858000" cy="9144000"/>
@@ -131,7 +132,7 @@
 <file path=ppt/revisionInfo.xml><?xml version="1.0" encoding="utf-8"?>
 <p1510:revInfo xmlns:a="http://schemas.openxmlformats.org/drawingml/2006/main" xmlns:r="http://schemas.openxmlformats.org/officeDocument/2006/relationships" xmlns:p1510="http://schemas.microsoft.com/office/powerpoint/2015/10/main">
   <p1510:revLst>
-    <p1510:client id="{D5F81756-EA00-4B65-9234-A0FB2F3D032D}" v="10" dt="2024-07-16T10:25:21.879"/>
+    <p1510:client id="{D5F81756-EA00-4B65-9234-A0FB2F3D032D}" v="13" dt="2024-07-22T20:58:00.995"/>
   </p1510:revLst>
 </p1510:revInfo>
 </file>
@@ -140,11 +141,33 @@
 <pc:chgInfo xmlns:a="http://schemas.openxmlformats.org/drawingml/2006/main" xmlns:r="http://schemas.openxmlformats.org/officeDocument/2006/relationships" xmlns:ac="http://schemas.microsoft.com/office/drawing/2013/main/command" xmlns:pc="http://schemas.microsoft.com/office/powerpoint/2013/main/command">
   <pc:docChgLst>
     <pc:chgData name="Graf Thomas, INI-NET-VNC-HCS" userId="487bc3e3-9ce7-4cdd-b7b4-8899ea88d289" providerId="ADAL" clId="{D5F81756-EA00-4B65-9234-A0FB2F3D032D}"/>
-    <pc:docChg chg="undo custSel addSld delSld modSld sldOrd delMainMaster">
-      <pc:chgData name="Graf Thomas, INI-NET-VNC-HCS" userId="487bc3e3-9ce7-4cdd-b7b4-8899ea88d289" providerId="ADAL" clId="{D5F81756-EA00-4B65-9234-A0FB2F3D032D}" dt="2024-07-16T10:26:57.315" v="612" actId="20577"/>
+    <pc:docChg chg="undo redo custSel addSld delSld modSld sldOrd delMainMaster">
+      <pc:chgData name="Graf Thomas, INI-NET-VNC-HCS" userId="487bc3e3-9ce7-4cdd-b7b4-8899ea88d289" providerId="ADAL" clId="{D5F81756-EA00-4B65-9234-A0FB2F3D032D}" dt="2024-07-22T21:11:11.993" v="1200" actId="20577"/>
       <pc:docMkLst>
         <pc:docMk/>
       </pc:docMkLst>
+      <pc:sldChg chg="add">
+        <pc:chgData name="Graf Thomas, INI-NET-VNC-HCS" userId="487bc3e3-9ce7-4cdd-b7b4-8899ea88d289" providerId="ADAL" clId="{D5F81756-EA00-4B65-9234-A0FB2F3D032D}" dt="2024-07-22T20:58:00.993" v="815"/>
+        <pc:sldMkLst>
+          <pc:docMk/>
+          <pc:sldMk cId="0" sldId="256"/>
+        </pc:sldMkLst>
+      </pc:sldChg>
+      <pc:sldChg chg="modSp mod">
+        <pc:chgData name="Graf Thomas, INI-NET-VNC-HCS" userId="487bc3e3-9ce7-4cdd-b7b4-8899ea88d289" providerId="ADAL" clId="{D5F81756-EA00-4B65-9234-A0FB2F3D032D}" dt="2024-07-22T20:50:00.951" v="622" actId="20577"/>
+        <pc:sldMkLst>
+          <pc:docMk/>
+          <pc:sldMk cId="0" sldId="263"/>
+        </pc:sldMkLst>
+        <pc:spChg chg="mod">
+          <ac:chgData name="Graf Thomas, INI-NET-VNC-HCS" userId="487bc3e3-9ce7-4cdd-b7b4-8899ea88d289" providerId="ADAL" clId="{D5F81756-EA00-4B65-9234-A0FB2F3D032D}" dt="2024-07-22T20:50:00.951" v="622" actId="20577"/>
+          <ac:spMkLst>
+            <pc:docMk/>
+            <pc:sldMk cId="0" sldId="263"/>
+            <ac:spMk id="217" creationId="{00000000-0000-0000-0000-000000000000}"/>
+          </ac:spMkLst>
+        </pc:spChg>
+      </pc:sldChg>
       <pc:sldChg chg="modSp del mod">
         <pc:chgData name="Graf Thomas, INI-NET-VNC-HCS" userId="487bc3e3-9ce7-4cdd-b7b4-8899ea88d289" providerId="ADAL" clId="{D5F81756-EA00-4B65-9234-A0FB2F3D032D}" dt="2024-07-13T15:46:30.021" v="77" actId="47"/>
         <pc:sldMkLst>
@@ -169,7 +192,7 @@
         </pc:spChg>
       </pc:sldChg>
       <pc:sldChg chg="modSp mod">
-        <pc:chgData name="Graf Thomas, INI-NET-VNC-HCS" userId="487bc3e3-9ce7-4cdd-b7b4-8899ea88d289" providerId="ADAL" clId="{D5F81756-EA00-4B65-9234-A0FB2F3D032D}" dt="2024-07-16T10:25:23.840" v="610"/>
+        <pc:chgData name="Graf Thomas, INI-NET-VNC-HCS" userId="487bc3e3-9ce7-4cdd-b7b4-8899ea88d289" providerId="ADAL" clId="{D5F81756-EA00-4B65-9234-A0FB2F3D032D}" dt="2024-07-22T20:46:16.336" v="616" actId="20577"/>
         <pc:sldMkLst>
           <pc:docMk/>
           <pc:sldMk cId="3578665336" sldId="1041"/>
@@ -183,7 +206,7 @@
           </ac:spMkLst>
         </pc:spChg>
         <pc:spChg chg="mod">
-          <ac:chgData name="Graf Thomas, INI-NET-VNC-HCS" userId="487bc3e3-9ce7-4cdd-b7b4-8899ea88d289" providerId="ADAL" clId="{D5F81756-EA00-4B65-9234-A0FB2F3D032D}" dt="2024-07-16T10:25:23.840" v="610"/>
+          <ac:chgData name="Graf Thomas, INI-NET-VNC-HCS" userId="487bc3e3-9ce7-4cdd-b7b4-8899ea88d289" providerId="ADAL" clId="{D5F81756-EA00-4B65-9234-A0FB2F3D032D}" dt="2024-07-22T20:46:16.336" v="616" actId="20577"/>
           <ac:spMkLst>
             <pc:docMk/>
             <pc:sldMk cId="3578665336" sldId="1041"/>
@@ -192,13 +215,35 @@
         </pc:spChg>
       </pc:sldChg>
       <pc:sldChg chg="modSp mod">
-        <pc:chgData name="Graf Thomas, INI-NET-VNC-HCS" userId="487bc3e3-9ce7-4cdd-b7b4-8899ea88d289" providerId="ADAL" clId="{D5F81756-EA00-4B65-9234-A0FB2F3D032D}" dt="2024-07-13T16:07:59.264" v="587" actId="20577"/>
+        <pc:chgData name="Graf Thomas, INI-NET-VNC-HCS" userId="487bc3e3-9ce7-4cdd-b7b4-8899ea88d289" providerId="ADAL" clId="{D5F81756-EA00-4B65-9234-A0FB2F3D032D}" dt="2024-07-22T21:02:30.025" v="853" actId="20577"/>
+        <pc:sldMkLst>
+          <pc:docMk/>
+          <pc:sldMk cId="1081037514" sldId="2145706225"/>
+        </pc:sldMkLst>
+        <pc:spChg chg="mod">
+          <ac:chgData name="Graf Thomas, INI-NET-VNC-HCS" userId="487bc3e3-9ce7-4cdd-b7b4-8899ea88d289" providerId="ADAL" clId="{D5F81756-EA00-4B65-9234-A0FB2F3D032D}" dt="2024-07-22T21:02:30.025" v="853" actId="20577"/>
+          <ac:spMkLst>
+            <pc:docMk/>
+            <pc:sldMk cId="1081037514" sldId="2145706225"/>
+            <ac:spMk id="48" creationId="{A48B1DB7-BCDC-5D18-F56D-8A1447F1B8BA}"/>
+          </ac:spMkLst>
+        </pc:spChg>
+      </pc:sldChg>
+      <pc:sldChg chg="add del">
+        <pc:chgData name="Graf Thomas, INI-NET-VNC-HCS" userId="487bc3e3-9ce7-4cdd-b7b4-8899ea88d289" providerId="ADAL" clId="{D5F81756-EA00-4B65-9234-A0FB2F3D032D}" dt="2024-07-22T21:02:03.415" v="826" actId="47"/>
+        <pc:sldMkLst>
+          <pc:docMk/>
+          <pc:sldMk cId="663711217" sldId="2145706234"/>
+        </pc:sldMkLst>
+      </pc:sldChg>
+      <pc:sldChg chg="modSp mod">
+        <pc:chgData name="Graf Thomas, INI-NET-VNC-HCS" userId="487bc3e3-9ce7-4cdd-b7b4-8899ea88d289" providerId="ADAL" clId="{D5F81756-EA00-4B65-9234-A0FB2F3D032D}" dt="2024-07-22T20:57:24.900" v="814" actId="20577"/>
         <pc:sldMkLst>
           <pc:docMk/>
           <pc:sldMk cId="2617504443" sldId="2145706242"/>
         </pc:sldMkLst>
         <pc:spChg chg="mod">
-          <ac:chgData name="Graf Thomas, INI-NET-VNC-HCS" userId="487bc3e3-9ce7-4cdd-b7b4-8899ea88d289" providerId="ADAL" clId="{D5F81756-EA00-4B65-9234-A0FB2F3D032D}" dt="2024-07-13T16:07:59.264" v="587" actId="20577"/>
+          <ac:chgData name="Graf Thomas, INI-NET-VNC-HCS" userId="487bc3e3-9ce7-4cdd-b7b4-8899ea88d289" providerId="ADAL" clId="{D5F81756-EA00-4B65-9234-A0FB2F3D032D}" dt="2024-07-22T20:57:24.900" v="814" actId="20577"/>
           <ac:spMkLst>
             <pc:docMk/>
             <pc:sldMk cId="2617504443" sldId="2145706242"/>
@@ -237,7 +282,7 @@
         </pc:spChg>
       </pc:sldChg>
       <pc:sldChg chg="addSp delSp modSp add mod ord">
-        <pc:chgData name="Graf Thomas, INI-NET-VNC-HCS" userId="487bc3e3-9ce7-4cdd-b7b4-8899ea88d289" providerId="ADAL" clId="{D5F81756-EA00-4B65-9234-A0FB2F3D032D}" dt="2024-07-13T16:18:17.736" v="601" actId="20577"/>
+        <pc:chgData name="Graf Thomas, INI-NET-VNC-HCS" userId="487bc3e3-9ce7-4cdd-b7b4-8899ea88d289" providerId="ADAL" clId="{D5F81756-EA00-4B65-9234-A0FB2F3D032D}" dt="2024-07-22T20:51:04.197" v="628" actId="20577"/>
         <pc:sldMkLst>
           <pc:docMk/>
           <pc:sldMk cId="492372888" sldId="2145706282"/>
@@ -371,7 +416,7 @@
           </ac:spMkLst>
         </pc:spChg>
         <pc:spChg chg="mod">
-          <ac:chgData name="Graf Thomas, INI-NET-VNC-HCS" userId="487bc3e3-9ce7-4cdd-b7b4-8899ea88d289" providerId="ADAL" clId="{D5F81756-EA00-4B65-9234-A0FB2F3D032D}" dt="2024-07-13T16:10:57.757" v="597" actId="20577"/>
+          <ac:chgData name="Graf Thomas, INI-NET-VNC-HCS" userId="487bc3e3-9ce7-4cdd-b7b4-8899ea88d289" providerId="ADAL" clId="{D5F81756-EA00-4B65-9234-A0FB2F3D032D}" dt="2024-07-22T20:51:04.197" v="628" actId="20577"/>
           <ac:spMkLst>
             <pc:docMk/>
             <pc:sldMk cId="492372888" sldId="2145706282"/>
@@ -508,7 +553,7 @@
         </pc:cxnChg>
       </pc:sldChg>
       <pc:sldChg chg="addSp delSp modSp add mod">
-        <pc:chgData name="Graf Thomas, INI-NET-VNC-HCS" userId="487bc3e3-9ce7-4cdd-b7b4-8899ea88d289" providerId="ADAL" clId="{D5F81756-EA00-4B65-9234-A0FB2F3D032D}" dt="2024-07-13T15:58:35.681" v="276" actId="20577"/>
+        <pc:chgData name="Graf Thomas, INI-NET-VNC-HCS" userId="487bc3e3-9ce7-4cdd-b7b4-8899ea88d289" providerId="ADAL" clId="{D5F81756-EA00-4B65-9234-A0FB2F3D032D}" dt="2024-07-22T20:52:32.077" v="732" actId="20577"/>
         <pc:sldMkLst>
           <pc:docMk/>
           <pc:sldMk cId="1108719720" sldId="2145706283"/>
@@ -642,7 +687,7 @@
           </ac:spMkLst>
         </pc:spChg>
         <pc:spChg chg="mod">
-          <ac:chgData name="Graf Thomas, INI-NET-VNC-HCS" userId="487bc3e3-9ce7-4cdd-b7b4-8899ea88d289" providerId="ADAL" clId="{D5F81756-EA00-4B65-9234-A0FB2F3D032D}" dt="2024-07-13T15:55:50.133" v="228" actId="20577"/>
+          <ac:chgData name="Graf Thomas, INI-NET-VNC-HCS" userId="487bc3e3-9ce7-4cdd-b7b4-8899ea88d289" providerId="ADAL" clId="{D5F81756-EA00-4B65-9234-A0FB2F3D032D}" dt="2024-07-22T20:52:32.077" v="732" actId="20577"/>
           <ac:spMkLst>
             <pc:docMk/>
             <pc:sldMk cId="1108719720" sldId="2145706283"/>
@@ -761,6 +806,37 @@
             <ac:cxnSpMk id="26" creationId="{FC2ED9A3-59E2-4C02-0C42-7DF18209075A}"/>
           </ac:cxnSpMkLst>
         </pc:cxnChg>
+      </pc:sldChg>
+      <pc:sldChg chg="delSp modSp add mod ord">
+        <pc:chgData name="Graf Thomas, INI-NET-VNC-HCS" userId="487bc3e3-9ce7-4cdd-b7b4-8899ea88d289" providerId="ADAL" clId="{D5F81756-EA00-4B65-9234-A0FB2F3D032D}" dt="2024-07-22T21:11:11.993" v="1200" actId="20577"/>
+        <pc:sldMkLst>
+          <pc:docMk/>
+          <pc:sldMk cId="102978613" sldId="2145706284"/>
+        </pc:sldMkLst>
+        <pc:spChg chg="mod">
+          <ac:chgData name="Graf Thomas, INI-NET-VNC-HCS" userId="487bc3e3-9ce7-4cdd-b7b4-8899ea88d289" providerId="ADAL" clId="{D5F81756-EA00-4B65-9234-A0FB2F3D032D}" dt="2024-07-22T21:11:11.993" v="1200" actId="20577"/>
+          <ac:spMkLst>
+            <pc:docMk/>
+            <pc:sldMk cId="102978613" sldId="2145706284"/>
+            <ac:spMk id="5" creationId="{0194B37B-813A-99FE-7B78-4D87D8C30D44}"/>
+          </ac:spMkLst>
+        </pc:spChg>
+        <pc:spChg chg="del">
+          <ac:chgData name="Graf Thomas, INI-NET-VNC-HCS" userId="487bc3e3-9ce7-4cdd-b7b4-8899ea88d289" providerId="ADAL" clId="{D5F81756-EA00-4B65-9234-A0FB2F3D032D}" dt="2024-07-22T21:04:00.154" v="871" actId="478"/>
+          <ac:spMkLst>
+            <pc:docMk/>
+            <pc:sldMk cId="102978613" sldId="2145706284"/>
+            <ac:spMk id="18" creationId="{B283EDB4-CFDF-D6B9-8AF9-9CFA563360E3}"/>
+          </ac:spMkLst>
+        </pc:spChg>
+        <pc:spChg chg="mod">
+          <ac:chgData name="Graf Thomas, INI-NET-VNC-HCS" userId="487bc3e3-9ce7-4cdd-b7b4-8899ea88d289" providerId="ADAL" clId="{D5F81756-EA00-4B65-9234-A0FB2F3D032D}" dt="2024-07-22T21:03:13.424" v="870" actId="20577"/>
+          <ac:spMkLst>
+            <pc:docMk/>
+            <pc:sldMk cId="102978613" sldId="2145706284"/>
+            <ac:spMk id="19" creationId="{56D79134-17A9-8BC8-B7D0-97BCFFB9A6B2}"/>
+          </ac:spMkLst>
+        </pc:spChg>
       </pc:sldChg>
       <pc:sldMasterChg chg="del delSldLayout">
         <pc:chgData name="Graf Thomas, INI-NET-VNC-HCS" userId="487bc3e3-9ce7-4cdd-b7b4-8899ea88d289" providerId="ADAL" clId="{D5F81756-EA00-4B65-9234-A0FB2F3D032D}" dt="2024-07-13T15:49:07.497" v="91" actId="47"/>
@@ -1428,7 +1504,7 @@
           <a:p>
             <a:fld id="{E5E705E9-673F-4AC4-B29E-A7B26F3B8523}" type="datetimeFigureOut">
               <a:rPr lang="de-CH" smtClean="0"/>
-              <a:t>16.07.2024</a:t>
+              <a:t>22.07.2024</a:t>
             </a:fld>
             <a:endParaRPr lang="de-CH"/>
           </a:p>
@@ -1761,7 +1837,7 @@
           <a:p>
             <a:fld id="{574FFD1E-068C-4775-AB61-A06ECF97265E}" type="slidenum">
               <a:rPr lang="de-CH" smtClean="0"/>
-              <a:t>2</a:t>
+              <a:t>3</a:t>
             </a:fld>
             <a:endParaRPr lang="de-CH"/>
           </a:p>
@@ -1845,7 +1921,7 @@
           <a:p>
             <a:fld id="{574FFD1E-068C-4775-AB61-A06ECF97265E}" type="slidenum">
               <a:rPr lang="de-CH" smtClean="0"/>
-              <a:t>4</a:t>
+              <a:t>5</a:t>
             </a:fld>
             <a:endParaRPr lang="de-CH"/>
           </a:p>
@@ -1929,7 +2005,7 @@
           <a:p>
             <a:fld id="{2BBC52A0-2F3F-497F-8536-39D60282E9C2}" type="slidenum">
               <a:rPr lang="de-CH" smtClean="0"/>
-              <a:t>6</a:t>
+              <a:t>7</a:t>
             </a:fld>
             <a:endParaRPr lang="de-CH"/>
           </a:p>
@@ -2527,7 +2603,7 @@
           <a:bodyPr/>
           <a:lstStyle/>
           <a:p>
-            <a:endParaRPr lang="en-US" dirty="0"/>
+            <a:endParaRPr lang="de-CH" dirty="0"/>
           </a:p>
         </p:txBody>
       </p:sp>
@@ -2546,7 +2622,7 @@
           <a:bodyPr/>
           <a:lstStyle/>
           <a:p>
-            <a:fld id="{574FFD1E-068C-4775-AB61-A06ECF97265E}" type="slidenum">
+            <a:fld id="{2BBC52A0-2F3F-497F-8536-39D60282E9C2}" type="slidenum">
               <a:rPr lang="de-CH" smtClean="0"/>
               <a:t>14</a:t>
             </a:fld>
@@ -2557,7 +2633,7 @@
     </p:spTree>
     <p:extLst>
       <p:ext uri="{BB962C8B-B14F-4D97-AF65-F5344CB8AC3E}">
-        <p14:creationId xmlns:p14="http://schemas.microsoft.com/office/powerpoint/2010/main" val="899548081"/>
+        <p14:creationId xmlns:p14="http://schemas.microsoft.com/office/powerpoint/2010/main" val="1107056533"/>
       </p:ext>
     </p:extLst>
   </p:cSld>
@@ -2716,7 +2792,7 @@
           <a:p>
             <a:fld id="{9E9B238C-2335-4007-98C9-471C02CC43B6}" type="datetimeFigureOut">
               <a:rPr lang="de-CH" smtClean="0"/>
-              <a:t>16.07.2024</a:t>
+              <a:t>22.07.2024</a:t>
             </a:fld>
             <a:endParaRPr lang="de-CH"/>
           </a:p>
@@ -2916,7 +2992,7 @@
           <a:p>
             <a:fld id="{9E9B238C-2335-4007-98C9-471C02CC43B6}" type="datetimeFigureOut">
               <a:rPr lang="de-CH" smtClean="0"/>
-              <a:t>16.07.2024</a:t>
+              <a:t>22.07.2024</a:t>
             </a:fld>
             <a:endParaRPr lang="de-CH"/>
           </a:p>
@@ -3126,7 +3202,7 @@
           <a:p>
             <a:fld id="{9E9B238C-2335-4007-98C9-471C02CC43B6}" type="datetimeFigureOut">
               <a:rPr lang="de-CH" smtClean="0"/>
-              <a:t>16.07.2024</a:t>
+              <a:t>22.07.2024</a:t>
             </a:fld>
             <a:endParaRPr lang="de-CH"/>
           </a:p>
@@ -3555,7 +3631,7 @@
           <a:p>
             <a:fld id="{9E9B238C-2335-4007-98C9-471C02CC43B6}" type="datetimeFigureOut">
               <a:rPr lang="de-CH" smtClean="0"/>
-              <a:t>16.07.2024</a:t>
+              <a:t>22.07.2024</a:t>
             </a:fld>
             <a:endParaRPr lang="de-CH"/>
           </a:p>
@@ -3831,7 +3907,7 @@
           <a:p>
             <a:fld id="{9E9B238C-2335-4007-98C9-471C02CC43B6}" type="datetimeFigureOut">
               <a:rPr lang="de-CH" smtClean="0"/>
-              <a:t>16.07.2024</a:t>
+              <a:t>22.07.2024</a:t>
             </a:fld>
             <a:endParaRPr lang="de-CH"/>
           </a:p>
@@ -4099,7 +4175,7 @@
           <a:p>
             <a:fld id="{9E9B238C-2335-4007-98C9-471C02CC43B6}" type="datetimeFigureOut">
               <a:rPr lang="de-CH" smtClean="0"/>
-              <a:t>16.07.2024</a:t>
+              <a:t>22.07.2024</a:t>
             </a:fld>
             <a:endParaRPr lang="de-CH"/>
           </a:p>
@@ -4514,7 +4590,7 @@
           <a:p>
             <a:fld id="{9E9B238C-2335-4007-98C9-471C02CC43B6}" type="datetimeFigureOut">
               <a:rPr lang="de-CH" smtClean="0"/>
-              <a:t>16.07.2024</a:t>
+              <a:t>22.07.2024</a:t>
             </a:fld>
             <a:endParaRPr lang="de-CH"/>
           </a:p>
@@ -4656,7 +4732,7 @@
           <a:p>
             <a:fld id="{9E9B238C-2335-4007-98C9-471C02CC43B6}" type="datetimeFigureOut">
               <a:rPr lang="de-CH" smtClean="0"/>
-              <a:t>16.07.2024</a:t>
+              <a:t>22.07.2024</a:t>
             </a:fld>
             <a:endParaRPr lang="de-CH"/>
           </a:p>
@@ -4769,7 +4845,7 @@
           <a:p>
             <a:fld id="{9E9B238C-2335-4007-98C9-471C02CC43B6}" type="datetimeFigureOut">
               <a:rPr lang="de-CH" smtClean="0"/>
-              <a:t>16.07.2024</a:t>
+              <a:t>22.07.2024</a:t>
             </a:fld>
             <a:endParaRPr lang="de-CH"/>
           </a:p>
@@ -5082,7 +5158,7 @@
           <a:p>
             <a:fld id="{9E9B238C-2335-4007-98C9-471C02CC43B6}" type="datetimeFigureOut">
               <a:rPr lang="de-CH" smtClean="0"/>
-              <a:t>16.07.2024</a:t>
+              <a:t>22.07.2024</a:t>
             </a:fld>
             <a:endParaRPr lang="de-CH"/>
           </a:p>
@@ -5371,7 +5447,7 @@
           <a:p>
             <a:fld id="{9E9B238C-2335-4007-98C9-471C02CC43B6}" type="datetimeFigureOut">
               <a:rPr lang="de-CH" smtClean="0"/>
-              <a:t>16.07.2024</a:t>
+              <a:t>22.07.2024</a:t>
             </a:fld>
             <a:endParaRPr lang="de-CH"/>
           </a:p>
@@ -5614,7 +5690,7 @@
           <a:p>
             <a:fld id="{9E9B238C-2335-4007-98C9-471C02CC43B6}" type="datetimeFigureOut">
               <a:rPr lang="de-CH" smtClean="0"/>
-              <a:t>16.07.2024</a:t>
+              <a:t>22.07.2024</a:t>
             </a:fld>
             <a:endParaRPr lang="de-CH"/>
           </a:p>
@@ -6451,7 +6527,7 @@
               <a:rPr lang="de-CH" sz="1400" dirty="0">
                 <a:latin typeface="+mj-lt"/>
               </a:rPr>
-              <a:t>16. </a:t>
+              <a:t>22. </a:t>
             </a:r>
             <a:r>
               <a:rPr lang="de-CH" sz="1400" dirty="0" err="1">
@@ -6497,6 +6573,1166 @@
 </file>
 
 <file path=ppt/slides/slide10.xml><?xml version="1.0" encoding="utf-8"?>
+<p:sld xmlns:a="http://schemas.openxmlformats.org/drawingml/2006/main" xmlns:r="http://schemas.openxmlformats.org/officeDocument/2006/relationships" xmlns:p="http://schemas.openxmlformats.org/presentationml/2006/main">
+  <p:cSld>
+    <p:spTree>
+      <p:nvGrpSpPr>
+        <p:cNvPr id="1" name="Shape 225"/>
+        <p:cNvGrpSpPr/>
+        <p:nvPr/>
+      </p:nvGrpSpPr>
+      <p:grpSpPr>
+        <a:xfrm>
+          <a:off x="0" y="0"/>
+          <a:ext cx="0" cy="0"/>
+          <a:chOff x="0" y="0"/>
+          <a:chExt cx="0" cy="0"/>
+        </a:xfrm>
+      </p:grpSpPr>
+      <p:sp>
+        <p:nvSpPr>
+          <p:cNvPr id="226" name="Google Shape;226;p9"/>
+          <p:cNvSpPr txBox="1"/>
+          <p:nvPr/>
+        </p:nvSpPr>
+        <p:spPr>
+          <a:xfrm>
+            <a:off x="838198" y="1484344"/>
+            <a:ext cx="4373880" cy="2329677"/>
+          </a:xfrm>
+          <a:prstGeom prst="rect">
+            <a:avLst/>
+          </a:prstGeom>
+          <a:noFill/>
+          <a:ln>
+            <a:noFill/>
+          </a:ln>
+        </p:spPr>
+        <p:txBody>
+          <a:bodyPr spcFirstLastPara="1" wrap="square" lIns="91425" tIns="45700" rIns="91425" bIns="45700" anchor="t" anchorCtr="0">
+            <a:spAutoFit/>
+          </a:bodyPr>
+          <a:lstStyle/>
+          <a:p>
+            <a:pPr marL="0" marR="0" lvl="0" indent="0" algn="l" rtl="0">
+              <a:lnSpc>
+                <a:spcPct val="107000"/>
+              </a:lnSpc>
+              <a:spcBef>
+                <a:spcPts val="0"/>
+              </a:spcBef>
+              <a:spcAft>
+                <a:spcPts val="0"/>
+              </a:spcAft>
+              <a:buNone/>
+            </a:pPr>
+            <a:r>
+              <a:rPr lang="en-US" sz="850" b="0" i="0" u="none" strike="noStrike" cap="none">
+                <a:solidFill>
+                  <a:schemeClr val="dk1"/>
+                </a:solidFill>
+                <a:latin typeface="Courier New"/>
+                <a:ea typeface="Courier New"/>
+                <a:cs typeface="Courier New"/>
+                <a:sym typeface="Courier New"/>
+              </a:rPr>
+              <a:t>module: ietf-network-anomaly-metadata</a:t>
+            </a:r>
+            <a:endParaRPr/>
+          </a:p>
+          <a:p>
+            <a:pPr marL="0" marR="0" lvl="0" indent="0" algn="l" rtl="0">
+              <a:lnSpc>
+                <a:spcPct val="107000"/>
+              </a:lnSpc>
+              <a:spcBef>
+                <a:spcPts val="0"/>
+              </a:spcBef>
+              <a:spcAft>
+                <a:spcPts val="0"/>
+              </a:spcAft>
+              <a:buNone/>
+            </a:pPr>
+            <a:r>
+              <a:rPr lang="en-US" sz="850" b="0" i="0" u="none" strike="noStrike" cap="none">
+                <a:solidFill>
+                  <a:schemeClr val="dk1"/>
+                </a:solidFill>
+                <a:latin typeface="Courier New"/>
+                <a:ea typeface="Courier New"/>
+                <a:cs typeface="Courier New"/>
+                <a:sym typeface="Courier New"/>
+              </a:rPr>
+              <a:t>  +--rw network-anomalies</a:t>
+            </a:r>
+            <a:endParaRPr/>
+          </a:p>
+          <a:p>
+            <a:pPr marL="0" marR="0" lvl="0" indent="0" algn="l" rtl="0">
+              <a:lnSpc>
+                <a:spcPct val="107000"/>
+              </a:lnSpc>
+              <a:spcBef>
+                <a:spcPts val="0"/>
+              </a:spcBef>
+              <a:spcAft>
+                <a:spcPts val="0"/>
+              </a:spcAft>
+              <a:buNone/>
+            </a:pPr>
+            <a:r>
+              <a:rPr lang="en-US" sz="850" b="0" i="0" u="none" strike="noStrike" cap="none">
+                <a:solidFill>
+                  <a:schemeClr val="dk1"/>
+                </a:solidFill>
+                <a:latin typeface="Courier New"/>
+                <a:ea typeface="Courier New"/>
+                <a:cs typeface="Courier New"/>
+                <a:sym typeface="Courier New"/>
+              </a:rPr>
+              <a:t>    +--rw network-anomaly* [id version]</a:t>
+            </a:r>
+            <a:endParaRPr/>
+          </a:p>
+          <a:p>
+            <a:pPr marL="0" marR="0" lvl="0" indent="0" algn="l" rtl="0">
+              <a:lnSpc>
+                <a:spcPct val="107000"/>
+              </a:lnSpc>
+              <a:spcBef>
+                <a:spcPts val="0"/>
+              </a:spcBef>
+              <a:spcAft>
+                <a:spcPts val="0"/>
+              </a:spcAft>
+              <a:buNone/>
+            </a:pPr>
+            <a:r>
+              <a:rPr lang="en-US" sz="850" b="0" i="0" u="none" strike="noStrike" cap="none">
+                <a:solidFill>
+                  <a:schemeClr val="dk1"/>
+                </a:solidFill>
+                <a:latin typeface="Courier New"/>
+                <a:ea typeface="Courier New"/>
+                <a:cs typeface="Courier New"/>
+                <a:sym typeface="Courier New"/>
+              </a:rPr>
+              <a:t>      +--rw id             yang:uuid</a:t>
+            </a:r>
+            <a:endParaRPr sz="850" b="0" i="0" u="none" strike="noStrike" cap="none">
+              <a:solidFill>
+                <a:schemeClr val="dk1"/>
+              </a:solidFill>
+              <a:latin typeface="Courier New"/>
+              <a:ea typeface="Courier New"/>
+              <a:cs typeface="Courier New"/>
+              <a:sym typeface="Courier New"/>
+            </a:endParaRPr>
+          </a:p>
+          <a:p>
+            <a:pPr marL="0" marR="0" lvl="0" indent="0" algn="l" rtl="0">
+              <a:lnSpc>
+                <a:spcPct val="107000"/>
+              </a:lnSpc>
+              <a:spcBef>
+                <a:spcPts val="0"/>
+              </a:spcBef>
+              <a:spcAft>
+                <a:spcPts val="0"/>
+              </a:spcAft>
+              <a:buNone/>
+            </a:pPr>
+            <a:r>
+              <a:rPr lang="en-US" sz="850" b="0" i="0" u="none" strike="noStrike" cap="none">
+                <a:solidFill>
+                  <a:schemeClr val="dk1"/>
+                </a:solidFill>
+                <a:latin typeface="Courier New"/>
+                <a:ea typeface="Courier New"/>
+                <a:cs typeface="Courier New"/>
+                <a:sym typeface="Courier New"/>
+              </a:rPr>
+              <a:t>      +--rw version        uint32</a:t>
+            </a:r>
+            <a:endParaRPr/>
+          </a:p>
+          <a:p>
+            <a:pPr marL="0" marR="0" lvl="0" indent="0" algn="l" rtl="0">
+              <a:lnSpc>
+                <a:spcPct val="107000"/>
+              </a:lnSpc>
+              <a:spcBef>
+                <a:spcPts val="0"/>
+              </a:spcBef>
+              <a:spcAft>
+                <a:spcPts val="0"/>
+              </a:spcAft>
+              <a:buNone/>
+            </a:pPr>
+            <a:r>
+              <a:rPr lang="en-US" sz="850" b="0" i="0" u="none" strike="noStrike" cap="none">
+                <a:solidFill>
+                  <a:schemeClr val="dk1"/>
+                </a:solidFill>
+                <a:latin typeface="Courier New"/>
+                <a:ea typeface="Courier New"/>
+                <a:cs typeface="Courier New"/>
+                <a:sym typeface="Courier New"/>
+              </a:rPr>
+              <a:t>      +--rw description?   string</a:t>
+            </a:r>
+            <a:endParaRPr/>
+          </a:p>
+          <a:p>
+            <a:pPr marL="0" marR="0" lvl="0" indent="0" algn="l" rtl="0">
+              <a:lnSpc>
+                <a:spcPct val="107000"/>
+              </a:lnSpc>
+              <a:spcBef>
+                <a:spcPts val="0"/>
+              </a:spcBef>
+              <a:spcAft>
+                <a:spcPts val="0"/>
+              </a:spcAft>
+              <a:buNone/>
+            </a:pPr>
+            <a:r>
+              <a:rPr lang="en-US" sz="850" b="0" i="0" u="none" strike="noStrike" cap="none">
+                <a:solidFill>
+                  <a:schemeClr val="dk1"/>
+                </a:solidFill>
+                <a:latin typeface="Courier New"/>
+                <a:ea typeface="Courier New"/>
+                <a:cs typeface="Courier New"/>
+                <a:sym typeface="Courier New"/>
+              </a:rPr>
+              <a:t>      +--rw state          identityref</a:t>
+            </a:r>
+            <a:endParaRPr sz="850" b="0" i="0" u="none" strike="noStrike" cap="none">
+              <a:solidFill>
+                <a:schemeClr val="dk1"/>
+              </a:solidFill>
+              <a:latin typeface="Courier New"/>
+              <a:ea typeface="Courier New"/>
+              <a:cs typeface="Courier New"/>
+              <a:sym typeface="Courier New"/>
+            </a:endParaRPr>
+          </a:p>
+          <a:p>
+            <a:pPr marL="0" marR="0" lvl="0" indent="0" algn="l" rtl="0">
+              <a:lnSpc>
+                <a:spcPct val="107000"/>
+              </a:lnSpc>
+              <a:spcBef>
+                <a:spcPts val="0"/>
+              </a:spcBef>
+              <a:spcAft>
+                <a:spcPts val="0"/>
+              </a:spcAft>
+              <a:buNone/>
+            </a:pPr>
+            <a:r>
+              <a:rPr lang="en-US" sz="850" b="0" i="0" u="none" strike="noStrike" cap="none">
+                <a:solidFill>
+                  <a:schemeClr val="dk1"/>
+                </a:solidFill>
+                <a:latin typeface="Courier New"/>
+                <a:ea typeface="Courier New"/>
+                <a:cs typeface="Courier New"/>
+                <a:sym typeface="Courier New"/>
+              </a:rPr>
+              <a:t>      +--rw annotator</a:t>
+            </a:r>
+            <a:endParaRPr/>
+          </a:p>
+          <a:p>
+            <a:pPr marL="0" marR="0" lvl="0" indent="0" algn="l" rtl="0">
+              <a:lnSpc>
+                <a:spcPct val="107000"/>
+              </a:lnSpc>
+              <a:spcBef>
+                <a:spcPts val="0"/>
+              </a:spcBef>
+              <a:spcAft>
+                <a:spcPts val="0"/>
+              </a:spcAft>
+              <a:buNone/>
+            </a:pPr>
+            <a:r>
+              <a:rPr lang="en-US" sz="850" b="0" i="0" u="none" strike="noStrike" cap="none">
+                <a:solidFill>
+                  <a:schemeClr val="dk1"/>
+                </a:solidFill>
+                <a:latin typeface="Courier New"/>
+                <a:ea typeface="Courier New"/>
+                <a:cs typeface="Courier New"/>
+                <a:sym typeface="Courier New"/>
+              </a:rPr>
+              <a:t>      |  +--rw (annotator-type)</a:t>
+            </a:r>
+            <a:endParaRPr/>
+          </a:p>
+          <a:p>
+            <a:pPr marL="0" marR="0" lvl="0" indent="0" algn="l" rtl="0">
+              <a:lnSpc>
+                <a:spcPct val="107000"/>
+              </a:lnSpc>
+              <a:spcBef>
+                <a:spcPts val="0"/>
+              </a:spcBef>
+              <a:spcAft>
+                <a:spcPts val="0"/>
+              </a:spcAft>
+              <a:buNone/>
+            </a:pPr>
+            <a:r>
+              <a:rPr lang="en-US" sz="850" b="0" i="0" u="none" strike="noStrike" cap="none">
+                <a:solidFill>
+                  <a:schemeClr val="dk1"/>
+                </a:solidFill>
+                <a:latin typeface="Courier New"/>
+                <a:ea typeface="Courier New"/>
+                <a:cs typeface="Courier New"/>
+                <a:sym typeface="Courier New"/>
+              </a:rPr>
+              <a:t>      |  |  +--:(human)</a:t>
+            </a:r>
+            <a:endParaRPr/>
+          </a:p>
+          <a:p>
+            <a:pPr marL="0" marR="0" lvl="0" indent="0" algn="l" rtl="0">
+              <a:lnSpc>
+                <a:spcPct val="107000"/>
+              </a:lnSpc>
+              <a:spcBef>
+                <a:spcPts val="0"/>
+              </a:spcBef>
+              <a:spcAft>
+                <a:spcPts val="0"/>
+              </a:spcAft>
+              <a:buNone/>
+            </a:pPr>
+            <a:r>
+              <a:rPr lang="en-US" sz="850" b="0" i="0" u="none" strike="noStrike" cap="none">
+                <a:solidFill>
+                  <a:schemeClr val="dk1"/>
+                </a:solidFill>
+                <a:latin typeface="Courier New"/>
+                <a:ea typeface="Courier New"/>
+                <a:cs typeface="Courier New"/>
+                <a:sym typeface="Courier New"/>
+              </a:rPr>
+              <a:t>      |  |  |  +--rw human        empty</a:t>
+            </a:r>
+            <a:endParaRPr/>
+          </a:p>
+          <a:p>
+            <a:pPr marL="0" marR="0" lvl="0" indent="0" algn="l" rtl="0">
+              <a:lnSpc>
+                <a:spcPct val="107000"/>
+              </a:lnSpc>
+              <a:spcBef>
+                <a:spcPts val="0"/>
+              </a:spcBef>
+              <a:spcAft>
+                <a:spcPts val="0"/>
+              </a:spcAft>
+              <a:buNone/>
+            </a:pPr>
+            <a:r>
+              <a:rPr lang="en-US" sz="850" b="0" i="0" u="none" strike="noStrike" cap="none">
+                <a:solidFill>
+                  <a:schemeClr val="dk1"/>
+                </a:solidFill>
+                <a:latin typeface="Courier New"/>
+                <a:ea typeface="Courier New"/>
+                <a:cs typeface="Courier New"/>
+                <a:sym typeface="Courier New"/>
+              </a:rPr>
+              <a:t>      |  |  +--:(algorithm)</a:t>
+            </a:r>
+            <a:endParaRPr/>
+          </a:p>
+          <a:p>
+            <a:pPr marL="0" marR="0" lvl="0" indent="0" algn="l" rtl="0">
+              <a:lnSpc>
+                <a:spcPct val="107000"/>
+              </a:lnSpc>
+              <a:spcBef>
+                <a:spcPts val="0"/>
+              </a:spcBef>
+              <a:spcAft>
+                <a:spcPts val="0"/>
+              </a:spcAft>
+              <a:buNone/>
+            </a:pPr>
+            <a:r>
+              <a:rPr lang="en-US" sz="850" b="0" i="0" u="none" strike="noStrike" cap="none">
+                <a:solidFill>
+                  <a:schemeClr val="dk1"/>
+                </a:solidFill>
+                <a:latin typeface="Courier New"/>
+                <a:ea typeface="Courier New"/>
+                <a:cs typeface="Courier New"/>
+                <a:sym typeface="Courier New"/>
+              </a:rPr>
+              <a:t>      |  |     +--rw algorithm    empty</a:t>
+            </a:r>
+            <a:endParaRPr/>
+          </a:p>
+          <a:p>
+            <a:pPr marL="0" marR="0" lvl="0" indent="0" algn="l" rtl="0">
+              <a:lnSpc>
+                <a:spcPct val="107000"/>
+              </a:lnSpc>
+              <a:spcBef>
+                <a:spcPts val="0"/>
+              </a:spcBef>
+              <a:spcAft>
+                <a:spcPts val="0"/>
+              </a:spcAft>
+              <a:buNone/>
+            </a:pPr>
+            <a:r>
+              <a:rPr lang="en-US" sz="850" b="0" i="0" u="none" strike="noStrike" cap="none">
+                <a:solidFill>
+                  <a:schemeClr val="dk1"/>
+                </a:solidFill>
+                <a:latin typeface="Courier New"/>
+                <a:ea typeface="Courier New"/>
+                <a:cs typeface="Courier New"/>
+                <a:sym typeface="Courier New"/>
+              </a:rPr>
+              <a:t>      |  +--rw name?              empty</a:t>
+            </a:r>
+            <a:endParaRPr/>
+          </a:p>
+          <a:p>
+            <a:pPr marL="0" marR="0" lvl="0" indent="0" algn="l" rtl="0">
+              <a:lnSpc>
+                <a:spcPct val="107000"/>
+              </a:lnSpc>
+              <a:spcBef>
+                <a:spcPts val="0"/>
+              </a:spcBef>
+              <a:spcAft>
+                <a:spcPts val="0"/>
+              </a:spcAft>
+              <a:buNone/>
+            </a:pPr>
+            <a:r>
+              <a:rPr lang="en-US" sz="850" b="0" i="0" u="none" strike="noStrike" cap="none">
+                <a:solidFill>
+                  <a:schemeClr val="dk1"/>
+                </a:solidFill>
+                <a:latin typeface="Courier New"/>
+                <a:ea typeface="Courier New"/>
+                <a:cs typeface="Courier New"/>
+                <a:sym typeface="Courier New"/>
+              </a:rPr>
+              <a:t>      +--rw symptoms* [symptom_id]</a:t>
+            </a:r>
+            <a:endParaRPr/>
+          </a:p>
+          <a:p>
+            <a:pPr marL="0" marR="0" lvl="0" indent="0" algn="l" rtl="0">
+              <a:lnSpc>
+                <a:spcPct val="107000"/>
+              </a:lnSpc>
+              <a:spcBef>
+                <a:spcPts val="0"/>
+              </a:spcBef>
+              <a:spcAft>
+                <a:spcPts val="0"/>
+              </a:spcAft>
+              <a:buNone/>
+            </a:pPr>
+            <a:r>
+              <a:rPr lang="en-US" sz="850" b="0" i="0" u="none" strike="noStrike" cap="none">
+                <a:solidFill>
+                  <a:schemeClr val="dk1"/>
+                </a:solidFill>
+                <a:latin typeface="Courier New"/>
+                <a:ea typeface="Courier New"/>
+                <a:cs typeface="Courier New"/>
+                <a:sym typeface="Courier New"/>
+              </a:rPr>
+              <a:t>        +--rw symptom_id    yang:uuid</a:t>
+            </a:r>
+            <a:endParaRPr sz="850" b="0" i="0" u="none" strike="noStrike" cap="none">
+              <a:solidFill>
+                <a:schemeClr val="dk1"/>
+              </a:solidFill>
+              <a:latin typeface="Courier New"/>
+              <a:ea typeface="Courier New"/>
+              <a:cs typeface="Courier New"/>
+              <a:sym typeface="Courier New"/>
+            </a:endParaRPr>
+          </a:p>
+        </p:txBody>
+      </p:sp>
+      <p:sp>
+        <p:nvSpPr>
+          <p:cNvPr id="227" name="Google Shape;227;p9"/>
+          <p:cNvSpPr txBox="1">
+            <a:spLocks noGrp="1"/>
+          </p:cNvSpPr>
+          <p:nvPr>
+            <p:ph type="body" idx="1"/>
+          </p:nvPr>
+        </p:nvSpPr>
+        <p:spPr>
+          <a:xfrm>
+            <a:off x="6193410" y="1929384"/>
+            <a:ext cx="5229402" cy="3823716"/>
+          </a:xfrm>
+          <a:prstGeom prst="rect">
+            <a:avLst/>
+          </a:prstGeom>
+          <a:noFill/>
+          <a:ln>
+            <a:noFill/>
+          </a:ln>
+        </p:spPr>
+        <p:txBody>
+          <a:bodyPr spcFirstLastPara="1" wrap="square" lIns="91425" tIns="45700" rIns="91425" bIns="45700" anchor="t" anchorCtr="0">
+            <a:noAutofit/>
+          </a:bodyPr>
+          <a:lstStyle/>
+          <a:p>
+            <a:pPr marL="228600" lvl="0" indent="-228600" algn="l" rtl="0">
+              <a:lnSpc>
+                <a:spcPct val="90000"/>
+              </a:lnSpc>
+              <a:spcBef>
+                <a:spcPts val="0"/>
+              </a:spcBef>
+              <a:spcAft>
+                <a:spcPts val="0"/>
+              </a:spcAft>
+              <a:buClr>
+                <a:srgbClr val="FF0000"/>
+              </a:buClr>
+              <a:buSzPts val="2000"/>
+              <a:buChar char="•"/>
+            </a:pPr>
+            <a:r>
+              <a:rPr lang="en-US" sz="2000" b="1" dirty="0">
+                <a:solidFill>
+                  <a:srgbClr val="FF0000"/>
+                </a:solidFill>
+              </a:rPr>
+              <a:t>ID and Description</a:t>
+            </a:r>
+            <a:r>
+              <a:rPr lang="en-US" sz="2000" dirty="0"/>
+              <a:t> uniquely identifies the detected network anomaly (as a container of symptoms).</a:t>
+            </a:r>
+            <a:endParaRPr dirty="0"/>
+          </a:p>
+          <a:p>
+            <a:pPr marL="228600" lvl="0" indent="-228600" algn="l" rtl="0">
+              <a:lnSpc>
+                <a:spcPct val="90000"/>
+              </a:lnSpc>
+              <a:spcBef>
+                <a:spcPts val="1000"/>
+              </a:spcBef>
+              <a:spcAft>
+                <a:spcPts val="0"/>
+              </a:spcAft>
+              <a:buClr>
+                <a:srgbClr val="FF0000"/>
+              </a:buClr>
+              <a:buSzPts val="2000"/>
+              <a:buChar char="•"/>
+            </a:pPr>
+            <a:r>
+              <a:rPr lang="en-US" sz="2000" b="1" dirty="0">
+                <a:solidFill>
+                  <a:srgbClr val="FF0000"/>
+                </a:solidFill>
+              </a:rPr>
+              <a:t>Description and State </a:t>
+            </a:r>
+            <a:r>
+              <a:rPr lang="en-US" sz="2000" dirty="0"/>
+              <a:t>provide general information regarding the anomaly and . </a:t>
+            </a:r>
+            <a:endParaRPr dirty="0"/>
+          </a:p>
+          <a:p>
+            <a:pPr marL="228600" lvl="0" indent="-228600" algn="l" rtl="0">
+              <a:lnSpc>
+                <a:spcPct val="90000"/>
+              </a:lnSpc>
+              <a:spcBef>
+                <a:spcPts val="1000"/>
+              </a:spcBef>
+              <a:spcAft>
+                <a:spcPts val="0"/>
+              </a:spcAft>
+              <a:buClr>
+                <a:srgbClr val="FF0000"/>
+              </a:buClr>
+              <a:buSzPts val="2000"/>
+              <a:buChar char="•"/>
+            </a:pPr>
+            <a:r>
+              <a:rPr lang="en-US" sz="2000" b="1" dirty="0">
+                <a:solidFill>
+                  <a:srgbClr val="FF0000"/>
+                </a:solidFill>
+              </a:rPr>
+              <a:t>Annotator </a:t>
+            </a:r>
+            <a:r>
+              <a:rPr lang="en-US" sz="2000" dirty="0"/>
+              <a:t>describes the entity that observed the network anomaly: this can be a human or an algorithm (anomaly detection system). </a:t>
+            </a:r>
+            <a:endParaRPr dirty="0"/>
+          </a:p>
+          <a:p>
+            <a:pPr marL="228600" lvl="0" indent="-228600" algn="l" rtl="0">
+              <a:lnSpc>
+                <a:spcPct val="90000"/>
+              </a:lnSpc>
+              <a:spcBef>
+                <a:spcPts val="1000"/>
+              </a:spcBef>
+              <a:spcAft>
+                <a:spcPts val="0"/>
+              </a:spcAft>
+              <a:buClr>
+                <a:srgbClr val="FF0000"/>
+              </a:buClr>
+              <a:buSzPts val="2000"/>
+              <a:buChar char="•"/>
+            </a:pPr>
+            <a:r>
+              <a:rPr lang="en-US" sz="2000" b="1" dirty="0">
+                <a:solidFill>
+                  <a:srgbClr val="FF0000"/>
+                </a:solidFill>
+              </a:rPr>
+              <a:t>Symptoms </a:t>
+            </a:r>
+            <a:r>
+              <a:rPr lang="en-US" sz="2000" dirty="0"/>
+              <a:t>provides a list of symptoms (based on </a:t>
+            </a:r>
+            <a:r>
+              <a:rPr lang="en-US" sz="2000" dirty="0" err="1"/>
+              <a:t>ietf</a:t>
+            </a:r>
+            <a:r>
+              <a:rPr lang="en-US" sz="2000" dirty="0"/>
+              <a:t>-symptom-metadata) that are part of this network anomaly.</a:t>
+            </a:r>
+            <a:endParaRPr dirty="0"/>
+          </a:p>
+        </p:txBody>
+      </p:sp>
+      <p:sp>
+        <p:nvSpPr>
+          <p:cNvPr id="228" name="Google Shape;228;p9"/>
+          <p:cNvSpPr/>
+          <p:nvPr/>
+        </p:nvSpPr>
+        <p:spPr>
+          <a:xfrm>
+            <a:off x="1063625" y="1810474"/>
+            <a:ext cx="3038400" cy="416400"/>
+          </a:xfrm>
+          <a:prstGeom prst="rect">
+            <a:avLst/>
+          </a:prstGeom>
+          <a:solidFill>
+            <a:schemeClr val="accent6">
+              <a:alpha val="9803"/>
+            </a:schemeClr>
+          </a:solidFill>
+          <a:ln w="25400" cap="flat" cmpd="sng">
+            <a:solidFill>
+              <a:schemeClr val="accent6"/>
+            </a:solidFill>
+            <a:prstDash val="solid"/>
+            <a:miter lim="800000"/>
+            <a:headEnd type="none" w="sm" len="sm"/>
+            <a:tailEnd type="none" w="sm" len="sm"/>
+          </a:ln>
+        </p:spPr>
+        <p:txBody>
+          <a:bodyPr spcFirstLastPara="1" wrap="square" lIns="91425" tIns="45700" rIns="91425" bIns="45700" anchor="ctr" anchorCtr="0">
+            <a:noAutofit/>
+          </a:bodyPr>
+          <a:lstStyle/>
+          <a:p>
+            <a:pPr marL="0" marR="0" lvl="0" indent="0" algn="ctr" rtl="0">
+              <a:spcBef>
+                <a:spcPts val="0"/>
+              </a:spcBef>
+              <a:spcAft>
+                <a:spcPts val="0"/>
+              </a:spcAft>
+              <a:buNone/>
+            </a:pPr>
+            <a:endParaRPr sz="1800" b="0" i="0" u="none" strike="noStrike" cap="none">
+              <a:solidFill>
+                <a:schemeClr val="lt1"/>
+              </a:solidFill>
+              <a:latin typeface="Calibri"/>
+              <a:ea typeface="Calibri"/>
+              <a:cs typeface="Calibri"/>
+              <a:sym typeface="Calibri"/>
+            </a:endParaRPr>
+          </a:p>
+        </p:txBody>
+      </p:sp>
+      <p:cxnSp>
+        <p:nvCxnSpPr>
+          <p:cNvPr id="229" name="Google Shape;229;p9"/>
+          <p:cNvCxnSpPr>
+            <a:stCxn id="228" idx="3"/>
+          </p:cNvCxnSpPr>
+          <p:nvPr/>
+        </p:nvCxnSpPr>
+        <p:spPr>
+          <a:xfrm>
+            <a:off x="4102025" y="2018674"/>
+            <a:ext cx="2091300" cy="90300"/>
+          </a:xfrm>
+          <a:prstGeom prst="straightConnector1">
+            <a:avLst/>
+          </a:prstGeom>
+          <a:noFill/>
+          <a:ln w="25400" cap="flat" cmpd="sng">
+            <a:solidFill>
+              <a:schemeClr val="accent6"/>
+            </a:solidFill>
+            <a:prstDash val="solid"/>
+            <a:miter lim="800000"/>
+            <a:headEnd type="none" w="sm" len="sm"/>
+            <a:tailEnd type="none" w="sm" len="sm"/>
+          </a:ln>
+        </p:spPr>
+      </p:cxnSp>
+      <p:sp>
+        <p:nvSpPr>
+          <p:cNvPr id="230" name="Google Shape;230;p9"/>
+          <p:cNvSpPr txBox="1">
+            <a:spLocks noGrp="1"/>
+          </p:cNvSpPr>
+          <p:nvPr>
+            <p:ph type="sldNum" idx="12"/>
+          </p:nvPr>
+        </p:nvSpPr>
+        <p:spPr>
+          <a:xfrm>
+            <a:off x="11587892" y="6361637"/>
+            <a:ext cx="414251" cy="365125"/>
+          </a:xfrm>
+          <a:prstGeom prst="rect">
+            <a:avLst/>
+          </a:prstGeom>
+          <a:noFill/>
+          <a:ln>
+            <a:noFill/>
+          </a:ln>
+        </p:spPr>
+        <p:txBody>
+          <a:bodyPr spcFirstLastPara="1" wrap="square" lIns="91425" tIns="45700" rIns="91425" bIns="45700" anchor="ctr" anchorCtr="0">
+            <a:noAutofit/>
+          </a:bodyPr>
+          <a:lstStyle/>
+          <a:p>
+            <a:pPr marL="0" lvl="0" indent="0" algn="r" rtl="0">
+              <a:spcBef>
+                <a:spcPts val="0"/>
+              </a:spcBef>
+              <a:spcAft>
+                <a:spcPts val="0"/>
+              </a:spcAft>
+              <a:buNone/>
+            </a:pPr>
+            <a:fld id="{00000000-1234-1234-1234-123412341234}" type="slidenum">
+              <a:rPr lang="en-US" sz="1400"/>
+              <a:t>10</a:t>
+            </a:fld>
+            <a:endParaRPr sz="1400"/>
+          </a:p>
+        </p:txBody>
+      </p:sp>
+      <p:sp>
+        <p:nvSpPr>
+          <p:cNvPr id="231" name="Google Shape;231;p9"/>
+          <p:cNvSpPr txBox="1">
+            <a:spLocks noGrp="1"/>
+          </p:cNvSpPr>
+          <p:nvPr>
+            <p:ph type="title"/>
+          </p:nvPr>
+        </p:nvSpPr>
+        <p:spPr>
+          <a:xfrm>
+            <a:off x="838200" y="365125"/>
+            <a:ext cx="10515600" cy="1325563"/>
+          </a:xfrm>
+          <a:prstGeom prst="rect">
+            <a:avLst/>
+          </a:prstGeom>
+          <a:noFill/>
+          <a:ln>
+            <a:noFill/>
+          </a:ln>
+        </p:spPr>
+        <p:txBody>
+          <a:bodyPr spcFirstLastPara="1" wrap="square" lIns="91425" tIns="45700" rIns="91425" bIns="45700" anchor="ctr" anchorCtr="0">
+            <a:normAutofit/>
+          </a:bodyPr>
+          <a:lstStyle/>
+          <a:p>
+            <a:pPr marL="0" lvl="0" indent="0" algn="l" rtl="0">
+              <a:lnSpc>
+                <a:spcPct val="90000"/>
+              </a:lnSpc>
+              <a:spcBef>
+                <a:spcPts val="0"/>
+              </a:spcBef>
+              <a:spcAft>
+                <a:spcPts val="0"/>
+              </a:spcAft>
+              <a:buClr>
+                <a:schemeClr val="dk1"/>
+              </a:buClr>
+              <a:buSzPts val="2800"/>
+              <a:buFont typeface="Calibri"/>
+              <a:buNone/>
+            </a:pPr>
+            <a:r>
+              <a:rPr lang="en-US" sz="2800" b="1" dirty="0">
+                <a:solidFill>
+                  <a:srgbClr val="FF0000"/>
+                </a:solidFill>
+              </a:rPr>
+              <a:t>Experiment: </a:t>
+            </a:r>
+            <a:r>
+              <a:rPr lang="en-US" sz="2800" b="1" dirty="0"/>
+              <a:t>Network Anomaly Lifecycle</a:t>
+            </a:r>
+            <a:br>
+              <a:rPr lang="en-US" sz="3600" dirty="0"/>
+            </a:br>
+            <a:r>
+              <a:rPr lang="en-US" sz="2700" dirty="0">
+                <a:solidFill>
+                  <a:srgbClr val="AEABAB"/>
+                </a:solidFill>
+              </a:rPr>
+              <a:t>draft-</a:t>
+            </a:r>
+            <a:r>
+              <a:rPr lang="en-US" sz="2700" dirty="0" err="1">
+                <a:solidFill>
+                  <a:srgbClr val="AEABAB"/>
+                </a:solidFill>
+              </a:rPr>
+              <a:t>netana</a:t>
+            </a:r>
+            <a:r>
+              <a:rPr lang="en-US" sz="2700" dirty="0">
+                <a:solidFill>
+                  <a:srgbClr val="AEABAB"/>
+                </a:solidFill>
+              </a:rPr>
+              <a:t>-</a:t>
+            </a:r>
+            <a:r>
+              <a:rPr lang="en-US" sz="2700" dirty="0" err="1">
+                <a:solidFill>
+                  <a:srgbClr val="AEABAB"/>
+                </a:solidFill>
+              </a:rPr>
+              <a:t>nmop</a:t>
+            </a:r>
+            <a:r>
+              <a:rPr lang="en-US" sz="2700" dirty="0">
+                <a:solidFill>
+                  <a:srgbClr val="AEABAB"/>
+                </a:solidFill>
+              </a:rPr>
+              <a:t>-network-anomaly-lifecycle</a:t>
+            </a:r>
+            <a:endParaRPr sz="2700" dirty="0">
+              <a:solidFill>
+                <a:srgbClr val="FF0000"/>
+              </a:solidFill>
+            </a:endParaRPr>
+          </a:p>
+        </p:txBody>
+      </p:sp>
+      <p:sp>
+        <p:nvSpPr>
+          <p:cNvPr id="232" name="Google Shape;232;p9"/>
+          <p:cNvSpPr/>
+          <p:nvPr/>
+        </p:nvSpPr>
+        <p:spPr>
+          <a:xfrm>
+            <a:off x="1063625" y="2506394"/>
+            <a:ext cx="3038475" cy="955944"/>
+          </a:xfrm>
+          <a:prstGeom prst="rect">
+            <a:avLst/>
+          </a:prstGeom>
+          <a:solidFill>
+            <a:schemeClr val="accent4">
+              <a:alpha val="9803"/>
+            </a:schemeClr>
+          </a:solidFill>
+          <a:ln w="25400" cap="flat" cmpd="sng">
+            <a:solidFill>
+              <a:schemeClr val="accent4"/>
+            </a:solidFill>
+            <a:prstDash val="solid"/>
+            <a:miter lim="800000"/>
+            <a:headEnd type="none" w="sm" len="sm"/>
+            <a:tailEnd type="none" w="sm" len="sm"/>
+          </a:ln>
+        </p:spPr>
+        <p:txBody>
+          <a:bodyPr spcFirstLastPara="1" wrap="square" lIns="91425" tIns="45700" rIns="91425" bIns="45700" anchor="ctr" anchorCtr="0">
+            <a:noAutofit/>
+          </a:bodyPr>
+          <a:lstStyle/>
+          <a:p>
+            <a:pPr marL="0" marR="0" lvl="0" indent="0" algn="ctr" rtl="0">
+              <a:spcBef>
+                <a:spcPts val="0"/>
+              </a:spcBef>
+              <a:spcAft>
+                <a:spcPts val="0"/>
+              </a:spcAft>
+              <a:buNone/>
+            </a:pPr>
+            <a:endParaRPr sz="1800" b="0" i="0" u="none" strike="noStrike" cap="none">
+              <a:solidFill>
+                <a:schemeClr val="lt1"/>
+              </a:solidFill>
+              <a:latin typeface="Calibri"/>
+              <a:ea typeface="Calibri"/>
+              <a:cs typeface="Calibri"/>
+              <a:sym typeface="Calibri"/>
+            </a:endParaRPr>
+          </a:p>
+        </p:txBody>
+      </p:sp>
+      <p:cxnSp>
+        <p:nvCxnSpPr>
+          <p:cNvPr id="233" name="Google Shape;233;p9"/>
+          <p:cNvCxnSpPr>
+            <a:stCxn id="232" idx="3"/>
+          </p:cNvCxnSpPr>
+          <p:nvPr/>
+        </p:nvCxnSpPr>
+        <p:spPr>
+          <a:xfrm>
+            <a:off x="4102100" y="2984366"/>
+            <a:ext cx="1993800" cy="716700"/>
+          </a:xfrm>
+          <a:prstGeom prst="straightConnector1">
+            <a:avLst/>
+          </a:prstGeom>
+          <a:noFill/>
+          <a:ln w="25400" cap="flat" cmpd="sng">
+            <a:solidFill>
+              <a:schemeClr val="accent4"/>
+            </a:solidFill>
+            <a:prstDash val="solid"/>
+            <a:miter lim="800000"/>
+            <a:headEnd type="none" w="sm" len="sm"/>
+            <a:tailEnd type="none" w="sm" len="sm"/>
+          </a:ln>
+        </p:spPr>
+      </p:cxnSp>
+      <p:sp>
+        <p:nvSpPr>
+          <p:cNvPr id="234" name="Google Shape;234;p9"/>
+          <p:cNvSpPr/>
+          <p:nvPr/>
+        </p:nvSpPr>
+        <p:spPr>
+          <a:xfrm>
+            <a:off x="1063625" y="3480070"/>
+            <a:ext cx="3038475" cy="287068"/>
+          </a:xfrm>
+          <a:prstGeom prst="rect">
+            <a:avLst/>
+          </a:prstGeom>
+          <a:solidFill>
+            <a:schemeClr val="accent2">
+              <a:alpha val="9803"/>
+            </a:schemeClr>
+          </a:solidFill>
+          <a:ln w="25400" cap="flat" cmpd="sng">
+            <a:solidFill>
+              <a:schemeClr val="accent2"/>
+            </a:solidFill>
+            <a:prstDash val="solid"/>
+            <a:miter lim="800000"/>
+            <a:headEnd type="none" w="sm" len="sm"/>
+            <a:tailEnd type="none" w="sm" len="sm"/>
+          </a:ln>
+        </p:spPr>
+        <p:txBody>
+          <a:bodyPr spcFirstLastPara="1" wrap="square" lIns="91425" tIns="45700" rIns="91425" bIns="45700" anchor="ctr" anchorCtr="0">
+            <a:noAutofit/>
+          </a:bodyPr>
+          <a:lstStyle/>
+          <a:p>
+            <a:pPr marL="0" marR="0" lvl="0" indent="0" algn="ctr" rtl="0">
+              <a:spcBef>
+                <a:spcPts val="0"/>
+              </a:spcBef>
+              <a:spcAft>
+                <a:spcPts val="0"/>
+              </a:spcAft>
+              <a:buNone/>
+            </a:pPr>
+            <a:endParaRPr sz="1800" b="0" i="0" u="none" strike="noStrike" cap="none">
+              <a:solidFill>
+                <a:schemeClr val="lt1"/>
+              </a:solidFill>
+              <a:latin typeface="Calibri"/>
+              <a:ea typeface="Calibri"/>
+              <a:cs typeface="Calibri"/>
+              <a:sym typeface="Calibri"/>
+            </a:endParaRPr>
+          </a:p>
+        </p:txBody>
+      </p:sp>
+      <p:sp>
+        <p:nvSpPr>
+          <p:cNvPr id="235" name="Google Shape;235;p9"/>
+          <p:cNvSpPr/>
+          <p:nvPr/>
+        </p:nvSpPr>
+        <p:spPr>
+          <a:xfrm>
+            <a:off x="1063625" y="2253473"/>
+            <a:ext cx="3038400" cy="241200"/>
+          </a:xfrm>
+          <a:prstGeom prst="rect">
+            <a:avLst/>
+          </a:prstGeom>
+          <a:solidFill>
+            <a:schemeClr val="accent1">
+              <a:alpha val="9803"/>
+            </a:schemeClr>
+          </a:solidFill>
+          <a:ln w="25400" cap="flat" cmpd="sng">
+            <a:solidFill>
+              <a:schemeClr val="accent1"/>
+            </a:solidFill>
+            <a:prstDash val="solid"/>
+            <a:miter lim="800000"/>
+            <a:headEnd type="none" w="sm" len="sm"/>
+            <a:tailEnd type="none" w="sm" len="sm"/>
+          </a:ln>
+        </p:spPr>
+        <p:txBody>
+          <a:bodyPr spcFirstLastPara="1" wrap="square" lIns="91425" tIns="45700" rIns="91425" bIns="45700" anchor="ctr" anchorCtr="0">
+            <a:noAutofit/>
+          </a:bodyPr>
+          <a:lstStyle/>
+          <a:p>
+            <a:pPr marL="0" marR="0" lvl="0" indent="0" algn="ctr" rtl="0">
+              <a:spcBef>
+                <a:spcPts val="0"/>
+              </a:spcBef>
+              <a:spcAft>
+                <a:spcPts val="0"/>
+              </a:spcAft>
+              <a:buNone/>
+            </a:pPr>
+            <a:endParaRPr sz="1800" b="0" i="0" u="none" strike="noStrike" cap="none">
+              <a:solidFill>
+                <a:schemeClr val="lt1"/>
+              </a:solidFill>
+              <a:latin typeface="Calibri"/>
+              <a:ea typeface="Calibri"/>
+              <a:cs typeface="Calibri"/>
+              <a:sym typeface="Calibri"/>
+            </a:endParaRPr>
+          </a:p>
+        </p:txBody>
+      </p:sp>
+      <p:cxnSp>
+        <p:nvCxnSpPr>
+          <p:cNvPr id="236" name="Google Shape;236;p9"/>
+          <p:cNvCxnSpPr>
+            <a:stCxn id="235" idx="3"/>
+          </p:cNvCxnSpPr>
+          <p:nvPr/>
+        </p:nvCxnSpPr>
+        <p:spPr>
+          <a:xfrm>
+            <a:off x="4102025" y="2374073"/>
+            <a:ext cx="2091300" cy="402600"/>
+          </a:xfrm>
+          <a:prstGeom prst="straightConnector1">
+            <a:avLst/>
+          </a:prstGeom>
+          <a:noFill/>
+          <a:ln w="25400" cap="flat" cmpd="sng">
+            <a:solidFill>
+              <a:schemeClr val="accent5"/>
+            </a:solidFill>
+            <a:prstDash val="solid"/>
+            <a:miter lim="800000"/>
+            <a:headEnd type="none" w="sm" len="sm"/>
+            <a:tailEnd type="none" w="sm" len="sm"/>
+          </a:ln>
+        </p:spPr>
+      </p:cxnSp>
+      <p:cxnSp>
+        <p:nvCxnSpPr>
+          <p:cNvPr id="237" name="Google Shape;237;p9"/>
+          <p:cNvCxnSpPr>
+            <a:stCxn id="234" idx="3"/>
+          </p:cNvCxnSpPr>
+          <p:nvPr/>
+        </p:nvCxnSpPr>
+        <p:spPr>
+          <a:xfrm>
+            <a:off x="4102100" y="3623604"/>
+            <a:ext cx="2091300" cy="1082100"/>
+          </a:xfrm>
+          <a:prstGeom prst="straightConnector1">
+            <a:avLst/>
+          </a:prstGeom>
+          <a:noFill/>
+          <a:ln w="25400" cap="flat" cmpd="sng">
+            <a:solidFill>
+              <a:schemeClr val="accent2"/>
+            </a:solidFill>
+            <a:prstDash val="solid"/>
+            <a:miter lim="800000"/>
+            <a:headEnd type="none" w="sm" len="sm"/>
+            <a:tailEnd type="none" w="sm" len="sm"/>
+          </a:ln>
+        </p:spPr>
+      </p:cxnSp>
+    </p:spTree>
+  </p:cSld>
+  <p:clrMapOvr>
+    <a:masterClrMapping/>
+  </p:clrMapOvr>
+</p:sld>
+</file>
+
+<file path=ppt/slides/slide11.xml><?xml version="1.0" encoding="utf-8"?>
 <p:sld xmlns:a="http://schemas.openxmlformats.org/drawingml/2006/main" xmlns:r="http://schemas.openxmlformats.org/officeDocument/2006/relationships" xmlns:p="http://schemas.openxmlformats.org/presentationml/2006/main">
   <p:cSld>
     <p:spTree>
@@ -6553,7 +7789,7 @@
             </a:pPr>
             <a:fld id="{00000000-1234-1234-1234-123412341234}" type="slidenum">
               <a:rPr lang="en-US" sz="1400"/>
-              <a:t>10</a:t>
+              <a:t>11</a:t>
             </a:fld>
             <a:endParaRPr sz="1400"/>
           </a:p>
@@ -7121,7 +8357,7 @@
 </p:sld>
 </file>
 
-<file path=ppt/slides/slide11.xml><?xml version="1.0" encoding="utf-8"?>
+<file path=ppt/slides/slide12.xml><?xml version="1.0" encoding="utf-8"?>
 <p:sld xmlns:a="http://schemas.openxmlformats.org/drawingml/2006/main" xmlns:r="http://schemas.openxmlformats.org/officeDocument/2006/relationships" xmlns:p="http://schemas.openxmlformats.org/presentationml/2006/main">
   <p:cSld>
     <p:spTree>
@@ -7178,7 +8414,7 @@
             </a:pPr>
             <a:fld id="{00000000-1234-1234-1234-123412341234}" type="slidenum">
               <a:rPr lang="en-US" sz="1400"/>
-              <a:t>11</a:t>
+              <a:t>12</a:t>
             </a:fld>
             <a:endParaRPr sz="1400"/>
           </a:p>
@@ -8415,7 +9651,7 @@
 </p:sld>
 </file>
 
-<file path=ppt/slides/slide12.xml><?xml version="1.0" encoding="utf-8"?>
+<file path=ppt/slides/slide13.xml><?xml version="1.0" encoding="utf-8"?>
 <p:sld xmlns:a="http://schemas.openxmlformats.org/drawingml/2006/main" xmlns:r="http://schemas.openxmlformats.org/officeDocument/2006/relationships" xmlns:p="http://schemas.openxmlformats.org/presentationml/2006/main">
   <p:cSld>
     <p:spTree>
@@ -8472,7 +9708,7 @@
             </a:pPr>
             <a:fld id="{00000000-1234-1234-1234-123412341234}" type="slidenum">
               <a:rPr lang="en-US" sz="1400"/>
-              <a:t>12</a:t>
+              <a:t>13</a:t>
             </a:fld>
             <a:endParaRPr sz="1400"/>
           </a:p>
@@ -8534,7 +9770,7 @@
             </a:r>
             <a:r>
               <a:rPr lang="en-US" sz="2800" b="1" dirty="0"/>
-              <a:t>- Cosmos Bright Lights PoC Detail</a:t>
+              <a:t>– PoC Detail and Outlook</a:t>
             </a:r>
             <a:br>
               <a:rPr lang="en-US" sz="3600" dirty="0"/>
@@ -9766,7 +11002,7 @@
 </p:sld>
 </file>
 
-<file path=ppt/slides/slide13.xml><?xml version="1.0" encoding="utf-8"?>
+<file path=ppt/slides/slide14.xml><?xml version="1.0" encoding="utf-8"?>
 <p:sld xmlns:a="http://schemas.openxmlformats.org/drawingml/2006/main" xmlns:r="http://schemas.openxmlformats.org/officeDocument/2006/relationships" xmlns:p="http://schemas.openxmlformats.org/presentationml/2006/main">
   <p:cSld>
     <p:spTree>
@@ -9869,7 +11105,23 @@
             </a:pPr>
             <a:r>
               <a:rPr lang="en-US" sz="1700" b="1" dirty="0"/>
-              <a:t>Status of draft-netana-nmop-network-anomaly-architecture-00</a:t>
+              <a:t>Status of draft-</a:t>
+            </a:r>
+            <a:r>
+              <a:rPr lang="en-US" sz="1700" b="1" dirty="0" err="1"/>
+              <a:t>netana</a:t>
+            </a:r>
+            <a:r>
+              <a:rPr lang="en-US" sz="1700" b="1" dirty="0"/>
+              <a:t>-</a:t>
+            </a:r>
+            <a:r>
+              <a:rPr lang="en-US" sz="1700" b="1" dirty="0" err="1"/>
+              <a:t>nmop</a:t>
+            </a:r>
+            <a:r>
+              <a:rPr lang="en-US" sz="1700" b="1" dirty="0"/>
+              <a:t>-network-anomaly-architecture</a:t>
             </a:r>
           </a:p>
           <a:p>
@@ -9880,7 +11132,7 @@
             </a:pPr>
             <a:r>
               <a:rPr lang="en-US" sz="1700" dirty="0"/>
-              <a:t>Initial document published. Requesting feedback from the working group. </a:t>
+              <a:t>Reference document to anchor anomaly detection work items. </a:t>
             </a:r>
           </a:p>
           <a:p>
@@ -9889,7 +11141,39 @@
             </a:pPr>
             <a:r>
               <a:rPr lang="en-US" sz="1700" b="1" dirty="0"/>
-              <a:t>Status of draft-netana-nmop-network-anomaly-semantics-02 and draft-netana-nmop-network-anomaly-lifecycle-03</a:t>
+              <a:t>Status of draft-</a:t>
+            </a:r>
+            <a:r>
+              <a:rPr lang="en-US" sz="1700" b="1" dirty="0" err="1"/>
+              <a:t>netana</a:t>
+            </a:r>
+            <a:r>
+              <a:rPr lang="en-US" sz="1700" b="1" dirty="0"/>
+              <a:t>-</a:t>
+            </a:r>
+            <a:r>
+              <a:rPr lang="en-US" sz="1700" b="1" dirty="0" err="1"/>
+              <a:t>nmop</a:t>
+            </a:r>
+            <a:r>
+              <a:rPr lang="en-US" sz="1700" b="1" dirty="0"/>
+              <a:t>-network-anomaly-semantics and draft-</a:t>
+            </a:r>
+            <a:r>
+              <a:rPr lang="en-US" sz="1700" b="1" dirty="0" err="1"/>
+              <a:t>netana</a:t>
+            </a:r>
+            <a:r>
+              <a:rPr lang="en-US" sz="1700" b="1" dirty="0"/>
+              <a:t>-</a:t>
+            </a:r>
+            <a:r>
+              <a:rPr lang="en-US" sz="1700" b="1" dirty="0" err="1"/>
+              <a:t>nmop</a:t>
+            </a:r>
+            <a:r>
+              <a:rPr lang="en-US" sz="1700" b="1" dirty="0"/>
+              <a:t>-network-anomaly-lifecycle</a:t>
             </a:r>
           </a:p>
           <a:p>
@@ -9903,35 +11187,35 @@
             </a:pPr>
             <a:r>
               <a:rPr lang="en-US" sz="1700" dirty="0"/>
-              <a:t>Referred to </a:t>
+              <a:t>Referenced </a:t>
             </a:r>
             <a:r>
               <a:rPr lang="en-US" sz="1700" dirty="0">
-                <a:hlinkClick r:id="rId2"/>
+                <a:hlinkClick r:id="rId3"/>
               </a:rPr>
               <a:t>draft-</a:t>
             </a:r>
             <a:r>
               <a:rPr lang="en-US" sz="1700" dirty="0" err="1">
-                <a:hlinkClick r:id="rId2"/>
+                <a:hlinkClick r:id="rId3"/>
               </a:rPr>
               <a:t>netana</a:t>
             </a:r>
             <a:r>
               <a:rPr lang="en-US" sz="1700" dirty="0">
-                <a:hlinkClick r:id="rId2"/>
+                <a:hlinkClick r:id="rId3"/>
               </a:rPr>
               <a:t>-</a:t>
             </a:r>
             <a:r>
               <a:rPr lang="en-US" sz="1700" dirty="0" err="1">
-                <a:hlinkClick r:id="rId2"/>
+                <a:hlinkClick r:id="rId3"/>
               </a:rPr>
               <a:t>nmop</a:t>
             </a:r>
             <a:r>
               <a:rPr lang="en-US" sz="1700" dirty="0">
-                <a:hlinkClick r:id="rId2"/>
+                <a:hlinkClick r:id="rId3"/>
               </a:rPr>
               <a:t>-network-anomaly-architecture</a:t>
             </a:r>
@@ -9969,6 +11253,40 @@
             </a:r>
             <a:r>
               <a:rPr lang="en-US" sz="1700" dirty="0">
+                <a:hlinkClick r:id="rId4"/>
+              </a:rPr>
+              <a:t>draft-</a:t>
+            </a:r>
+            <a:r>
+              <a:rPr lang="en-US" sz="1700" dirty="0" err="1">
+                <a:hlinkClick r:id="rId4"/>
+              </a:rPr>
+              <a:t>ietf</a:t>
+            </a:r>
+            <a:r>
+              <a:rPr lang="en-US" sz="1700" dirty="0">
+                <a:hlinkClick r:id="rId4"/>
+              </a:rPr>
+              <a:t>-</a:t>
+            </a:r>
+            <a:r>
+              <a:rPr lang="en-US" sz="1700" dirty="0" err="1">
+                <a:hlinkClick r:id="rId4"/>
+              </a:rPr>
+              <a:t>nmop</a:t>
+            </a:r>
+            <a:r>
+              <a:rPr lang="en-US" sz="1700" dirty="0">
+                <a:hlinkClick r:id="rId4"/>
+              </a:rPr>
+              <a:t>-terminology</a:t>
+            </a:r>
+            <a:r>
+              <a:rPr lang="en-US" sz="1700" dirty="0"/>
+              <a:t> and </a:t>
+            </a:r>
+            <a:r>
+              <a:rPr lang="en-US" sz="1700" dirty="0">
                 <a:hlinkClick r:id="rId3"/>
               </a:rPr>
               <a:t>draft-</a:t>
@@ -9977,7 +11295,7 @@
               <a:rPr lang="en-US" sz="1700" dirty="0" err="1">
                 <a:hlinkClick r:id="rId3"/>
               </a:rPr>
-              <a:t>ietf</a:t>
+              <a:t>netana</a:t>
             </a:r>
             <a:r>
               <a:rPr lang="en-US" sz="1700" dirty="0">
@@ -9995,40 +11313,6 @@
               <a:rPr lang="en-US" sz="1700" dirty="0">
                 <a:hlinkClick r:id="rId3"/>
               </a:rPr>
-              <a:t>-terminology</a:t>
-            </a:r>
-            <a:r>
-              <a:rPr lang="en-US" sz="1700" dirty="0"/>
-              <a:t> and </a:t>
-            </a:r>
-            <a:r>
-              <a:rPr lang="en-US" sz="1700" dirty="0">
-                <a:hlinkClick r:id="rId2"/>
-              </a:rPr>
-              <a:t>draft-</a:t>
-            </a:r>
-            <a:r>
-              <a:rPr lang="en-US" sz="1700" dirty="0" err="1">
-                <a:hlinkClick r:id="rId2"/>
-              </a:rPr>
-              <a:t>netana</a:t>
-            </a:r>
-            <a:r>
-              <a:rPr lang="en-US" sz="1700" dirty="0">
-                <a:hlinkClick r:id="rId2"/>
-              </a:rPr>
-              <a:t>-</a:t>
-            </a:r>
-            <a:r>
-              <a:rPr lang="en-US" sz="1700" dirty="0" err="1">
-                <a:hlinkClick r:id="rId2"/>
-              </a:rPr>
-              <a:t>nmop</a:t>
-            </a:r>
-            <a:r>
-              <a:rPr lang="en-US" sz="1700" dirty="0">
-                <a:hlinkClick r:id="rId2"/>
-              </a:rPr>
               <a:t>-network-anomaly-architecture</a:t>
             </a:r>
             <a:r>
@@ -10051,31 +11335,31 @@
             </a:r>
             <a:r>
               <a:rPr lang="en-US" sz="1700" dirty="0">
-                <a:hlinkClick r:id="rId2"/>
+                <a:hlinkClick r:id="rId3"/>
               </a:rPr>
               <a:t>draft-</a:t>
             </a:r>
             <a:r>
               <a:rPr lang="en-US" sz="1700" dirty="0" err="1">
-                <a:hlinkClick r:id="rId2"/>
+                <a:hlinkClick r:id="rId3"/>
               </a:rPr>
               <a:t>netana</a:t>
             </a:r>
             <a:r>
               <a:rPr lang="en-US" sz="1700" dirty="0">
-                <a:hlinkClick r:id="rId2"/>
+                <a:hlinkClick r:id="rId3"/>
               </a:rPr>
               <a:t>-</a:t>
             </a:r>
             <a:r>
               <a:rPr lang="en-US" sz="1700" dirty="0" err="1">
-                <a:hlinkClick r:id="rId2"/>
+                <a:hlinkClick r:id="rId3"/>
               </a:rPr>
               <a:t>nmop</a:t>
             </a:r>
             <a:r>
               <a:rPr lang="en-US" sz="1700" dirty="0">
-                <a:hlinkClick r:id="rId2"/>
+                <a:hlinkClick r:id="rId3"/>
               </a:rPr>
               <a:t>-network-anomaly-architecture</a:t>
             </a:r>
@@ -10128,9 +11412,45 @@
                 <a:solidFill>
                   <a:srgbClr val="FF0000"/>
                 </a:solidFill>
-                <a:hlinkClick r:id="rId4"/>
-              </a:rPr>
-              <a:t>draft-netana-nmop-network-anomaly-architecture-00</a:t>
+                <a:hlinkClick r:id="rId5"/>
+              </a:rPr>
+              <a:t>draft-</a:t>
+            </a:r>
+            <a:r>
+              <a:rPr lang="en-US" sz="1700" b="1" dirty="0" err="1">
+                <a:solidFill>
+                  <a:srgbClr val="FF0000"/>
+                </a:solidFill>
+                <a:hlinkClick r:id="rId5"/>
+              </a:rPr>
+              <a:t>netana</a:t>
+            </a:r>
+            <a:r>
+              <a:rPr lang="en-US" sz="1700" b="1" dirty="0">
+                <a:solidFill>
+                  <a:srgbClr val="FF0000"/>
+                </a:solidFill>
+                <a:hlinkClick r:id="rId5"/>
+              </a:rPr>
+              <a:t>-</a:t>
+            </a:r>
+            <a:r>
+              <a:rPr lang="en-US" sz="1700" b="1" dirty="0" err="1">
+                <a:solidFill>
+                  <a:srgbClr val="FF0000"/>
+                </a:solidFill>
+                <a:hlinkClick r:id="rId5"/>
+              </a:rPr>
+              <a:t>nmop</a:t>
+            </a:r>
+            <a:r>
+              <a:rPr lang="en-US" sz="1700" b="1" dirty="0">
+                <a:solidFill>
+                  <a:srgbClr val="FF0000"/>
+                </a:solidFill>
+                <a:hlinkClick r:id="rId5"/>
+              </a:rPr>
+              <a:t>-network-anomaly-architecture</a:t>
             </a:r>
             <a:r>
               <a:rPr lang="en-US" sz="1700" b="1" dirty="0">
@@ -10186,6 +11506,19 @@
             <a:r>
               <a:rPr lang="en-US" sz="1700" b="1" dirty="0"/>
               <a:t>Detailing documents, updates and hackathon experiment results</a:t>
+            </a:r>
+          </a:p>
+          <a:p>
+            <a:pPr lvl="1">
+              <a:spcBef>
+                <a:spcPts val="300"/>
+              </a:spcBef>
+              <a:buFont typeface="Wingdings" panose="05000000000000000000" pitchFamily="2" charset="2"/>
+              <a:buChar char="Ø"/>
+            </a:pPr>
+            <a:r>
+              <a:rPr lang="en-US" sz="1700" b="1" dirty="0"/>
+              <a:t>Invite other operators to contribute on experiments</a:t>
             </a:r>
           </a:p>
         </p:txBody>
@@ -10205,7 +11538,7 @@
           <p:nvPr/>
         </p:nvPicPr>
         <p:blipFill>
-          <a:blip r:embed="rId5"/>
+          <a:blip r:embed="rId6"/>
           <a:stretch>
             <a:fillRect/>
           </a:stretch>
@@ -10248,7 +11581,7 @@
           <a:p>
             <a:fld id="{FC4AC485-25DE-431E-B345-9C0A15BB7F8A}" type="slidenum">
               <a:rPr lang="de-CH" sz="1400" smtClean="0"/>
-              <a:t>13</a:t>
+              <a:t>14</a:t>
             </a:fld>
             <a:endParaRPr lang="de-CH" sz="1400" dirty="0"/>
           </a:p>
@@ -10267,7 +11600,7 @@
 </p:sld>
 </file>
 
-<file path=ppt/slides/slide14.xml><?xml version="1.0" encoding="utf-8"?>
+<file path=ppt/slides/slide15.xml><?xml version="1.0" encoding="utf-8"?>
 <p:sld xmlns:a="http://schemas.openxmlformats.org/drawingml/2006/main" xmlns:r="http://schemas.openxmlformats.org/officeDocument/2006/relationships" xmlns:p="http://schemas.openxmlformats.org/presentationml/2006/main">
   <p:cSld>
     <p:spTree>
@@ -10286,112 +11619,48 @@
       </p:grpSpPr>
       <p:sp>
         <p:nvSpPr>
-          <p:cNvPr id="6" name="Slide Number Placeholder 1">
-            <a:extLst>
-              <a:ext uri="{FF2B5EF4-FFF2-40B4-BE49-F238E27FC236}">
-                <a16:creationId xmlns:a16="http://schemas.microsoft.com/office/drawing/2014/main" id="{024DC3B6-499C-4E15-9336-2F15A0DFB843}"/>
-              </a:ext>
-            </a:extLst>
-          </p:cNvPr>
-          <p:cNvSpPr>
+          <p:cNvPr id="124" name="Slide Number Placeholder 1"/>
+          <p:cNvSpPr txBox="1">
             <a:spLocks noGrp="1"/>
           </p:cNvSpPr>
           <p:nvPr>
-            <p:ph type="sldNum" sz="quarter" idx="12"/>
+            <p:ph type="sldNum" sz="quarter" idx="4294967295"/>
           </p:nvPr>
         </p:nvSpPr>
         <p:spPr>
           <a:xfrm>
-            <a:off x="11587892" y="6361637"/>
-            <a:ext cx="414251" cy="365125"/>
+            <a:off x="11807887" y="6403799"/>
+            <a:ext cx="194256" cy="280800"/>
           </a:xfrm>
+          <a:prstGeom prst="rect">
+            <a:avLst/>
+          </a:prstGeom>
+          <a:extLst>
+            <a:ext uri="{C572A759-6A51-4108-AA02-DFA0A04FC94B}">
+              <ma14:wrappingTextBoxFlag xmlns="" xmlns:m="http://schemas.openxmlformats.org/officeDocument/2006/math" xmlns:a14="http://schemas.microsoft.com/office/drawing/2010/main" xmlns:ma14="http://schemas.microsoft.com/office/mac/drawingml/2011/main" val="1"/>
+            </a:ext>
+          </a:extLst>
         </p:spPr>
         <p:txBody>
           <a:bodyPr/>
-          <a:lstStyle/>
-          <a:p>
-            <a:pPr marL="0" marR="0" lvl="0" indent="0" algn="r" defTabSz="914400" rtl="0" eaLnBrk="1" fontAlgn="auto" latinLnBrk="0" hangingPunct="1">
-              <a:lnSpc>
-                <a:spcPct val="100000"/>
-              </a:lnSpc>
-              <a:spcBef>
-                <a:spcPts val="0"/>
-              </a:spcBef>
-              <a:spcAft>
-                <a:spcPts val="0"/>
-              </a:spcAft>
-              <a:buClrTx/>
-              <a:buSzTx/>
-              <a:buFontTx/>
-              <a:buNone/>
-              <a:tabLst/>
-              <a:defRPr/>
-            </a:pPr>
-            <a:fld id="{FC4AC485-25DE-431E-B345-9C0A15BB7F8A}" type="slidenum">
-              <a:rPr kumimoji="0" lang="de-CH" sz="1400" b="0" i="0" u="none" strike="noStrike" kern="1200" cap="none" spc="0" normalizeH="0" baseline="0" noProof="0" smtClean="0">
-                <a:ln>
-                  <a:noFill/>
-                </a:ln>
-                <a:solidFill>
-                  <a:prstClr val="black">
-                    <a:tint val="75000"/>
-                  </a:prstClr>
-                </a:solidFill>
-                <a:effectLst/>
-                <a:uLnTx/>
-                <a:uFillTx/>
-                <a:latin typeface="Calibri" panose="020F0502020204030204"/>
-                <a:ea typeface="+mn-ea"/>
-                <a:cs typeface="+mn-cs"/>
-              </a:rPr>
-              <a:pPr marL="0" marR="0" lvl="0" indent="0" algn="r" defTabSz="914400" rtl="0" eaLnBrk="1" fontAlgn="auto" latinLnBrk="0" hangingPunct="1">
-                <a:lnSpc>
-                  <a:spcPct val="100000"/>
-                </a:lnSpc>
-                <a:spcBef>
-                  <a:spcPts val="0"/>
-                </a:spcBef>
-                <a:spcAft>
-                  <a:spcPts val="0"/>
-                </a:spcAft>
-                <a:buClrTx/>
-                <a:buSzTx/>
-                <a:buFontTx/>
-                <a:buNone/>
-                <a:tabLst/>
-                <a:defRPr/>
-              </a:pPr>
-              <a:t>14</a:t>
+          <a:lstStyle>
+            <a:lvl1pPr>
+              <a:defRPr sz="1400"/>
+            </a:lvl1pPr>
+          </a:lstStyle>
+          <a:p>
+            <a:fld id="{86CB4B4D-7CA3-9044-876B-883B54F8677D}" type="slidenum">
+              <a:rPr/>
+              <a:t>15</a:t>
             </a:fld>
-            <a:endParaRPr kumimoji="0" lang="de-CH" sz="1400" b="0" i="0" u="none" strike="noStrike" kern="1200" cap="none" spc="0" normalizeH="0" baseline="0" noProof="0" dirty="0">
-              <a:ln>
-                <a:noFill/>
-              </a:ln>
-              <a:solidFill>
-                <a:prstClr val="black">
-                  <a:tint val="75000"/>
-                </a:prstClr>
-              </a:solidFill>
-              <a:effectLst/>
-              <a:uLnTx/>
-              <a:uFillTx/>
-              <a:latin typeface="Calibri" panose="020F0502020204030204"/>
-              <a:ea typeface="+mn-ea"/>
-              <a:cs typeface="+mn-cs"/>
-            </a:endParaRPr>
+            <a:endParaRPr/>
           </a:p>
         </p:txBody>
       </p:sp>
       <p:sp>
         <p:nvSpPr>
-          <p:cNvPr id="19" name="Title 1">
-            <a:extLst>
-              <a:ext uri="{FF2B5EF4-FFF2-40B4-BE49-F238E27FC236}">
-                <a16:creationId xmlns:a16="http://schemas.microsoft.com/office/drawing/2014/main" id="{56D79134-17A9-8BC8-B7D0-97BCFFB9A6B2}"/>
-              </a:ext>
-            </a:extLst>
-          </p:cNvPr>
-          <p:cNvSpPr>
+          <p:cNvPr id="125" name="Title 1"/>
+          <p:cNvSpPr txBox="1">
             <a:spLocks noGrp="1"/>
           </p:cNvSpPr>
           <p:nvPr>
@@ -10400,405 +11669,289 @@
         </p:nvSpPr>
         <p:spPr>
           <a:xfrm>
-            <a:off x="838200" y="365125"/>
-            <a:ext cx="10515600" cy="1325563"/>
+            <a:off x="838200" y="276225"/>
+            <a:ext cx="10515600" cy="859757"/>
           </a:xfrm>
+          <a:prstGeom prst="rect">
+            <a:avLst/>
+          </a:prstGeom>
         </p:spPr>
         <p:txBody>
-          <a:bodyPr>
-            <a:normAutofit/>
-          </a:bodyPr>
-          <a:lstStyle/>
-          <a:p>
-            <a:r>
-              <a:rPr lang="en-US" sz="2800" b="1" dirty="0"/>
+          <a:bodyPr/>
+          <a:lstStyle>
+            <a:lvl1pPr>
+              <a:defRPr sz="2800"/>
+            </a:lvl1pPr>
+          </a:lstStyle>
+          <a:p>
+            <a:r>
               <a:t>Relevant Papers for more Details</a:t>
             </a:r>
-            <a:endParaRPr lang="en-US" sz="2700" dirty="0">
-              <a:solidFill>
-                <a:srgbClr val="FF0000"/>
-              </a:solidFill>
-            </a:endParaRPr>
           </a:p>
         </p:txBody>
       </p:sp>
       <p:sp>
         <p:nvSpPr>
-          <p:cNvPr id="4" name="TextBox 3">
-            <a:extLst>
-              <a:ext uri="{FF2B5EF4-FFF2-40B4-BE49-F238E27FC236}">
-                <a16:creationId xmlns:a16="http://schemas.microsoft.com/office/drawing/2014/main" id="{279CCA46-54CC-70D9-B2CA-4E872F0A18BD}"/>
-              </a:ext>
-            </a:extLst>
-          </p:cNvPr>
+          <p:cNvPr id="126" name="TextBox 3"/>
           <p:cNvSpPr txBox="1"/>
           <p:nvPr/>
         </p:nvSpPr>
         <p:spPr>
           <a:xfrm>
-            <a:off x="6777879" y="5422918"/>
-            <a:ext cx="4746153" cy="1877437"/>
+            <a:off x="6711814" y="5319923"/>
+            <a:ext cx="4878284" cy="1869788"/>
           </a:xfrm>
           <a:prstGeom prst="rect">
             <a:avLst/>
           </a:prstGeom>
-          <a:noFill/>
+          <a:ln w="12700">
+            <a:miter lim="400000"/>
+          </a:ln>
+          <a:extLst>
+            <a:ext uri="{C572A759-6A51-4108-AA02-DFA0A04FC94B}">
+              <ma14:wrappingTextBoxFlag xmlns="" xmlns:m="http://schemas.openxmlformats.org/officeDocument/2006/math" xmlns:a14="http://schemas.microsoft.com/office/drawing/2010/main" xmlns:ma14="http://schemas.microsoft.com/office/mac/drawingml/2011/main" val="1"/>
+            </a:ext>
+          </a:extLst>
         </p:spPr>
         <p:txBody>
-          <a:bodyPr wrap="square">
+          <a:bodyPr lIns="45719" rIns="45719">
             <a:spAutoFit/>
           </a:bodyPr>
           <a:lstStyle/>
           <a:p>
-            <a:pPr algn="ctr"/>
-            <a:r>
-              <a:rPr lang="en-GB" sz="1600" dirty="0">
+            <a:pPr algn="ctr">
+              <a:defRPr sz="1600">
                 <a:solidFill>
                   <a:srgbClr val="595959"/>
                 </a:solidFill>
-                <a:latin typeface="Lato" panose="020F0502020204030203" pitchFamily="34" charset="0"/>
-              </a:rPr>
+                <a:latin typeface="Lato"/>
+                <a:ea typeface="Lato"/>
+                <a:cs typeface="Lato"/>
+                <a:sym typeface="Lato"/>
+              </a:defRPr>
+            </a:pPr>
+            <a:r>
               <a:t>Paper “</a:t>
             </a:r>
             <a:r>
-              <a:rPr lang="en-GB" sz="1600" b="1" dirty="0">
+              <a:rPr b="1">
                 <a:solidFill>
                   <a:srgbClr val="FF0000"/>
                 </a:solidFill>
-                <a:latin typeface="Lato" panose="020F0502020204030203" pitchFamily="34" charset="0"/>
               </a:rPr>
               <a:t>Daisy: Practical Anomaly Detection in large BGP/MPLS and BGP/SRv6 VPN Networks</a:t>
             </a:r>
             <a:r>
-              <a:rPr lang="en-GB" sz="1600" dirty="0">
-                <a:solidFill>
-                  <a:srgbClr val="595959"/>
-                </a:solidFill>
-                <a:latin typeface="Lato" panose="020F0502020204030203" pitchFamily="34" charset="0"/>
-              </a:rPr>
               <a:t>” </a:t>
             </a:r>
             <a:r>
-              <a:rPr lang="en-GB" sz="1600" dirty="0">
-                <a:solidFill>
-                  <a:schemeClr val="bg2">
-                    <a:lumMod val="75000"/>
-                  </a:schemeClr>
-                </a:solidFill>
+              <a:rPr>
+                <a:solidFill>
+                  <a:srgbClr val="AFABAB"/>
+                </a:solidFill>
+                <a:latin typeface="+mj-lt"/>
+                <a:ea typeface="+mj-ea"/>
+                <a:cs typeface="+mj-cs"/>
+                <a:sym typeface="Calibri"/>
               </a:rPr>
               <a:t>published at ACM/IRTF ANRW’23  </a:t>
             </a:r>
           </a:p>
           <a:p>
-            <a:pPr algn="ctr"/>
-            <a:r>
-              <a:rPr lang="en-GB" sz="1600" dirty="0">
-                <a:solidFill>
-                  <a:schemeClr val="bg2">
-                    <a:lumMod val="75000"/>
-                  </a:schemeClr>
-                </a:solidFill>
-              </a:rPr>
+            <a:pPr algn="ctr">
+              <a:defRPr sz="1600">
+                <a:solidFill>
+                  <a:srgbClr val="AFABAB"/>
+                </a:solidFill>
+              </a:defRPr>
+            </a:pPr>
+            <a:r>
               <a:t>San Francisco, USA (24 July 2023)</a:t>
             </a:r>
           </a:p>
           <a:p>
-            <a:pPr algn="ctr"/>
-            <a:r>
-              <a:rPr lang="en-GB" sz="1600" dirty="0">
-                <a:solidFill>
-                  <a:schemeClr val="bg2">
-                    <a:lumMod val="75000"/>
-                  </a:schemeClr>
-                </a:solidFill>
-              </a:rPr>
+            <a:pPr algn="ctr">
+              <a:defRPr sz="1600">
+                <a:solidFill>
+                  <a:srgbClr val="AFABAB"/>
+                </a:solidFill>
+              </a:defRPr>
+            </a:pPr>
+            <a:r>
               <a:t>Open access: </a:t>
             </a:r>
             <a:r>
-              <a:rPr lang="en-GB" sz="1600" dirty="0">
-                <a:solidFill>
-                  <a:schemeClr val="bg2">
-                    <a:lumMod val="75000"/>
-                  </a:schemeClr>
-                </a:solidFill>
-                <a:hlinkClick r:id="rId3">
-                  <a:extLst>
-                    <a:ext uri="{A12FA001-AC4F-418D-AE19-62706E023703}">
-                      <ahyp:hlinkClr xmlns:ahyp="http://schemas.microsoft.com/office/drawing/2018/hyperlinkcolor" val="tx"/>
-                    </a:ext>
-                  </a:extLst>
-                </a:hlinkClick>
+              <a:rPr u="sng">
+                <a:solidFill>
+                  <a:srgbClr val="0563C1"/>
+                </a:solidFill>
+                <a:uFill>
+                  <a:solidFill>
+                    <a:srgbClr val="0563C1"/>
+                  </a:solidFill>
+                </a:uFill>
+                <a:hlinkClick r:id="rId2"/>
               </a:rPr>
               <a:t>http://hal.science/hal-04307611</a:t>
             </a:r>
             <a:r>
-              <a:rPr lang="en-GB" sz="1600" dirty="0">
-                <a:solidFill>
-                  <a:schemeClr val="bg2">
-                    <a:lumMod val="75000"/>
-                  </a:schemeClr>
-                </a:solidFill>
-              </a:rPr>
               <a:t> </a:t>
             </a:r>
           </a:p>
           <a:p>
-            <a:br>
-              <a:rPr lang="en-GB" dirty="0"/>
-            </a:br>
-            <a:endParaRPr lang="en-CH" dirty="0"/>
+            <a:br/>
+            <a:endParaRPr/>
           </a:p>
         </p:txBody>
       </p:sp>
       <p:sp>
         <p:nvSpPr>
-          <p:cNvPr id="8" name="TextBox 7">
-            <a:extLst>
-              <a:ext uri="{FF2B5EF4-FFF2-40B4-BE49-F238E27FC236}">
-                <a16:creationId xmlns:a16="http://schemas.microsoft.com/office/drawing/2014/main" id="{84DD77D7-EFA0-3B7E-AB08-B58948BB11B6}"/>
-              </a:ext>
-            </a:extLst>
-          </p:cNvPr>
+          <p:cNvPr id="127" name="TextBox 7"/>
           <p:cNvSpPr txBox="1"/>
           <p:nvPr/>
         </p:nvSpPr>
         <p:spPr>
           <a:xfrm>
-            <a:off x="1246023" y="5169986"/>
-            <a:ext cx="4672864" cy="1569660"/>
+            <a:off x="966381" y="5285332"/>
+            <a:ext cx="5547593" cy="1291194"/>
           </a:xfrm>
           <a:prstGeom prst="rect">
             <a:avLst/>
           </a:prstGeom>
-          <a:noFill/>
+          <a:ln w="12700">
+            <a:miter lim="400000"/>
+          </a:ln>
+          <a:extLst>
+            <a:ext uri="{C572A759-6A51-4108-AA02-DFA0A04FC94B}">
+              <ma14:wrappingTextBoxFlag xmlns="" xmlns:m="http://schemas.openxmlformats.org/officeDocument/2006/math" xmlns:a14="http://schemas.microsoft.com/office/drawing/2010/main" xmlns:ma14="http://schemas.microsoft.com/office/mac/drawingml/2011/main" val="1"/>
+            </a:ext>
+          </a:extLst>
         </p:spPr>
         <p:txBody>
-          <a:bodyPr wrap="square">
+          <a:bodyPr lIns="45719" rIns="45719">
             <a:spAutoFit/>
           </a:bodyPr>
           <a:lstStyle/>
           <a:p>
-            <a:pPr algn="ctr" rtl="0">
-              <a:spcBef>
-                <a:spcPts val="0"/>
-              </a:spcBef>
-              <a:spcAft>
-                <a:spcPts val="0"/>
-              </a:spcAft>
+            <a:pPr algn="ctr">
+              <a:defRPr sz="1600">
+                <a:solidFill>
+                  <a:srgbClr val="595959"/>
+                </a:solidFill>
+                <a:latin typeface="Lato"/>
+                <a:ea typeface="Lato"/>
+                <a:cs typeface="Lato"/>
+                <a:sym typeface="Lato"/>
+              </a:defRPr>
             </a:pPr>
             <a:r>
-              <a:rPr lang="en-GB" sz="1600" b="0" i="0" u="none" strike="noStrike" dirty="0">
-                <a:solidFill>
-                  <a:srgbClr val="595959"/>
-                </a:solidFill>
-                <a:effectLst/>
-                <a:latin typeface="Lato" panose="020F0502020204030203" pitchFamily="34" charset="0"/>
-              </a:rPr>
               <a:t>Paper “</a:t>
             </a:r>
             <a:r>
-              <a:rPr lang="en-GB" sz="1600" b="1" i="0" u="none" strike="noStrike" dirty="0">
+              <a:rPr b="1">
                 <a:solidFill>
                   <a:srgbClr val="FF0000"/>
                 </a:solidFill>
-                <a:effectLst/>
-                <a:latin typeface="Lato" panose="020F0502020204030203" pitchFamily="34" charset="0"/>
               </a:rPr>
               <a:t>Practical Anomaly Detection in Internet Services: An ISP centric approach</a:t>
             </a:r>
             <a:r>
-              <a:rPr lang="en-GB" sz="1600" b="0" i="0" u="none" strike="noStrike" dirty="0">
-                <a:solidFill>
-                  <a:srgbClr val="595959"/>
-                </a:solidFill>
-                <a:effectLst/>
-                <a:latin typeface="Lato" panose="020F0502020204030203" pitchFamily="34" charset="0"/>
-              </a:rPr>
               <a:t>” </a:t>
             </a:r>
           </a:p>
           <a:p>
-            <a:pPr algn="ctr" rtl="0">
-              <a:spcBef>
-                <a:spcPts val="0"/>
-              </a:spcBef>
-              <a:spcAft>
-                <a:spcPts val="0"/>
-              </a:spcAft>
+            <a:pPr algn="ctr">
+              <a:defRPr sz="1600">
+                <a:solidFill>
+                  <a:srgbClr val="AFABAB"/>
+                </a:solidFill>
+              </a:defRPr>
             </a:pPr>
             <a:r>
-              <a:rPr lang="en-GB" sz="1600" dirty="0">
-                <a:solidFill>
-                  <a:schemeClr val="bg2">
-                    <a:lumMod val="75000"/>
-                  </a:schemeClr>
-                </a:solidFill>
-              </a:rPr>
-              <a:t>accepted at AnNet’24 </a:t>
-            </a:r>
-          </a:p>
-          <a:p>
-            <a:pPr algn="ctr" rtl="0">
-              <a:spcBef>
-                <a:spcPts val="0"/>
-              </a:spcBef>
-              <a:spcAft>
-                <a:spcPts val="0"/>
-              </a:spcAft>
+              <a:t>Published at AnNet Workshop (In conjunction with IEEE NOMS)</a:t>
+            </a:r>
+          </a:p>
+          <a:p>
+            <a:pPr algn="ctr">
+              <a:defRPr sz="1600">
+                <a:solidFill>
+                  <a:srgbClr val="AFABAB"/>
+                </a:solidFill>
+              </a:defRPr>
             </a:pPr>
             <a:r>
-              <a:rPr lang="en-GB" sz="1600" dirty="0">
-                <a:solidFill>
-                  <a:schemeClr val="bg2">
-                    <a:lumMod val="75000"/>
-                  </a:schemeClr>
-                </a:solidFill>
-              </a:rPr>
-              <a:t>(in conjunction with IEEE NOMS’24) </a:t>
-            </a:r>
-          </a:p>
-          <a:p>
-            <a:pPr algn="ctr" rtl="0">
-              <a:spcBef>
-                <a:spcPts val="0"/>
-              </a:spcBef>
-              <a:spcAft>
-                <a:spcPts val="0"/>
-              </a:spcAft>
+              <a:t>Seoul, South Korea (6–10 May 2024)</a:t>
+            </a:r>
+          </a:p>
+          <a:p>
+            <a:pPr algn="ctr">
+              <a:defRPr sz="1600">
+                <a:solidFill>
+                  <a:srgbClr val="AFABAB"/>
+                </a:solidFill>
+              </a:defRPr>
             </a:pPr>
             <a:r>
-              <a:rPr lang="en-GB" sz="1600" dirty="0">
-                <a:solidFill>
-                  <a:schemeClr val="bg2">
-                    <a:lumMod val="75000"/>
-                  </a:schemeClr>
-                </a:solidFill>
-              </a:rPr>
-              <a:t>Seoul, Korea (6–10 May 2024)</a:t>
-            </a:r>
-          </a:p>
-          <a:p>
-            <a:pPr algn="ctr" rtl="0">
-              <a:spcBef>
-                <a:spcPts val="0"/>
-              </a:spcBef>
-              <a:spcAft>
-                <a:spcPts val="0"/>
-              </a:spcAft>
-            </a:pPr>
-            <a:r>
-              <a:rPr lang="en-GB" sz="1600" dirty="0">
-                <a:solidFill>
-                  <a:schemeClr val="bg2">
-                    <a:lumMod val="75000"/>
-                  </a:schemeClr>
-                </a:solidFill>
-              </a:rPr>
-              <a:t>[Will be presented as a poster the May 6th 2024]</a:t>
+              <a:t>DOI: 10.1109/NOMS59830.2024.10575071</a:t>
             </a:r>
           </a:p>
         </p:txBody>
       </p:sp>
       <p:pic>
         <p:nvPicPr>
-          <p:cNvPr id="2052" name="Picture 4">
-            <a:extLst>
-              <a:ext uri="{FF2B5EF4-FFF2-40B4-BE49-F238E27FC236}">
-                <a16:creationId xmlns:a16="http://schemas.microsoft.com/office/drawing/2014/main" id="{7022990C-B30E-1C4B-DB2B-0970BB16BEFD}"/>
-              </a:ext>
-            </a:extLst>
-          </p:cNvPr>
+          <p:cNvPr id="128" name="Picture 6" descr="Picture 6"/>
           <p:cNvPicPr>
-            <a:picLocks noChangeAspect="1" noChangeArrowheads="1"/>
+            <a:picLocks noChangeAspect="1"/>
           </p:cNvPicPr>
           <p:nvPr/>
         </p:nvPicPr>
         <p:blipFill>
-          <a:blip r:embed="rId4">
-            <a:extLst>
-              <a:ext uri="{28A0092B-C50C-407E-A947-70E740481C1C}">
-                <a14:useLocalDpi xmlns:a14="http://schemas.microsoft.com/office/drawing/2010/main" val="0"/>
-              </a:ext>
-            </a:extLst>
-          </a:blip>
-          <a:srcRect/>
+          <a:blip r:embed="rId3"/>
           <a:stretch>
             <a:fillRect/>
           </a:stretch>
         </p:blipFill>
-        <p:spPr bwMode="auto">
+        <p:spPr>
           <a:xfrm>
-            <a:off x="1257375" y="2099749"/>
-            <a:ext cx="4878686" cy="2658502"/>
+            <a:off x="7586136" y="1132392"/>
+            <a:ext cx="3129642" cy="4040661"/>
           </a:xfrm>
           <a:prstGeom prst="rect">
             <a:avLst/>
           </a:prstGeom>
-          <a:noFill/>
-          <a:extLst>
-            <a:ext uri="{909E8E84-426E-40DD-AFC4-6F175D3DCCD1}">
-              <a14:hiddenFill xmlns:a14="http://schemas.microsoft.com/office/drawing/2010/main">
-                <a:solidFill>
-                  <a:srgbClr val="FFFFFF"/>
-                </a:solidFill>
-              </a14:hiddenFill>
-            </a:ext>
-          </a:extLst>
+          <a:ln w="12700">
+            <a:miter lim="400000"/>
+          </a:ln>
         </p:spPr>
       </p:pic>
       <p:pic>
         <p:nvPicPr>
-          <p:cNvPr id="2054" name="Picture 6">
-            <a:extLst>
-              <a:ext uri="{FF2B5EF4-FFF2-40B4-BE49-F238E27FC236}">
-                <a16:creationId xmlns:a16="http://schemas.microsoft.com/office/drawing/2014/main" id="{41A4F91E-8E8C-E756-1039-D2CC2AC865B3}"/>
-              </a:ext>
-            </a:extLst>
-          </p:cNvPr>
+          <p:cNvPr id="129" name="Screenshot 2024-07-21 at 22.41.27.png" descr="Screenshot 2024-07-21 at 22.41.27.png"/>
           <p:cNvPicPr>
-            <a:picLocks noChangeAspect="1" noChangeArrowheads="1"/>
+            <a:picLocks noChangeAspect="1"/>
           </p:cNvPicPr>
           <p:nvPr/>
         </p:nvPicPr>
         <p:blipFill>
-          <a:blip r:embed="rId5">
-            <a:extLst>
-              <a:ext uri="{28A0092B-C50C-407E-A947-70E740481C1C}">
-                <a14:useLocalDpi xmlns:a14="http://schemas.microsoft.com/office/drawing/2010/main" val="0"/>
-              </a:ext>
-            </a:extLst>
-          </a:blip>
-          <a:srcRect/>
+          <a:blip r:embed="rId4"/>
           <a:stretch>
             <a:fillRect/>
           </a:stretch>
         </p:blipFill>
-        <p:spPr bwMode="auto">
+        <p:spPr>
           <a:xfrm>
-            <a:off x="7586136" y="1129326"/>
-            <a:ext cx="3129641" cy="4040660"/>
+            <a:off x="2216696" y="1188060"/>
+            <a:ext cx="3046964" cy="3929324"/>
           </a:xfrm>
           <a:prstGeom prst="rect">
             <a:avLst/>
           </a:prstGeom>
-          <a:noFill/>
-          <a:extLst>
-            <a:ext uri="{909E8E84-426E-40DD-AFC4-6F175D3DCCD1}">
-              <a14:hiddenFill xmlns:a14="http://schemas.microsoft.com/office/drawing/2010/main">
-                <a:solidFill>
-                  <a:srgbClr val="FFFFFF"/>
-                </a:solidFill>
-              </a14:hiddenFill>
-            </a:ext>
-          </a:extLst>
+          <a:ln w="12700">
+            <a:miter lim="400000"/>
+          </a:ln>
         </p:spPr>
       </p:pic>
     </p:spTree>
-    <p:extLst>
-      <p:ext uri="{BB962C8B-B14F-4D97-AF65-F5344CB8AC3E}">
-        <p14:creationId xmlns:p14="http://schemas.microsoft.com/office/powerpoint/2010/main" val="663711217"/>
-      </p:ext>
-    </p:extLst>
   </p:cSld>
   <p:clrMapOvr>
     <a:masterClrMapping/>
@@ -10849,6 +12002,398 @@
           <a:bodyPr/>
           <a:lstStyle/>
           <a:p>
+            <a:fld id="{FC4AC485-25DE-431E-B345-9C0A15BB7F8A}" type="slidenum">
+              <a:rPr lang="de-CH" sz="1400" smtClean="0"/>
+              <a:t>2</a:t>
+            </a:fld>
+            <a:endParaRPr lang="de-CH" sz="1400" dirty="0"/>
+          </a:p>
+        </p:txBody>
+      </p:sp>
+      <p:sp>
+        <p:nvSpPr>
+          <p:cNvPr id="5" name="Inhaltsplatzhalter 2">
+            <a:extLst>
+              <a:ext uri="{FF2B5EF4-FFF2-40B4-BE49-F238E27FC236}">
+                <a16:creationId xmlns:a16="http://schemas.microsoft.com/office/drawing/2014/main" id="{0194B37B-813A-99FE-7B78-4D87D8C30D44}"/>
+              </a:ext>
+            </a:extLst>
+          </p:cNvPr>
+          <p:cNvSpPr txBox="1">
+            <a:spLocks/>
+          </p:cNvSpPr>
+          <p:nvPr/>
+        </p:nvSpPr>
+        <p:spPr bwMode="black">
+          <a:xfrm>
+            <a:off x="961533" y="2011679"/>
+            <a:ext cx="4982067" cy="4171630"/>
+          </a:xfrm>
+          <a:prstGeom prst="rect">
+            <a:avLst/>
+          </a:prstGeom>
+        </p:spPr>
+        <p:txBody>
+          <a:bodyPr wrap="square" lIns="0" tIns="0" rIns="0" bIns="0"/>
+          <a:lstStyle>
+            <a:lvl1pPr marL="0" indent="0" algn="l" defTabSz="914400" rtl="0" eaLnBrk="1" latinLnBrk="0" hangingPunct="1">
+              <a:lnSpc>
+                <a:spcPct val="110000"/>
+              </a:lnSpc>
+              <a:spcBef>
+                <a:spcPts val="600"/>
+              </a:spcBef>
+              <a:spcAft>
+                <a:spcPts val="600"/>
+              </a:spcAft>
+              <a:buFont typeface="Arial" panose="020B0604020202020204" pitchFamily="34" charset="0"/>
+              <a:buNone/>
+              <a:defRPr sz="2000" b="0" kern="1200">
+                <a:solidFill>
+                  <a:schemeClr val="tx1"/>
+                </a:solidFill>
+                <a:latin typeface="+mn-lt"/>
+                <a:ea typeface="+mn-ea"/>
+                <a:cs typeface="+mn-cs"/>
+              </a:defRPr>
+            </a:lvl1pPr>
+            <a:lvl2pPr marL="216000" indent="-216000" algn="l" defTabSz="914400" rtl="0" eaLnBrk="1" latinLnBrk="0" hangingPunct="1">
+              <a:lnSpc>
+                <a:spcPct val="110000"/>
+              </a:lnSpc>
+              <a:spcBef>
+                <a:spcPts val="200"/>
+              </a:spcBef>
+              <a:spcAft>
+                <a:spcPts val="200"/>
+              </a:spcAft>
+              <a:buFont typeface="Arial" panose="020B0604020202020204" pitchFamily="34" charset="0"/>
+              <a:buChar char="•"/>
+              <a:defRPr sz="2000" kern="1200">
+                <a:solidFill>
+                  <a:schemeClr val="tx1"/>
+                </a:solidFill>
+                <a:latin typeface="+mn-lt"/>
+                <a:ea typeface="+mn-ea"/>
+                <a:cs typeface="+mn-cs"/>
+              </a:defRPr>
+            </a:lvl2pPr>
+            <a:lvl3pPr marL="504000" indent="-288000" algn="l" defTabSz="914400" rtl="0" eaLnBrk="1" latinLnBrk="0" hangingPunct="1">
+              <a:lnSpc>
+                <a:spcPct val="110000"/>
+              </a:lnSpc>
+              <a:spcBef>
+                <a:spcPts val="200"/>
+              </a:spcBef>
+              <a:spcAft>
+                <a:spcPts val="200"/>
+              </a:spcAft>
+              <a:buFont typeface="TheSans Swisscom Light" panose="020B0300040303060204" pitchFamily="34" charset="0"/>
+              <a:buChar char="−"/>
+              <a:defRPr sz="2000" kern="1200">
+                <a:solidFill>
+                  <a:schemeClr val="tx1"/>
+                </a:solidFill>
+                <a:latin typeface="+mn-lt"/>
+                <a:ea typeface="+mn-ea"/>
+                <a:cs typeface="+mn-cs"/>
+              </a:defRPr>
+            </a:lvl3pPr>
+            <a:lvl4pPr marL="792000" indent="-288000" algn="l" defTabSz="914400" rtl="0" eaLnBrk="1" latinLnBrk="0" hangingPunct="1">
+              <a:lnSpc>
+                <a:spcPct val="110000"/>
+              </a:lnSpc>
+              <a:spcBef>
+                <a:spcPts val="200"/>
+              </a:spcBef>
+              <a:spcAft>
+                <a:spcPts val="200"/>
+              </a:spcAft>
+              <a:buFont typeface="TheSans Swisscom Light" panose="020B0300040303060204" pitchFamily="34" charset="0"/>
+              <a:buChar char="−"/>
+              <a:defRPr sz="2000" kern="1200">
+                <a:solidFill>
+                  <a:schemeClr val="tx1"/>
+                </a:solidFill>
+                <a:latin typeface="+mn-lt"/>
+                <a:ea typeface="+mn-ea"/>
+                <a:cs typeface="+mn-cs"/>
+              </a:defRPr>
+            </a:lvl4pPr>
+            <a:lvl5pPr marL="792000" indent="-288000" algn="l" defTabSz="914400" rtl="0" eaLnBrk="1" latinLnBrk="0" hangingPunct="1">
+              <a:lnSpc>
+                <a:spcPct val="110000"/>
+              </a:lnSpc>
+              <a:spcBef>
+                <a:spcPts val="200"/>
+              </a:spcBef>
+              <a:spcAft>
+                <a:spcPts val="200"/>
+              </a:spcAft>
+              <a:buFont typeface="TheSans Swisscom Light" panose="020B0300040303060204" pitchFamily="34" charset="0"/>
+              <a:buChar char="−"/>
+              <a:defRPr sz="2000" kern="1200">
+                <a:solidFill>
+                  <a:schemeClr val="tx1"/>
+                </a:solidFill>
+                <a:latin typeface="+mn-lt"/>
+                <a:ea typeface="+mn-ea"/>
+                <a:cs typeface="+mn-cs"/>
+              </a:defRPr>
+            </a:lvl5pPr>
+            <a:lvl6pPr marL="792000" indent="-288000" algn="l" defTabSz="914400" rtl="0" eaLnBrk="1" latinLnBrk="0" hangingPunct="1">
+              <a:lnSpc>
+                <a:spcPct val="110000"/>
+              </a:lnSpc>
+              <a:spcBef>
+                <a:spcPts val="200"/>
+              </a:spcBef>
+              <a:spcAft>
+                <a:spcPts val="200"/>
+              </a:spcAft>
+              <a:buFont typeface="TheSans Swisscom Light" panose="020B0300040303060204" pitchFamily="34" charset="0"/>
+              <a:buChar char="−"/>
+              <a:defRPr sz="2000" kern="1200">
+                <a:solidFill>
+                  <a:schemeClr val="tx1"/>
+                </a:solidFill>
+                <a:latin typeface="+mn-lt"/>
+                <a:ea typeface="+mn-ea"/>
+                <a:cs typeface="+mn-cs"/>
+              </a:defRPr>
+            </a:lvl6pPr>
+            <a:lvl7pPr marL="792000" indent="-288000" algn="l" defTabSz="914400" rtl="0" eaLnBrk="1" latinLnBrk="0" hangingPunct="1">
+              <a:lnSpc>
+                <a:spcPct val="110000"/>
+              </a:lnSpc>
+              <a:spcBef>
+                <a:spcPts val="200"/>
+              </a:spcBef>
+              <a:spcAft>
+                <a:spcPts val="200"/>
+              </a:spcAft>
+              <a:buFont typeface="TheSans Swisscom Light" panose="020B0300040303060204" pitchFamily="34" charset="0"/>
+              <a:buChar char="−"/>
+              <a:defRPr sz="2000" kern="1200">
+                <a:solidFill>
+                  <a:schemeClr val="tx1"/>
+                </a:solidFill>
+                <a:latin typeface="+mn-lt"/>
+                <a:ea typeface="+mn-ea"/>
+                <a:cs typeface="+mn-cs"/>
+              </a:defRPr>
+            </a:lvl7pPr>
+            <a:lvl8pPr marL="792000" indent="-288000" algn="l" defTabSz="914400" rtl="0" eaLnBrk="1" latinLnBrk="0" hangingPunct="1">
+              <a:lnSpc>
+                <a:spcPct val="110000"/>
+              </a:lnSpc>
+              <a:spcBef>
+                <a:spcPts val="200"/>
+              </a:spcBef>
+              <a:spcAft>
+                <a:spcPts val="200"/>
+              </a:spcAft>
+              <a:buFont typeface="TheSans Swisscom Light" panose="020B0300040303060204" pitchFamily="34" charset="0"/>
+              <a:buChar char="−"/>
+              <a:defRPr sz="2000" kern="1200">
+                <a:solidFill>
+                  <a:schemeClr val="tx1"/>
+                </a:solidFill>
+                <a:latin typeface="+mn-lt"/>
+                <a:ea typeface="+mn-ea"/>
+                <a:cs typeface="+mn-cs"/>
+              </a:defRPr>
+            </a:lvl8pPr>
+            <a:lvl9pPr marL="792000" indent="-288000" algn="l" defTabSz="914400" rtl="0" eaLnBrk="1" latinLnBrk="0" hangingPunct="1">
+              <a:lnSpc>
+                <a:spcPct val="110000"/>
+              </a:lnSpc>
+              <a:spcBef>
+                <a:spcPts val="200"/>
+              </a:spcBef>
+              <a:spcAft>
+                <a:spcPts val="200"/>
+              </a:spcAft>
+              <a:buFont typeface="TheSans Swisscom Light" panose="020B0300040303060204" pitchFamily="34" charset="0"/>
+              <a:buChar char="−"/>
+              <a:defRPr sz="2000" kern="1200">
+                <a:solidFill>
+                  <a:schemeClr val="tx1"/>
+                </a:solidFill>
+                <a:latin typeface="+mn-lt"/>
+                <a:ea typeface="+mn-ea"/>
+                <a:cs typeface="+mn-cs"/>
+              </a:defRPr>
+            </a:lvl9pPr>
+          </a:lstStyle>
+          <a:p>
+            <a:pPr marL="342900" indent="-342900">
+              <a:buFont typeface="Wingdings" panose="05000000000000000000" pitchFamily="2" charset="2"/>
+              <a:buChar char="Ø"/>
+            </a:pPr>
+            <a:r>
+              <a:rPr lang="en-US" dirty="0"/>
+              <a:t>This document describes motivation and a generic and extensible architecture of a Network Anomaly Detection Framework.</a:t>
+            </a:r>
+          </a:p>
+          <a:p>
+            <a:pPr marL="342900" indent="-342900">
+              <a:buFont typeface="Wingdings" panose="05000000000000000000" pitchFamily="2" charset="2"/>
+              <a:buChar char="Ø"/>
+            </a:pPr>
+            <a:r>
+              <a:rPr lang="en-US" dirty="0"/>
+              <a:t>Anchors draft-</a:t>
+            </a:r>
+            <a:r>
+              <a:rPr lang="en-US" dirty="0" err="1"/>
+              <a:t>netana</a:t>
+            </a:r>
+            <a:r>
+              <a:rPr lang="en-US" dirty="0"/>
+              <a:t>-</a:t>
+            </a:r>
+            <a:r>
+              <a:rPr lang="en-US" dirty="0" err="1"/>
+              <a:t>nmop</a:t>
+            </a:r>
+            <a:r>
+              <a:rPr lang="en-US" dirty="0"/>
+              <a:t>-network-anomaly-semantics and draft-</a:t>
+            </a:r>
+            <a:r>
+              <a:rPr lang="en-US" dirty="0" err="1"/>
+              <a:t>netana</a:t>
+            </a:r>
+            <a:r>
+              <a:rPr lang="en-US" dirty="0"/>
+              <a:t>-</a:t>
+            </a:r>
+            <a:r>
+              <a:rPr lang="en-US" dirty="0" err="1"/>
+              <a:t>nmop</a:t>
+            </a:r>
+            <a:r>
+              <a:rPr lang="en-US" dirty="0"/>
+              <a:t>-network-anomaly-lifecycle documents.</a:t>
+            </a:r>
+          </a:p>
+          <a:p>
+            <a:pPr marL="342900" indent="-342900">
+              <a:buFont typeface="Wingdings" panose="05000000000000000000" pitchFamily="2" charset="2"/>
+              <a:buChar char="Ø"/>
+            </a:pPr>
+            <a:r>
+              <a:rPr lang="en-US" dirty="0"/>
+              <a:t>Different applications will be described and exampled with open-source running code.</a:t>
+            </a:r>
+          </a:p>
+        </p:txBody>
+      </p:sp>
+      <p:sp>
+        <p:nvSpPr>
+          <p:cNvPr id="19" name="Title 1">
+            <a:extLst>
+              <a:ext uri="{FF2B5EF4-FFF2-40B4-BE49-F238E27FC236}">
+                <a16:creationId xmlns:a16="http://schemas.microsoft.com/office/drawing/2014/main" id="{56D79134-17A9-8BC8-B7D0-97BCFFB9A6B2}"/>
+              </a:ext>
+            </a:extLst>
+          </p:cNvPr>
+          <p:cNvSpPr>
+            <a:spLocks noGrp="1"/>
+          </p:cNvSpPr>
+          <p:nvPr>
+            <p:ph type="title"/>
+          </p:nvPr>
+        </p:nvSpPr>
+        <p:spPr>
+          <a:xfrm>
+            <a:off x="838200" y="365125"/>
+            <a:ext cx="10515600" cy="1325563"/>
+          </a:xfrm>
+        </p:spPr>
+        <p:txBody>
+          <a:bodyPr>
+            <a:normAutofit/>
+          </a:bodyPr>
+          <a:lstStyle/>
+          <a:p>
+            <a:r>
+              <a:rPr lang="en-US" sz="2800" b="1" dirty="0"/>
+              <a:t>Why This I-D?</a:t>
+            </a:r>
+            <a:br>
+              <a:rPr lang="en-US" sz="3600" dirty="0"/>
+            </a:br>
+            <a:r>
+              <a:rPr lang="en-US" sz="2700" dirty="0">
+                <a:solidFill>
+                  <a:schemeClr val="bg2">
+                    <a:lumMod val="75000"/>
+                  </a:schemeClr>
+                </a:solidFill>
+              </a:rPr>
+              <a:t>A Reminder</a:t>
+            </a:r>
+          </a:p>
+        </p:txBody>
+      </p:sp>
+    </p:spTree>
+    <p:extLst>
+      <p:ext uri="{BB962C8B-B14F-4D97-AF65-F5344CB8AC3E}">
+        <p14:creationId xmlns:p14="http://schemas.microsoft.com/office/powerpoint/2010/main" val="102978613"/>
+      </p:ext>
+    </p:extLst>
+  </p:cSld>
+  <p:clrMapOvr>
+    <a:masterClrMapping/>
+  </p:clrMapOvr>
+</p:sld>
+</file>
+
+<file path=ppt/slides/slide3.xml><?xml version="1.0" encoding="utf-8"?>
+<p:sld xmlns:a="http://schemas.openxmlformats.org/drawingml/2006/main" xmlns:r="http://schemas.openxmlformats.org/officeDocument/2006/relationships" xmlns:p="http://schemas.openxmlformats.org/presentationml/2006/main">
+  <p:cSld>
+    <p:spTree>
+      <p:nvGrpSpPr>
+        <p:cNvPr id="1" name=""/>
+        <p:cNvGrpSpPr/>
+        <p:nvPr/>
+      </p:nvGrpSpPr>
+      <p:grpSpPr>
+        <a:xfrm>
+          <a:off x="0" y="0"/>
+          <a:ext cx="0" cy="0"/>
+          <a:chOff x="0" y="0"/>
+          <a:chExt cx="0" cy="0"/>
+        </a:xfrm>
+      </p:grpSpPr>
+      <p:sp>
+        <p:nvSpPr>
+          <p:cNvPr id="6" name="Slide Number Placeholder 1">
+            <a:extLst>
+              <a:ext uri="{FF2B5EF4-FFF2-40B4-BE49-F238E27FC236}">
+                <a16:creationId xmlns:a16="http://schemas.microsoft.com/office/drawing/2014/main" id="{024DC3B6-499C-4E15-9336-2F15A0DFB843}"/>
+              </a:ext>
+            </a:extLst>
+          </p:cNvPr>
+          <p:cNvSpPr>
+            <a:spLocks noGrp="1"/>
+          </p:cNvSpPr>
+          <p:nvPr>
+            <p:ph type="sldNum" sz="quarter" idx="12"/>
+          </p:nvPr>
+        </p:nvSpPr>
+        <p:spPr>
+          <a:xfrm>
+            <a:off x="11587892" y="6361637"/>
+            <a:ext cx="414251" cy="365125"/>
+          </a:xfrm>
+        </p:spPr>
+        <p:txBody>
+          <a:bodyPr/>
+          <a:lstStyle/>
+          <a:p>
             <a:pPr marL="0" marR="0" lvl="0" indent="0" algn="r" defTabSz="914400" rtl="0" eaLnBrk="1" fontAlgn="auto" latinLnBrk="0" hangingPunct="1">
               <a:lnSpc>
                 <a:spcPct val="100000"/>
@@ -10900,7 +12445,7 @@
                 <a:tabLst/>
                 <a:defRPr/>
               </a:pPr>
-              <a:t>2</a:t>
+              <a:t>3</a:t>
             </a:fld>
             <a:endParaRPr kumimoji="0" lang="de-CH" sz="1400" b="0" i="0" u="none" strike="noStrike" kern="1200" cap="none" spc="0" normalizeH="0" baseline="0" noProof="0" dirty="0">
               <a:ln>
@@ -13444,7 +14989,7 @@
           <a:p>
             <a:r>
               <a:rPr lang="en-US" sz="2800" b="1" dirty="0"/>
-              <a:t>Data Mesh organizes Data in Organizations</a:t>
+              <a:t>Structuring Anomaly Detection NMOP Effort</a:t>
             </a:r>
             <a:br>
               <a:rPr lang="en-GB" sz="3600" dirty="0"/>
@@ -13457,7 +15002,7 @@
                   </a:schemeClr>
                 </a:solidFill>
               </a:rPr>
-              <a:t>Enables Network Analytics use cases</a:t>
+              <a:t>Integrates into Data Mesh</a:t>
             </a:r>
           </a:p>
         </p:txBody>
@@ -14020,7 +15565,7 @@
 </p:sld>
 </file>
 
-<file path=ppt/slides/slide3.xml><?xml version="1.0" encoding="utf-8"?>
+<file path=ppt/slides/slide4.xml><?xml version="1.0" encoding="utf-8"?>
 <p:sld xmlns:a="http://schemas.openxmlformats.org/drawingml/2006/main" xmlns:r="http://schemas.openxmlformats.org/officeDocument/2006/relationships" xmlns:p="http://schemas.openxmlformats.org/presentationml/2006/main">
   <p:cSld>
     <p:spTree>
@@ -14149,7 +15694,7 @@
           <a:p>
             <a:fld id="{FC4AC485-25DE-431E-B345-9C0A15BB7F8A}" type="slidenum">
               <a:rPr lang="de-CH" sz="1400" smtClean="0"/>
-              <a:t>3</a:t>
+              <a:t>4</a:t>
             </a:fld>
             <a:endParaRPr lang="de-CH" sz="1400" dirty="0"/>
           </a:p>
@@ -14221,24 +15766,14 @@
               <a:rPr lang="en-GB" sz="3600" dirty="0"/>
             </a:br>
             <a:r>
-              <a:rPr lang="en-US" sz="2700">
+              <a:rPr lang="en-US" sz="2700" dirty="0">
                 <a:solidFill>
                   <a:schemeClr val="bg2">
                     <a:lumMod val="75000"/>
                   </a:schemeClr>
                 </a:solidFill>
               </a:rPr>
-              <a:t>Which metrics </a:t>
-            </a:r>
-            <a:r>
-              <a:rPr lang="en-US" sz="2700" dirty="0">
-                <a:solidFill>
-                  <a:schemeClr val="bg2">
-                    <a:lumMod val="75000"/>
-                  </a:schemeClr>
-                </a:solidFill>
-              </a:rPr>
-              <a:t>are collected</a:t>
+              <a:t>Which metrics are collected</a:t>
             </a:r>
           </a:p>
         </p:txBody>
@@ -14383,7 +15918,7 @@
 </p:sld>
 </file>
 
-<file path=ppt/slides/slide4.xml><?xml version="1.0" encoding="utf-8"?>
+<file path=ppt/slides/slide5.xml><?xml version="1.0" encoding="utf-8"?>
 <p:sld xmlns:a="http://schemas.openxmlformats.org/drawingml/2006/main" xmlns:r="http://schemas.openxmlformats.org/officeDocument/2006/relationships" xmlns:p="http://schemas.openxmlformats.org/presentationml/2006/main">
   <p:cSld>
     <p:spTree>
@@ -14477,7 +16012,7 @@
                 <a:tabLst/>
                 <a:defRPr/>
               </a:pPr>
-              <a:t>4</a:t>
+              <a:t>5</a:t>
             </a:fld>
             <a:endParaRPr kumimoji="0" lang="en-US" sz="1400" b="0" i="0" u="none" strike="noStrike" kern="1200" cap="none" spc="0" normalizeH="0" baseline="0" noProof="0" dirty="0">
               <a:ln>
@@ -16976,7 +18511,7 @@
 </p:sld>
 </file>
 
-<file path=ppt/slides/slide5.xml><?xml version="1.0" encoding="utf-8"?>
+<file path=ppt/slides/slide6.xml><?xml version="1.0" encoding="utf-8"?>
 <p:sld xmlns:a="http://schemas.openxmlformats.org/drawingml/2006/main" xmlns:r="http://schemas.openxmlformats.org/officeDocument/2006/relationships" xmlns:p="http://schemas.openxmlformats.org/presentationml/2006/main">
   <p:cSld>
     <p:spTree>
@@ -17021,7 +18556,7 @@
           <a:p>
             <a:fld id="{FC4AC485-25DE-431E-B345-9C0A15BB7F8A}" type="slidenum">
               <a:rPr lang="de-CH" sz="1400" smtClean="0"/>
-              <a:t>5</a:t>
+              <a:t>6</a:t>
             </a:fld>
             <a:endParaRPr lang="de-CH" sz="1400" dirty="0"/>
           </a:p>
@@ -17440,7 +18975,7 @@
 </p:sld>
 </file>
 
-<file path=ppt/slides/slide6.xml><?xml version="1.0" encoding="utf-8"?>
+<file path=ppt/slides/slide7.xml><?xml version="1.0" encoding="utf-8"?>
 <p:sld xmlns:a="http://schemas.openxmlformats.org/drawingml/2006/main" xmlns:r="http://schemas.openxmlformats.org/officeDocument/2006/relationships" xmlns:p="http://schemas.openxmlformats.org/presentationml/2006/main">
   <p:cSld>
     <p:spTree>
@@ -17761,7 +19296,7 @@
           <a:p>
             <a:fld id="{FC4AC485-25DE-431E-B345-9C0A15BB7F8A}" type="slidenum">
               <a:rPr lang="de-CH" sz="1400" smtClean="0"/>
-              <a:t>6</a:t>
+              <a:t>7</a:t>
             </a:fld>
             <a:endParaRPr lang="de-CH" sz="1400" dirty="0"/>
           </a:p>
@@ -17853,7 +19388,7 @@
 </p:sld>
 </file>
 
-<file path=ppt/slides/slide7.xml><?xml version="1.0" encoding="utf-8"?>
+<file path=ppt/slides/slide8.xml><?xml version="1.0" encoding="utf-8"?>
 <p:sld xmlns:a="http://schemas.openxmlformats.org/drawingml/2006/main" xmlns:r="http://schemas.openxmlformats.org/officeDocument/2006/relationships" xmlns:p="http://schemas.openxmlformats.org/presentationml/2006/main">
   <p:cSld>
     <p:spTree>
@@ -19327,7 +20862,7 @@
           <a:p>
             <a:fld id="{FC4AC485-25DE-431E-B345-9C0A15BB7F8A}" type="slidenum">
               <a:rPr lang="de-CH" sz="1400" smtClean="0"/>
-              <a:t>7</a:t>
+              <a:t>8</a:t>
             </a:fld>
             <a:endParaRPr lang="de-CH" sz="1400" dirty="0"/>
           </a:p>
@@ -19738,7 +21273,7 @@
 </p:sld>
 </file>
 
-<file path=ppt/slides/slide8.xml><?xml version="1.0" encoding="utf-8"?>
+<file path=ppt/slides/slide9.xml><?xml version="1.0" encoding="utf-8"?>
 <p:sld xmlns:a="http://schemas.openxmlformats.org/drawingml/2006/main" xmlns:r="http://schemas.openxmlformats.org/officeDocument/2006/relationships" xmlns:p="http://schemas.openxmlformats.org/presentationml/2006/main">
   <p:cSld>
     <p:spTree>
@@ -19795,7 +21330,7 @@
             </a:pPr>
             <a:fld id="{00000000-1234-1234-1234-123412341234}" type="slidenum">
               <a:rPr lang="en-US" sz="1400"/>
-              <a:t>8</a:t>
+              <a:t>9</a:t>
             </a:fld>
             <a:endParaRPr sz="1400"/>
           </a:p>
@@ -20207,1166 +21742,6 @@
           </a:p>
         </p:txBody>
       </p:sp>
-    </p:spTree>
-  </p:cSld>
-  <p:clrMapOvr>
-    <a:masterClrMapping/>
-  </p:clrMapOvr>
-</p:sld>
-</file>
-
-<file path=ppt/slides/slide9.xml><?xml version="1.0" encoding="utf-8"?>
-<p:sld xmlns:a="http://schemas.openxmlformats.org/drawingml/2006/main" xmlns:r="http://schemas.openxmlformats.org/officeDocument/2006/relationships" xmlns:p="http://schemas.openxmlformats.org/presentationml/2006/main">
-  <p:cSld>
-    <p:spTree>
-      <p:nvGrpSpPr>
-        <p:cNvPr id="1" name="Shape 225"/>
-        <p:cNvGrpSpPr/>
-        <p:nvPr/>
-      </p:nvGrpSpPr>
-      <p:grpSpPr>
-        <a:xfrm>
-          <a:off x="0" y="0"/>
-          <a:ext cx="0" cy="0"/>
-          <a:chOff x="0" y="0"/>
-          <a:chExt cx="0" cy="0"/>
-        </a:xfrm>
-      </p:grpSpPr>
-      <p:sp>
-        <p:nvSpPr>
-          <p:cNvPr id="226" name="Google Shape;226;p9"/>
-          <p:cNvSpPr txBox="1"/>
-          <p:nvPr/>
-        </p:nvSpPr>
-        <p:spPr>
-          <a:xfrm>
-            <a:off x="838198" y="1484344"/>
-            <a:ext cx="4373880" cy="2329677"/>
-          </a:xfrm>
-          <a:prstGeom prst="rect">
-            <a:avLst/>
-          </a:prstGeom>
-          <a:noFill/>
-          <a:ln>
-            <a:noFill/>
-          </a:ln>
-        </p:spPr>
-        <p:txBody>
-          <a:bodyPr spcFirstLastPara="1" wrap="square" lIns="91425" tIns="45700" rIns="91425" bIns="45700" anchor="t" anchorCtr="0">
-            <a:spAutoFit/>
-          </a:bodyPr>
-          <a:lstStyle/>
-          <a:p>
-            <a:pPr marL="0" marR="0" lvl="0" indent="0" algn="l" rtl="0">
-              <a:lnSpc>
-                <a:spcPct val="107000"/>
-              </a:lnSpc>
-              <a:spcBef>
-                <a:spcPts val="0"/>
-              </a:spcBef>
-              <a:spcAft>
-                <a:spcPts val="0"/>
-              </a:spcAft>
-              <a:buNone/>
-            </a:pPr>
-            <a:r>
-              <a:rPr lang="en-US" sz="850" b="0" i="0" u="none" strike="noStrike" cap="none">
-                <a:solidFill>
-                  <a:schemeClr val="dk1"/>
-                </a:solidFill>
-                <a:latin typeface="Courier New"/>
-                <a:ea typeface="Courier New"/>
-                <a:cs typeface="Courier New"/>
-                <a:sym typeface="Courier New"/>
-              </a:rPr>
-              <a:t>module: ietf-network-anomaly-metadata</a:t>
-            </a:r>
-            <a:endParaRPr/>
-          </a:p>
-          <a:p>
-            <a:pPr marL="0" marR="0" lvl="0" indent="0" algn="l" rtl="0">
-              <a:lnSpc>
-                <a:spcPct val="107000"/>
-              </a:lnSpc>
-              <a:spcBef>
-                <a:spcPts val="0"/>
-              </a:spcBef>
-              <a:spcAft>
-                <a:spcPts val="0"/>
-              </a:spcAft>
-              <a:buNone/>
-            </a:pPr>
-            <a:r>
-              <a:rPr lang="en-US" sz="850" b="0" i="0" u="none" strike="noStrike" cap="none">
-                <a:solidFill>
-                  <a:schemeClr val="dk1"/>
-                </a:solidFill>
-                <a:latin typeface="Courier New"/>
-                <a:ea typeface="Courier New"/>
-                <a:cs typeface="Courier New"/>
-                <a:sym typeface="Courier New"/>
-              </a:rPr>
-              <a:t>  +--rw network-anomalies</a:t>
-            </a:r>
-            <a:endParaRPr/>
-          </a:p>
-          <a:p>
-            <a:pPr marL="0" marR="0" lvl="0" indent="0" algn="l" rtl="0">
-              <a:lnSpc>
-                <a:spcPct val="107000"/>
-              </a:lnSpc>
-              <a:spcBef>
-                <a:spcPts val="0"/>
-              </a:spcBef>
-              <a:spcAft>
-                <a:spcPts val="0"/>
-              </a:spcAft>
-              <a:buNone/>
-            </a:pPr>
-            <a:r>
-              <a:rPr lang="en-US" sz="850" b="0" i="0" u="none" strike="noStrike" cap="none">
-                <a:solidFill>
-                  <a:schemeClr val="dk1"/>
-                </a:solidFill>
-                <a:latin typeface="Courier New"/>
-                <a:ea typeface="Courier New"/>
-                <a:cs typeface="Courier New"/>
-                <a:sym typeface="Courier New"/>
-              </a:rPr>
-              <a:t>    +--rw network-anomaly* [id version]</a:t>
-            </a:r>
-            <a:endParaRPr/>
-          </a:p>
-          <a:p>
-            <a:pPr marL="0" marR="0" lvl="0" indent="0" algn="l" rtl="0">
-              <a:lnSpc>
-                <a:spcPct val="107000"/>
-              </a:lnSpc>
-              <a:spcBef>
-                <a:spcPts val="0"/>
-              </a:spcBef>
-              <a:spcAft>
-                <a:spcPts val="0"/>
-              </a:spcAft>
-              <a:buNone/>
-            </a:pPr>
-            <a:r>
-              <a:rPr lang="en-US" sz="850" b="0" i="0" u="none" strike="noStrike" cap="none">
-                <a:solidFill>
-                  <a:schemeClr val="dk1"/>
-                </a:solidFill>
-                <a:latin typeface="Courier New"/>
-                <a:ea typeface="Courier New"/>
-                <a:cs typeface="Courier New"/>
-                <a:sym typeface="Courier New"/>
-              </a:rPr>
-              <a:t>      +--rw id             yang:uuid</a:t>
-            </a:r>
-            <a:endParaRPr sz="850" b="0" i="0" u="none" strike="noStrike" cap="none">
-              <a:solidFill>
-                <a:schemeClr val="dk1"/>
-              </a:solidFill>
-              <a:latin typeface="Courier New"/>
-              <a:ea typeface="Courier New"/>
-              <a:cs typeface="Courier New"/>
-              <a:sym typeface="Courier New"/>
-            </a:endParaRPr>
-          </a:p>
-          <a:p>
-            <a:pPr marL="0" marR="0" lvl="0" indent="0" algn="l" rtl="0">
-              <a:lnSpc>
-                <a:spcPct val="107000"/>
-              </a:lnSpc>
-              <a:spcBef>
-                <a:spcPts val="0"/>
-              </a:spcBef>
-              <a:spcAft>
-                <a:spcPts val="0"/>
-              </a:spcAft>
-              <a:buNone/>
-            </a:pPr>
-            <a:r>
-              <a:rPr lang="en-US" sz="850" b="0" i="0" u="none" strike="noStrike" cap="none">
-                <a:solidFill>
-                  <a:schemeClr val="dk1"/>
-                </a:solidFill>
-                <a:latin typeface="Courier New"/>
-                <a:ea typeface="Courier New"/>
-                <a:cs typeface="Courier New"/>
-                <a:sym typeface="Courier New"/>
-              </a:rPr>
-              <a:t>      +--rw version        uint32</a:t>
-            </a:r>
-            <a:endParaRPr/>
-          </a:p>
-          <a:p>
-            <a:pPr marL="0" marR="0" lvl="0" indent="0" algn="l" rtl="0">
-              <a:lnSpc>
-                <a:spcPct val="107000"/>
-              </a:lnSpc>
-              <a:spcBef>
-                <a:spcPts val="0"/>
-              </a:spcBef>
-              <a:spcAft>
-                <a:spcPts val="0"/>
-              </a:spcAft>
-              <a:buNone/>
-            </a:pPr>
-            <a:r>
-              <a:rPr lang="en-US" sz="850" b="0" i="0" u="none" strike="noStrike" cap="none">
-                <a:solidFill>
-                  <a:schemeClr val="dk1"/>
-                </a:solidFill>
-                <a:latin typeface="Courier New"/>
-                <a:ea typeface="Courier New"/>
-                <a:cs typeface="Courier New"/>
-                <a:sym typeface="Courier New"/>
-              </a:rPr>
-              <a:t>      +--rw description?   string</a:t>
-            </a:r>
-            <a:endParaRPr/>
-          </a:p>
-          <a:p>
-            <a:pPr marL="0" marR="0" lvl="0" indent="0" algn="l" rtl="0">
-              <a:lnSpc>
-                <a:spcPct val="107000"/>
-              </a:lnSpc>
-              <a:spcBef>
-                <a:spcPts val="0"/>
-              </a:spcBef>
-              <a:spcAft>
-                <a:spcPts val="0"/>
-              </a:spcAft>
-              <a:buNone/>
-            </a:pPr>
-            <a:r>
-              <a:rPr lang="en-US" sz="850" b="0" i="0" u="none" strike="noStrike" cap="none">
-                <a:solidFill>
-                  <a:schemeClr val="dk1"/>
-                </a:solidFill>
-                <a:latin typeface="Courier New"/>
-                <a:ea typeface="Courier New"/>
-                <a:cs typeface="Courier New"/>
-                <a:sym typeface="Courier New"/>
-              </a:rPr>
-              <a:t>      +--rw state          identityref</a:t>
-            </a:r>
-            <a:endParaRPr sz="850" b="0" i="0" u="none" strike="noStrike" cap="none">
-              <a:solidFill>
-                <a:schemeClr val="dk1"/>
-              </a:solidFill>
-              <a:latin typeface="Courier New"/>
-              <a:ea typeface="Courier New"/>
-              <a:cs typeface="Courier New"/>
-              <a:sym typeface="Courier New"/>
-            </a:endParaRPr>
-          </a:p>
-          <a:p>
-            <a:pPr marL="0" marR="0" lvl="0" indent="0" algn="l" rtl="0">
-              <a:lnSpc>
-                <a:spcPct val="107000"/>
-              </a:lnSpc>
-              <a:spcBef>
-                <a:spcPts val="0"/>
-              </a:spcBef>
-              <a:spcAft>
-                <a:spcPts val="0"/>
-              </a:spcAft>
-              <a:buNone/>
-            </a:pPr>
-            <a:r>
-              <a:rPr lang="en-US" sz="850" b="0" i="0" u="none" strike="noStrike" cap="none">
-                <a:solidFill>
-                  <a:schemeClr val="dk1"/>
-                </a:solidFill>
-                <a:latin typeface="Courier New"/>
-                <a:ea typeface="Courier New"/>
-                <a:cs typeface="Courier New"/>
-                <a:sym typeface="Courier New"/>
-              </a:rPr>
-              <a:t>      +--rw annotator</a:t>
-            </a:r>
-            <a:endParaRPr/>
-          </a:p>
-          <a:p>
-            <a:pPr marL="0" marR="0" lvl="0" indent="0" algn="l" rtl="0">
-              <a:lnSpc>
-                <a:spcPct val="107000"/>
-              </a:lnSpc>
-              <a:spcBef>
-                <a:spcPts val="0"/>
-              </a:spcBef>
-              <a:spcAft>
-                <a:spcPts val="0"/>
-              </a:spcAft>
-              <a:buNone/>
-            </a:pPr>
-            <a:r>
-              <a:rPr lang="en-US" sz="850" b="0" i="0" u="none" strike="noStrike" cap="none">
-                <a:solidFill>
-                  <a:schemeClr val="dk1"/>
-                </a:solidFill>
-                <a:latin typeface="Courier New"/>
-                <a:ea typeface="Courier New"/>
-                <a:cs typeface="Courier New"/>
-                <a:sym typeface="Courier New"/>
-              </a:rPr>
-              <a:t>      |  +--rw (annotator-type)</a:t>
-            </a:r>
-            <a:endParaRPr/>
-          </a:p>
-          <a:p>
-            <a:pPr marL="0" marR="0" lvl="0" indent="0" algn="l" rtl="0">
-              <a:lnSpc>
-                <a:spcPct val="107000"/>
-              </a:lnSpc>
-              <a:spcBef>
-                <a:spcPts val="0"/>
-              </a:spcBef>
-              <a:spcAft>
-                <a:spcPts val="0"/>
-              </a:spcAft>
-              <a:buNone/>
-            </a:pPr>
-            <a:r>
-              <a:rPr lang="en-US" sz="850" b="0" i="0" u="none" strike="noStrike" cap="none">
-                <a:solidFill>
-                  <a:schemeClr val="dk1"/>
-                </a:solidFill>
-                <a:latin typeface="Courier New"/>
-                <a:ea typeface="Courier New"/>
-                <a:cs typeface="Courier New"/>
-                <a:sym typeface="Courier New"/>
-              </a:rPr>
-              <a:t>      |  |  +--:(human)</a:t>
-            </a:r>
-            <a:endParaRPr/>
-          </a:p>
-          <a:p>
-            <a:pPr marL="0" marR="0" lvl="0" indent="0" algn="l" rtl="0">
-              <a:lnSpc>
-                <a:spcPct val="107000"/>
-              </a:lnSpc>
-              <a:spcBef>
-                <a:spcPts val="0"/>
-              </a:spcBef>
-              <a:spcAft>
-                <a:spcPts val="0"/>
-              </a:spcAft>
-              <a:buNone/>
-            </a:pPr>
-            <a:r>
-              <a:rPr lang="en-US" sz="850" b="0" i="0" u="none" strike="noStrike" cap="none">
-                <a:solidFill>
-                  <a:schemeClr val="dk1"/>
-                </a:solidFill>
-                <a:latin typeface="Courier New"/>
-                <a:ea typeface="Courier New"/>
-                <a:cs typeface="Courier New"/>
-                <a:sym typeface="Courier New"/>
-              </a:rPr>
-              <a:t>      |  |  |  +--rw human        empty</a:t>
-            </a:r>
-            <a:endParaRPr/>
-          </a:p>
-          <a:p>
-            <a:pPr marL="0" marR="0" lvl="0" indent="0" algn="l" rtl="0">
-              <a:lnSpc>
-                <a:spcPct val="107000"/>
-              </a:lnSpc>
-              <a:spcBef>
-                <a:spcPts val="0"/>
-              </a:spcBef>
-              <a:spcAft>
-                <a:spcPts val="0"/>
-              </a:spcAft>
-              <a:buNone/>
-            </a:pPr>
-            <a:r>
-              <a:rPr lang="en-US" sz="850" b="0" i="0" u="none" strike="noStrike" cap="none">
-                <a:solidFill>
-                  <a:schemeClr val="dk1"/>
-                </a:solidFill>
-                <a:latin typeface="Courier New"/>
-                <a:ea typeface="Courier New"/>
-                <a:cs typeface="Courier New"/>
-                <a:sym typeface="Courier New"/>
-              </a:rPr>
-              <a:t>      |  |  +--:(algorithm)</a:t>
-            </a:r>
-            <a:endParaRPr/>
-          </a:p>
-          <a:p>
-            <a:pPr marL="0" marR="0" lvl="0" indent="0" algn="l" rtl="0">
-              <a:lnSpc>
-                <a:spcPct val="107000"/>
-              </a:lnSpc>
-              <a:spcBef>
-                <a:spcPts val="0"/>
-              </a:spcBef>
-              <a:spcAft>
-                <a:spcPts val="0"/>
-              </a:spcAft>
-              <a:buNone/>
-            </a:pPr>
-            <a:r>
-              <a:rPr lang="en-US" sz="850" b="0" i="0" u="none" strike="noStrike" cap="none">
-                <a:solidFill>
-                  <a:schemeClr val="dk1"/>
-                </a:solidFill>
-                <a:latin typeface="Courier New"/>
-                <a:ea typeface="Courier New"/>
-                <a:cs typeface="Courier New"/>
-                <a:sym typeface="Courier New"/>
-              </a:rPr>
-              <a:t>      |  |     +--rw algorithm    empty</a:t>
-            </a:r>
-            <a:endParaRPr/>
-          </a:p>
-          <a:p>
-            <a:pPr marL="0" marR="0" lvl="0" indent="0" algn="l" rtl="0">
-              <a:lnSpc>
-                <a:spcPct val="107000"/>
-              </a:lnSpc>
-              <a:spcBef>
-                <a:spcPts val="0"/>
-              </a:spcBef>
-              <a:spcAft>
-                <a:spcPts val="0"/>
-              </a:spcAft>
-              <a:buNone/>
-            </a:pPr>
-            <a:r>
-              <a:rPr lang="en-US" sz="850" b="0" i="0" u="none" strike="noStrike" cap="none">
-                <a:solidFill>
-                  <a:schemeClr val="dk1"/>
-                </a:solidFill>
-                <a:latin typeface="Courier New"/>
-                <a:ea typeface="Courier New"/>
-                <a:cs typeface="Courier New"/>
-                <a:sym typeface="Courier New"/>
-              </a:rPr>
-              <a:t>      |  +--rw name?              empty</a:t>
-            </a:r>
-            <a:endParaRPr/>
-          </a:p>
-          <a:p>
-            <a:pPr marL="0" marR="0" lvl="0" indent="0" algn="l" rtl="0">
-              <a:lnSpc>
-                <a:spcPct val="107000"/>
-              </a:lnSpc>
-              <a:spcBef>
-                <a:spcPts val="0"/>
-              </a:spcBef>
-              <a:spcAft>
-                <a:spcPts val="0"/>
-              </a:spcAft>
-              <a:buNone/>
-            </a:pPr>
-            <a:r>
-              <a:rPr lang="en-US" sz="850" b="0" i="0" u="none" strike="noStrike" cap="none">
-                <a:solidFill>
-                  <a:schemeClr val="dk1"/>
-                </a:solidFill>
-                <a:latin typeface="Courier New"/>
-                <a:ea typeface="Courier New"/>
-                <a:cs typeface="Courier New"/>
-                <a:sym typeface="Courier New"/>
-              </a:rPr>
-              <a:t>      +--rw symptoms* [symptom_id]</a:t>
-            </a:r>
-            <a:endParaRPr/>
-          </a:p>
-          <a:p>
-            <a:pPr marL="0" marR="0" lvl="0" indent="0" algn="l" rtl="0">
-              <a:lnSpc>
-                <a:spcPct val="107000"/>
-              </a:lnSpc>
-              <a:spcBef>
-                <a:spcPts val="0"/>
-              </a:spcBef>
-              <a:spcAft>
-                <a:spcPts val="0"/>
-              </a:spcAft>
-              <a:buNone/>
-            </a:pPr>
-            <a:r>
-              <a:rPr lang="en-US" sz="850" b="0" i="0" u="none" strike="noStrike" cap="none">
-                <a:solidFill>
-                  <a:schemeClr val="dk1"/>
-                </a:solidFill>
-                <a:latin typeface="Courier New"/>
-                <a:ea typeface="Courier New"/>
-                <a:cs typeface="Courier New"/>
-                <a:sym typeface="Courier New"/>
-              </a:rPr>
-              <a:t>        +--rw symptom_id    yang:uuid</a:t>
-            </a:r>
-            <a:endParaRPr sz="850" b="0" i="0" u="none" strike="noStrike" cap="none">
-              <a:solidFill>
-                <a:schemeClr val="dk1"/>
-              </a:solidFill>
-              <a:latin typeface="Courier New"/>
-              <a:ea typeface="Courier New"/>
-              <a:cs typeface="Courier New"/>
-              <a:sym typeface="Courier New"/>
-            </a:endParaRPr>
-          </a:p>
-        </p:txBody>
-      </p:sp>
-      <p:sp>
-        <p:nvSpPr>
-          <p:cNvPr id="227" name="Google Shape;227;p9"/>
-          <p:cNvSpPr txBox="1">
-            <a:spLocks noGrp="1"/>
-          </p:cNvSpPr>
-          <p:nvPr>
-            <p:ph type="body" idx="1"/>
-          </p:nvPr>
-        </p:nvSpPr>
-        <p:spPr>
-          <a:xfrm>
-            <a:off x="6193410" y="1929384"/>
-            <a:ext cx="5229402" cy="3823716"/>
-          </a:xfrm>
-          <a:prstGeom prst="rect">
-            <a:avLst/>
-          </a:prstGeom>
-          <a:noFill/>
-          <a:ln>
-            <a:noFill/>
-          </a:ln>
-        </p:spPr>
-        <p:txBody>
-          <a:bodyPr spcFirstLastPara="1" wrap="square" lIns="91425" tIns="45700" rIns="91425" bIns="45700" anchor="t" anchorCtr="0">
-            <a:noAutofit/>
-          </a:bodyPr>
-          <a:lstStyle/>
-          <a:p>
-            <a:pPr marL="228600" lvl="0" indent="-228600" algn="l" rtl="0">
-              <a:lnSpc>
-                <a:spcPct val="90000"/>
-              </a:lnSpc>
-              <a:spcBef>
-                <a:spcPts val="0"/>
-              </a:spcBef>
-              <a:spcAft>
-                <a:spcPts val="0"/>
-              </a:spcAft>
-              <a:buClr>
-                <a:srgbClr val="FF0000"/>
-              </a:buClr>
-              <a:buSzPts val="2000"/>
-              <a:buChar char="•"/>
-            </a:pPr>
-            <a:r>
-              <a:rPr lang="en-US" sz="2000" b="1" dirty="0">
-                <a:solidFill>
-                  <a:srgbClr val="FF0000"/>
-                </a:solidFill>
-              </a:rPr>
-              <a:t>ID and Description</a:t>
-            </a:r>
-            <a:r>
-              <a:rPr lang="en-US" sz="2000" dirty="0"/>
-              <a:t> uniquely identifies the detected network anomaly (as a container of symptoms).</a:t>
-            </a:r>
-            <a:endParaRPr dirty="0"/>
-          </a:p>
-          <a:p>
-            <a:pPr marL="228600" lvl="0" indent="-228600" algn="l" rtl="0">
-              <a:lnSpc>
-                <a:spcPct val="90000"/>
-              </a:lnSpc>
-              <a:spcBef>
-                <a:spcPts val="1000"/>
-              </a:spcBef>
-              <a:spcAft>
-                <a:spcPts val="0"/>
-              </a:spcAft>
-              <a:buClr>
-                <a:srgbClr val="FF0000"/>
-              </a:buClr>
-              <a:buSzPts val="2000"/>
-              <a:buChar char="•"/>
-            </a:pPr>
-            <a:r>
-              <a:rPr lang="en-US" sz="2000" b="1" dirty="0">
-                <a:solidFill>
-                  <a:srgbClr val="FF0000"/>
-                </a:solidFill>
-              </a:rPr>
-              <a:t>Description and State </a:t>
-            </a:r>
-            <a:r>
-              <a:rPr lang="en-US" sz="2000" dirty="0"/>
-              <a:t>provide general information regarding the anomaly and . </a:t>
-            </a:r>
-            <a:endParaRPr dirty="0"/>
-          </a:p>
-          <a:p>
-            <a:pPr marL="228600" lvl="0" indent="-228600" algn="l" rtl="0">
-              <a:lnSpc>
-                <a:spcPct val="90000"/>
-              </a:lnSpc>
-              <a:spcBef>
-                <a:spcPts val="1000"/>
-              </a:spcBef>
-              <a:spcAft>
-                <a:spcPts val="0"/>
-              </a:spcAft>
-              <a:buClr>
-                <a:srgbClr val="FF0000"/>
-              </a:buClr>
-              <a:buSzPts val="2000"/>
-              <a:buChar char="•"/>
-            </a:pPr>
-            <a:r>
-              <a:rPr lang="en-US" sz="2000" b="1" dirty="0">
-                <a:solidFill>
-                  <a:srgbClr val="FF0000"/>
-                </a:solidFill>
-              </a:rPr>
-              <a:t>Annotator </a:t>
-            </a:r>
-            <a:r>
-              <a:rPr lang="en-US" sz="2000" dirty="0"/>
-              <a:t>describes the entity that observed the network anomaly: this can be a human or an algorithm (anomaly detection system). </a:t>
-            </a:r>
-            <a:endParaRPr dirty="0"/>
-          </a:p>
-          <a:p>
-            <a:pPr marL="228600" lvl="0" indent="-228600" algn="l" rtl="0">
-              <a:lnSpc>
-                <a:spcPct val="90000"/>
-              </a:lnSpc>
-              <a:spcBef>
-                <a:spcPts val="1000"/>
-              </a:spcBef>
-              <a:spcAft>
-                <a:spcPts val="0"/>
-              </a:spcAft>
-              <a:buClr>
-                <a:srgbClr val="FF0000"/>
-              </a:buClr>
-              <a:buSzPts val="2000"/>
-              <a:buChar char="•"/>
-            </a:pPr>
-            <a:r>
-              <a:rPr lang="en-US" sz="2000" b="1" dirty="0">
-                <a:solidFill>
-                  <a:srgbClr val="FF0000"/>
-                </a:solidFill>
-              </a:rPr>
-              <a:t>Symptoms </a:t>
-            </a:r>
-            <a:r>
-              <a:rPr lang="en-US" sz="2000" dirty="0"/>
-              <a:t>provides a list of symptoms (based on </a:t>
-            </a:r>
-            <a:r>
-              <a:rPr lang="en-US" sz="2000" dirty="0" err="1"/>
-              <a:t>ietf</a:t>
-            </a:r>
-            <a:r>
-              <a:rPr lang="en-US" sz="2000" dirty="0"/>
-              <a:t>-symptom-metadata) that are part of this network anomaly.</a:t>
-            </a:r>
-            <a:endParaRPr dirty="0"/>
-          </a:p>
-        </p:txBody>
-      </p:sp>
-      <p:sp>
-        <p:nvSpPr>
-          <p:cNvPr id="228" name="Google Shape;228;p9"/>
-          <p:cNvSpPr/>
-          <p:nvPr/>
-        </p:nvSpPr>
-        <p:spPr>
-          <a:xfrm>
-            <a:off x="1063625" y="1810474"/>
-            <a:ext cx="3038400" cy="416400"/>
-          </a:xfrm>
-          <a:prstGeom prst="rect">
-            <a:avLst/>
-          </a:prstGeom>
-          <a:solidFill>
-            <a:schemeClr val="accent6">
-              <a:alpha val="9803"/>
-            </a:schemeClr>
-          </a:solidFill>
-          <a:ln w="25400" cap="flat" cmpd="sng">
-            <a:solidFill>
-              <a:schemeClr val="accent6"/>
-            </a:solidFill>
-            <a:prstDash val="solid"/>
-            <a:miter lim="800000"/>
-            <a:headEnd type="none" w="sm" len="sm"/>
-            <a:tailEnd type="none" w="sm" len="sm"/>
-          </a:ln>
-        </p:spPr>
-        <p:txBody>
-          <a:bodyPr spcFirstLastPara="1" wrap="square" lIns="91425" tIns="45700" rIns="91425" bIns="45700" anchor="ctr" anchorCtr="0">
-            <a:noAutofit/>
-          </a:bodyPr>
-          <a:lstStyle/>
-          <a:p>
-            <a:pPr marL="0" marR="0" lvl="0" indent="0" algn="ctr" rtl="0">
-              <a:spcBef>
-                <a:spcPts val="0"/>
-              </a:spcBef>
-              <a:spcAft>
-                <a:spcPts val="0"/>
-              </a:spcAft>
-              <a:buNone/>
-            </a:pPr>
-            <a:endParaRPr sz="1800" b="0" i="0" u="none" strike="noStrike" cap="none">
-              <a:solidFill>
-                <a:schemeClr val="lt1"/>
-              </a:solidFill>
-              <a:latin typeface="Calibri"/>
-              <a:ea typeface="Calibri"/>
-              <a:cs typeface="Calibri"/>
-              <a:sym typeface="Calibri"/>
-            </a:endParaRPr>
-          </a:p>
-        </p:txBody>
-      </p:sp>
-      <p:cxnSp>
-        <p:nvCxnSpPr>
-          <p:cNvPr id="229" name="Google Shape;229;p9"/>
-          <p:cNvCxnSpPr>
-            <a:stCxn id="228" idx="3"/>
-          </p:cNvCxnSpPr>
-          <p:nvPr/>
-        </p:nvCxnSpPr>
-        <p:spPr>
-          <a:xfrm>
-            <a:off x="4102025" y="2018674"/>
-            <a:ext cx="2091300" cy="90300"/>
-          </a:xfrm>
-          <a:prstGeom prst="straightConnector1">
-            <a:avLst/>
-          </a:prstGeom>
-          <a:noFill/>
-          <a:ln w="25400" cap="flat" cmpd="sng">
-            <a:solidFill>
-              <a:schemeClr val="accent6"/>
-            </a:solidFill>
-            <a:prstDash val="solid"/>
-            <a:miter lim="800000"/>
-            <a:headEnd type="none" w="sm" len="sm"/>
-            <a:tailEnd type="none" w="sm" len="sm"/>
-          </a:ln>
-        </p:spPr>
-      </p:cxnSp>
-      <p:sp>
-        <p:nvSpPr>
-          <p:cNvPr id="230" name="Google Shape;230;p9"/>
-          <p:cNvSpPr txBox="1">
-            <a:spLocks noGrp="1"/>
-          </p:cNvSpPr>
-          <p:nvPr>
-            <p:ph type="sldNum" idx="12"/>
-          </p:nvPr>
-        </p:nvSpPr>
-        <p:spPr>
-          <a:xfrm>
-            <a:off x="11587892" y="6361637"/>
-            <a:ext cx="414251" cy="365125"/>
-          </a:xfrm>
-          <a:prstGeom prst="rect">
-            <a:avLst/>
-          </a:prstGeom>
-          <a:noFill/>
-          <a:ln>
-            <a:noFill/>
-          </a:ln>
-        </p:spPr>
-        <p:txBody>
-          <a:bodyPr spcFirstLastPara="1" wrap="square" lIns="91425" tIns="45700" rIns="91425" bIns="45700" anchor="ctr" anchorCtr="0">
-            <a:noAutofit/>
-          </a:bodyPr>
-          <a:lstStyle/>
-          <a:p>
-            <a:pPr marL="0" lvl="0" indent="0" algn="r" rtl="0">
-              <a:spcBef>
-                <a:spcPts val="0"/>
-              </a:spcBef>
-              <a:spcAft>
-                <a:spcPts val="0"/>
-              </a:spcAft>
-              <a:buNone/>
-            </a:pPr>
-            <a:fld id="{00000000-1234-1234-1234-123412341234}" type="slidenum">
-              <a:rPr lang="en-US" sz="1400"/>
-              <a:t>9</a:t>
-            </a:fld>
-            <a:endParaRPr sz="1400"/>
-          </a:p>
-        </p:txBody>
-      </p:sp>
-      <p:sp>
-        <p:nvSpPr>
-          <p:cNvPr id="231" name="Google Shape;231;p9"/>
-          <p:cNvSpPr txBox="1">
-            <a:spLocks noGrp="1"/>
-          </p:cNvSpPr>
-          <p:nvPr>
-            <p:ph type="title"/>
-          </p:nvPr>
-        </p:nvSpPr>
-        <p:spPr>
-          <a:xfrm>
-            <a:off x="838200" y="365125"/>
-            <a:ext cx="10515600" cy="1325563"/>
-          </a:xfrm>
-          <a:prstGeom prst="rect">
-            <a:avLst/>
-          </a:prstGeom>
-          <a:noFill/>
-          <a:ln>
-            <a:noFill/>
-          </a:ln>
-        </p:spPr>
-        <p:txBody>
-          <a:bodyPr spcFirstLastPara="1" wrap="square" lIns="91425" tIns="45700" rIns="91425" bIns="45700" anchor="ctr" anchorCtr="0">
-            <a:normAutofit/>
-          </a:bodyPr>
-          <a:lstStyle/>
-          <a:p>
-            <a:pPr marL="0" lvl="0" indent="0" algn="l" rtl="0">
-              <a:lnSpc>
-                <a:spcPct val="90000"/>
-              </a:lnSpc>
-              <a:spcBef>
-                <a:spcPts val="0"/>
-              </a:spcBef>
-              <a:spcAft>
-                <a:spcPts val="0"/>
-              </a:spcAft>
-              <a:buClr>
-                <a:schemeClr val="dk1"/>
-              </a:buClr>
-              <a:buSzPts val="2800"/>
-              <a:buFont typeface="Calibri"/>
-              <a:buNone/>
-            </a:pPr>
-            <a:r>
-              <a:rPr lang="en-US" sz="2800" b="1" dirty="0">
-                <a:solidFill>
-                  <a:srgbClr val="FF0000"/>
-                </a:solidFill>
-              </a:rPr>
-              <a:t>Experiment: </a:t>
-            </a:r>
-            <a:r>
-              <a:rPr lang="en-US" sz="2800" b="1" dirty="0"/>
-              <a:t>Network Anomaly Lifecycle</a:t>
-            </a:r>
-            <a:br>
-              <a:rPr lang="en-US" sz="3600" dirty="0"/>
-            </a:br>
-            <a:r>
-              <a:rPr lang="en-US" sz="2700" dirty="0">
-                <a:solidFill>
-                  <a:srgbClr val="AEABAB"/>
-                </a:solidFill>
-              </a:rPr>
-              <a:t>draft-</a:t>
-            </a:r>
-            <a:r>
-              <a:rPr lang="en-US" sz="2700" dirty="0" err="1">
-                <a:solidFill>
-                  <a:srgbClr val="AEABAB"/>
-                </a:solidFill>
-              </a:rPr>
-              <a:t>netana</a:t>
-            </a:r>
-            <a:r>
-              <a:rPr lang="en-US" sz="2700" dirty="0">
-                <a:solidFill>
-                  <a:srgbClr val="AEABAB"/>
-                </a:solidFill>
-              </a:rPr>
-              <a:t>-</a:t>
-            </a:r>
-            <a:r>
-              <a:rPr lang="en-US" sz="2700" dirty="0" err="1">
-                <a:solidFill>
-                  <a:srgbClr val="AEABAB"/>
-                </a:solidFill>
-              </a:rPr>
-              <a:t>nmop</a:t>
-            </a:r>
-            <a:r>
-              <a:rPr lang="en-US" sz="2700" dirty="0">
-                <a:solidFill>
-                  <a:srgbClr val="AEABAB"/>
-                </a:solidFill>
-              </a:rPr>
-              <a:t>-network-anomaly-lifecycle</a:t>
-            </a:r>
-            <a:endParaRPr sz="2700" dirty="0">
-              <a:solidFill>
-                <a:srgbClr val="FF0000"/>
-              </a:solidFill>
-            </a:endParaRPr>
-          </a:p>
-        </p:txBody>
-      </p:sp>
-      <p:sp>
-        <p:nvSpPr>
-          <p:cNvPr id="232" name="Google Shape;232;p9"/>
-          <p:cNvSpPr/>
-          <p:nvPr/>
-        </p:nvSpPr>
-        <p:spPr>
-          <a:xfrm>
-            <a:off x="1063625" y="2506394"/>
-            <a:ext cx="3038475" cy="955944"/>
-          </a:xfrm>
-          <a:prstGeom prst="rect">
-            <a:avLst/>
-          </a:prstGeom>
-          <a:solidFill>
-            <a:schemeClr val="accent4">
-              <a:alpha val="9803"/>
-            </a:schemeClr>
-          </a:solidFill>
-          <a:ln w="25400" cap="flat" cmpd="sng">
-            <a:solidFill>
-              <a:schemeClr val="accent4"/>
-            </a:solidFill>
-            <a:prstDash val="solid"/>
-            <a:miter lim="800000"/>
-            <a:headEnd type="none" w="sm" len="sm"/>
-            <a:tailEnd type="none" w="sm" len="sm"/>
-          </a:ln>
-        </p:spPr>
-        <p:txBody>
-          <a:bodyPr spcFirstLastPara="1" wrap="square" lIns="91425" tIns="45700" rIns="91425" bIns="45700" anchor="ctr" anchorCtr="0">
-            <a:noAutofit/>
-          </a:bodyPr>
-          <a:lstStyle/>
-          <a:p>
-            <a:pPr marL="0" marR="0" lvl="0" indent="0" algn="ctr" rtl="0">
-              <a:spcBef>
-                <a:spcPts val="0"/>
-              </a:spcBef>
-              <a:spcAft>
-                <a:spcPts val="0"/>
-              </a:spcAft>
-              <a:buNone/>
-            </a:pPr>
-            <a:endParaRPr sz="1800" b="0" i="0" u="none" strike="noStrike" cap="none">
-              <a:solidFill>
-                <a:schemeClr val="lt1"/>
-              </a:solidFill>
-              <a:latin typeface="Calibri"/>
-              <a:ea typeface="Calibri"/>
-              <a:cs typeface="Calibri"/>
-              <a:sym typeface="Calibri"/>
-            </a:endParaRPr>
-          </a:p>
-        </p:txBody>
-      </p:sp>
-      <p:cxnSp>
-        <p:nvCxnSpPr>
-          <p:cNvPr id="233" name="Google Shape;233;p9"/>
-          <p:cNvCxnSpPr>
-            <a:stCxn id="232" idx="3"/>
-          </p:cNvCxnSpPr>
-          <p:nvPr/>
-        </p:nvCxnSpPr>
-        <p:spPr>
-          <a:xfrm>
-            <a:off x="4102100" y="2984366"/>
-            <a:ext cx="1993800" cy="716700"/>
-          </a:xfrm>
-          <a:prstGeom prst="straightConnector1">
-            <a:avLst/>
-          </a:prstGeom>
-          <a:noFill/>
-          <a:ln w="25400" cap="flat" cmpd="sng">
-            <a:solidFill>
-              <a:schemeClr val="accent4"/>
-            </a:solidFill>
-            <a:prstDash val="solid"/>
-            <a:miter lim="800000"/>
-            <a:headEnd type="none" w="sm" len="sm"/>
-            <a:tailEnd type="none" w="sm" len="sm"/>
-          </a:ln>
-        </p:spPr>
-      </p:cxnSp>
-      <p:sp>
-        <p:nvSpPr>
-          <p:cNvPr id="234" name="Google Shape;234;p9"/>
-          <p:cNvSpPr/>
-          <p:nvPr/>
-        </p:nvSpPr>
-        <p:spPr>
-          <a:xfrm>
-            <a:off x="1063625" y="3480070"/>
-            <a:ext cx="3038475" cy="287068"/>
-          </a:xfrm>
-          <a:prstGeom prst="rect">
-            <a:avLst/>
-          </a:prstGeom>
-          <a:solidFill>
-            <a:schemeClr val="accent2">
-              <a:alpha val="9803"/>
-            </a:schemeClr>
-          </a:solidFill>
-          <a:ln w="25400" cap="flat" cmpd="sng">
-            <a:solidFill>
-              <a:schemeClr val="accent2"/>
-            </a:solidFill>
-            <a:prstDash val="solid"/>
-            <a:miter lim="800000"/>
-            <a:headEnd type="none" w="sm" len="sm"/>
-            <a:tailEnd type="none" w="sm" len="sm"/>
-          </a:ln>
-        </p:spPr>
-        <p:txBody>
-          <a:bodyPr spcFirstLastPara="1" wrap="square" lIns="91425" tIns="45700" rIns="91425" bIns="45700" anchor="ctr" anchorCtr="0">
-            <a:noAutofit/>
-          </a:bodyPr>
-          <a:lstStyle/>
-          <a:p>
-            <a:pPr marL="0" marR="0" lvl="0" indent="0" algn="ctr" rtl="0">
-              <a:spcBef>
-                <a:spcPts val="0"/>
-              </a:spcBef>
-              <a:spcAft>
-                <a:spcPts val="0"/>
-              </a:spcAft>
-              <a:buNone/>
-            </a:pPr>
-            <a:endParaRPr sz="1800" b="0" i="0" u="none" strike="noStrike" cap="none">
-              <a:solidFill>
-                <a:schemeClr val="lt1"/>
-              </a:solidFill>
-              <a:latin typeface="Calibri"/>
-              <a:ea typeface="Calibri"/>
-              <a:cs typeface="Calibri"/>
-              <a:sym typeface="Calibri"/>
-            </a:endParaRPr>
-          </a:p>
-        </p:txBody>
-      </p:sp>
-      <p:sp>
-        <p:nvSpPr>
-          <p:cNvPr id="235" name="Google Shape;235;p9"/>
-          <p:cNvSpPr/>
-          <p:nvPr/>
-        </p:nvSpPr>
-        <p:spPr>
-          <a:xfrm>
-            <a:off x="1063625" y="2253473"/>
-            <a:ext cx="3038400" cy="241200"/>
-          </a:xfrm>
-          <a:prstGeom prst="rect">
-            <a:avLst/>
-          </a:prstGeom>
-          <a:solidFill>
-            <a:schemeClr val="accent1">
-              <a:alpha val="9803"/>
-            </a:schemeClr>
-          </a:solidFill>
-          <a:ln w="25400" cap="flat" cmpd="sng">
-            <a:solidFill>
-              <a:schemeClr val="accent1"/>
-            </a:solidFill>
-            <a:prstDash val="solid"/>
-            <a:miter lim="800000"/>
-            <a:headEnd type="none" w="sm" len="sm"/>
-            <a:tailEnd type="none" w="sm" len="sm"/>
-          </a:ln>
-        </p:spPr>
-        <p:txBody>
-          <a:bodyPr spcFirstLastPara="1" wrap="square" lIns="91425" tIns="45700" rIns="91425" bIns="45700" anchor="ctr" anchorCtr="0">
-            <a:noAutofit/>
-          </a:bodyPr>
-          <a:lstStyle/>
-          <a:p>
-            <a:pPr marL="0" marR="0" lvl="0" indent="0" algn="ctr" rtl="0">
-              <a:spcBef>
-                <a:spcPts val="0"/>
-              </a:spcBef>
-              <a:spcAft>
-                <a:spcPts val="0"/>
-              </a:spcAft>
-              <a:buNone/>
-            </a:pPr>
-            <a:endParaRPr sz="1800" b="0" i="0" u="none" strike="noStrike" cap="none">
-              <a:solidFill>
-                <a:schemeClr val="lt1"/>
-              </a:solidFill>
-              <a:latin typeface="Calibri"/>
-              <a:ea typeface="Calibri"/>
-              <a:cs typeface="Calibri"/>
-              <a:sym typeface="Calibri"/>
-            </a:endParaRPr>
-          </a:p>
-        </p:txBody>
-      </p:sp>
-      <p:cxnSp>
-        <p:nvCxnSpPr>
-          <p:cNvPr id="236" name="Google Shape;236;p9"/>
-          <p:cNvCxnSpPr>
-            <a:stCxn id="235" idx="3"/>
-          </p:cNvCxnSpPr>
-          <p:nvPr/>
-        </p:nvCxnSpPr>
-        <p:spPr>
-          <a:xfrm>
-            <a:off x="4102025" y="2374073"/>
-            <a:ext cx="2091300" cy="402600"/>
-          </a:xfrm>
-          <a:prstGeom prst="straightConnector1">
-            <a:avLst/>
-          </a:prstGeom>
-          <a:noFill/>
-          <a:ln w="25400" cap="flat" cmpd="sng">
-            <a:solidFill>
-              <a:schemeClr val="accent5"/>
-            </a:solidFill>
-            <a:prstDash val="solid"/>
-            <a:miter lim="800000"/>
-            <a:headEnd type="none" w="sm" len="sm"/>
-            <a:tailEnd type="none" w="sm" len="sm"/>
-          </a:ln>
-        </p:spPr>
-      </p:cxnSp>
-      <p:cxnSp>
-        <p:nvCxnSpPr>
-          <p:cNvPr id="237" name="Google Shape;237;p9"/>
-          <p:cNvCxnSpPr>
-            <a:stCxn id="234" idx="3"/>
-          </p:cNvCxnSpPr>
-          <p:nvPr/>
-        </p:nvCxnSpPr>
-        <p:spPr>
-          <a:xfrm>
-            <a:off x="4102100" y="3623604"/>
-            <a:ext cx="2091300" cy="1082100"/>
-          </a:xfrm>
-          <a:prstGeom prst="straightConnector1">
-            <a:avLst/>
-          </a:prstGeom>
-          <a:noFill/>
-          <a:ln w="25400" cap="flat" cmpd="sng">
-            <a:solidFill>
-              <a:schemeClr val="accent2"/>
-            </a:solidFill>
-            <a:prstDash val="solid"/>
-            <a:miter lim="800000"/>
-            <a:headEnd type="none" w="sm" len="sm"/>
-            <a:tailEnd type="none" w="sm" len="sm"/>
-          </a:ln>
-        </p:spPr>
-      </p:cxnSp>
     </p:spTree>
   </p:cSld>
   <p:clrMapOvr>

</xml_diff>

<commit_message>
added open access link
</commit_message>
<xml_diff>
--- a/120/NMOP/draft-netana-nmop-network-anomaly-architecture-semantics-lifecycle.pptx
+++ b/120/NMOP/draft-netana-nmop-network-anomaly-architecture-semantics-lifecycle.pptx
@@ -132,7 +132,7 @@
 <file path=ppt/revisionInfo.xml><?xml version="1.0" encoding="utf-8"?>
 <p1510:revInfo xmlns:a="http://schemas.openxmlformats.org/drawingml/2006/main" xmlns:r="http://schemas.openxmlformats.org/officeDocument/2006/relationships" xmlns:p1510="http://schemas.microsoft.com/office/powerpoint/2015/10/main">
   <p1510:revLst>
-    <p1510:client id="{D5F81756-EA00-4B65-9234-A0FB2F3D032D}" v="13" dt="2024-07-22T20:58:00.995"/>
+    <p1510:client id="{D5F81756-EA00-4B65-9234-A0FB2F3D032D}" v="14" dt="2024-07-25T20:40:39.687"/>
   </p1510:revLst>
 </p1510:revInfo>
 </file>
@@ -142,16 +142,24 @@
   <pc:docChgLst>
     <pc:chgData name="Graf Thomas, INI-NET-VNC-HCS" userId="487bc3e3-9ce7-4cdd-b7b4-8899ea88d289" providerId="ADAL" clId="{D5F81756-EA00-4B65-9234-A0FB2F3D032D}"/>
     <pc:docChg chg="undo redo custSel addSld delSld modSld sldOrd delMainMaster">
-      <pc:chgData name="Graf Thomas, INI-NET-VNC-HCS" userId="487bc3e3-9ce7-4cdd-b7b4-8899ea88d289" providerId="ADAL" clId="{D5F81756-EA00-4B65-9234-A0FB2F3D032D}" dt="2024-07-22T21:11:11.993" v="1200" actId="20577"/>
+      <pc:chgData name="Graf Thomas, INI-NET-VNC-HCS" userId="487bc3e3-9ce7-4cdd-b7b4-8899ea88d289" providerId="ADAL" clId="{D5F81756-EA00-4B65-9234-A0FB2F3D032D}" dt="2024-07-25T20:40:51.533" v="1220" actId="20577"/>
       <pc:docMkLst>
         <pc:docMk/>
       </pc:docMkLst>
-      <pc:sldChg chg="add">
-        <pc:chgData name="Graf Thomas, INI-NET-VNC-HCS" userId="487bc3e3-9ce7-4cdd-b7b4-8899ea88d289" providerId="ADAL" clId="{D5F81756-EA00-4B65-9234-A0FB2F3D032D}" dt="2024-07-22T20:58:00.993" v="815"/>
+      <pc:sldChg chg="modSp add mod">
+        <pc:chgData name="Graf Thomas, INI-NET-VNC-HCS" userId="487bc3e3-9ce7-4cdd-b7b4-8899ea88d289" providerId="ADAL" clId="{D5F81756-EA00-4B65-9234-A0FB2F3D032D}" dt="2024-07-25T20:40:42.185" v="1218" actId="6549"/>
         <pc:sldMkLst>
           <pc:docMk/>
           <pc:sldMk cId="0" sldId="256"/>
         </pc:sldMkLst>
+        <pc:spChg chg="mod">
+          <ac:chgData name="Graf Thomas, INI-NET-VNC-HCS" userId="487bc3e3-9ce7-4cdd-b7b4-8899ea88d289" providerId="ADAL" clId="{D5F81756-EA00-4B65-9234-A0FB2F3D032D}" dt="2024-07-25T20:40:42.185" v="1218" actId="6549"/>
+          <ac:spMkLst>
+            <pc:docMk/>
+            <pc:sldMk cId="0" sldId="256"/>
+            <ac:spMk id="127" creationId="{00000000-0000-0000-0000-000000000000}"/>
+          </ac:spMkLst>
+        </pc:spChg>
       </pc:sldChg>
       <pc:sldChg chg="modSp mod">
         <pc:chgData name="Graf Thomas, INI-NET-VNC-HCS" userId="487bc3e3-9ce7-4cdd-b7b4-8899ea88d289" providerId="ADAL" clId="{D5F81756-EA00-4B65-9234-A0FB2F3D032D}" dt="2024-07-22T20:50:00.951" v="622" actId="20577"/>
@@ -192,7 +200,7 @@
         </pc:spChg>
       </pc:sldChg>
       <pc:sldChg chg="modSp mod">
-        <pc:chgData name="Graf Thomas, INI-NET-VNC-HCS" userId="487bc3e3-9ce7-4cdd-b7b4-8899ea88d289" providerId="ADAL" clId="{D5F81756-EA00-4B65-9234-A0FB2F3D032D}" dt="2024-07-22T20:46:16.336" v="616" actId="20577"/>
+        <pc:chgData name="Graf Thomas, INI-NET-VNC-HCS" userId="487bc3e3-9ce7-4cdd-b7b4-8899ea88d289" providerId="ADAL" clId="{D5F81756-EA00-4B65-9234-A0FB2F3D032D}" dt="2024-07-25T20:40:51.533" v="1220" actId="20577"/>
         <pc:sldMkLst>
           <pc:docMk/>
           <pc:sldMk cId="3578665336" sldId="1041"/>
@@ -206,7 +214,7 @@
           </ac:spMkLst>
         </pc:spChg>
         <pc:spChg chg="mod">
-          <ac:chgData name="Graf Thomas, INI-NET-VNC-HCS" userId="487bc3e3-9ce7-4cdd-b7b4-8899ea88d289" providerId="ADAL" clId="{D5F81756-EA00-4B65-9234-A0FB2F3D032D}" dt="2024-07-22T20:46:16.336" v="616" actId="20577"/>
+          <ac:chgData name="Graf Thomas, INI-NET-VNC-HCS" userId="487bc3e3-9ce7-4cdd-b7b4-8899ea88d289" providerId="ADAL" clId="{D5F81756-EA00-4B65-9234-A0FB2F3D032D}" dt="2024-07-25T20:40:51.533" v="1220" actId="20577"/>
           <ac:spMkLst>
             <pc:docMk/>
             <pc:sldMk cId="3578665336" sldId="1041"/>
@@ -1504,7 +1512,7 @@
           <a:p>
             <a:fld id="{E5E705E9-673F-4AC4-B29E-A7B26F3B8523}" type="datetimeFigureOut">
               <a:rPr lang="de-CH" smtClean="0"/>
-              <a:t>22.07.2024</a:t>
+              <a:t>25.07.2024</a:t>
             </a:fld>
             <a:endParaRPr lang="de-CH"/>
           </a:p>
@@ -2792,7 +2800,7 @@
           <a:p>
             <a:fld id="{9E9B238C-2335-4007-98C9-471C02CC43B6}" type="datetimeFigureOut">
               <a:rPr lang="de-CH" smtClean="0"/>
-              <a:t>22.07.2024</a:t>
+              <a:t>25.07.2024</a:t>
             </a:fld>
             <a:endParaRPr lang="de-CH"/>
           </a:p>
@@ -2992,7 +3000,7 @@
           <a:p>
             <a:fld id="{9E9B238C-2335-4007-98C9-471C02CC43B6}" type="datetimeFigureOut">
               <a:rPr lang="de-CH" smtClean="0"/>
-              <a:t>22.07.2024</a:t>
+              <a:t>25.07.2024</a:t>
             </a:fld>
             <a:endParaRPr lang="de-CH"/>
           </a:p>
@@ -3202,7 +3210,7 @@
           <a:p>
             <a:fld id="{9E9B238C-2335-4007-98C9-471C02CC43B6}" type="datetimeFigureOut">
               <a:rPr lang="de-CH" smtClean="0"/>
-              <a:t>22.07.2024</a:t>
+              <a:t>25.07.2024</a:t>
             </a:fld>
             <a:endParaRPr lang="de-CH"/>
           </a:p>
@@ -3631,7 +3639,7 @@
           <a:p>
             <a:fld id="{9E9B238C-2335-4007-98C9-471C02CC43B6}" type="datetimeFigureOut">
               <a:rPr lang="de-CH" smtClean="0"/>
-              <a:t>22.07.2024</a:t>
+              <a:t>25.07.2024</a:t>
             </a:fld>
             <a:endParaRPr lang="de-CH"/>
           </a:p>
@@ -3907,7 +3915,7 @@
           <a:p>
             <a:fld id="{9E9B238C-2335-4007-98C9-471C02CC43B6}" type="datetimeFigureOut">
               <a:rPr lang="de-CH" smtClean="0"/>
-              <a:t>22.07.2024</a:t>
+              <a:t>25.07.2024</a:t>
             </a:fld>
             <a:endParaRPr lang="de-CH"/>
           </a:p>
@@ -4175,7 +4183,7 @@
           <a:p>
             <a:fld id="{9E9B238C-2335-4007-98C9-471C02CC43B6}" type="datetimeFigureOut">
               <a:rPr lang="de-CH" smtClean="0"/>
-              <a:t>22.07.2024</a:t>
+              <a:t>25.07.2024</a:t>
             </a:fld>
             <a:endParaRPr lang="de-CH"/>
           </a:p>
@@ -4590,7 +4598,7 @@
           <a:p>
             <a:fld id="{9E9B238C-2335-4007-98C9-471C02CC43B6}" type="datetimeFigureOut">
               <a:rPr lang="de-CH" smtClean="0"/>
-              <a:t>22.07.2024</a:t>
+              <a:t>25.07.2024</a:t>
             </a:fld>
             <a:endParaRPr lang="de-CH"/>
           </a:p>
@@ -4732,7 +4740,7 @@
           <a:p>
             <a:fld id="{9E9B238C-2335-4007-98C9-471C02CC43B6}" type="datetimeFigureOut">
               <a:rPr lang="de-CH" smtClean="0"/>
-              <a:t>22.07.2024</a:t>
+              <a:t>25.07.2024</a:t>
             </a:fld>
             <a:endParaRPr lang="de-CH"/>
           </a:p>
@@ -4845,7 +4853,7 @@
           <a:p>
             <a:fld id="{9E9B238C-2335-4007-98C9-471C02CC43B6}" type="datetimeFigureOut">
               <a:rPr lang="de-CH" smtClean="0"/>
-              <a:t>22.07.2024</a:t>
+              <a:t>25.07.2024</a:t>
             </a:fld>
             <a:endParaRPr lang="de-CH"/>
           </a:p>
@@ -5158,7 +5166,7 @@
           <a:p>
             <a:fld id="{9E9B238C-2335-4007-98C9-471C02CC43B6}" type="datetimeFigureOut">
               <a:rPr lang="de-CH" smtClean="0"/>
-              <a:t>22.07.2024</a:t>
+              <a:t>25.07.2024</a:t>
             </a:fld>
             <a:endParaRPr lang="de-CH"/>
           </a:p>
@@ -5447,7 +5455,7 @@
           <a:p>
             <a:fld id="{9E9B238C-2335-4007-98C9-471C02CC43B6}" type="datetimeFigureOut">
               <a:rPr lang="de-CH" smtClean="0"/>
-              <a:t>22.07.2024</a:t>
+              <a:t>25.07.2024</a:t>
             </a:fld>
             <a:endParaRPr lang="de-CH"/>
           </a:p>
@@ -5690,7 +5698,7 @@
           <a:p>
             <a:fld id="{9E9B238C-2335-4007-98C9-471C02CC43B6}" type="datetimeFigureOut">
               <a:rPr lang="de-CH" smtClean="0"/>
-              <a:t>22.07.2024</a:t>
+              <a:t>25.07.2024</a:t>
             </a:fld>
             <a:endParaRPr lang="de-CH"/>
           </a:p>
@@ -6524,10 +6532,10 @@
               <a:buNone/>
             </a:pPr>
             <a:r>
-              <a:rPr lang="de-CH" sz="1400" dirty="0">
+              <a:rPr lang="de-CH" sz="1400">
                 <a:latin typeface="+mj-lt"/>
               </a:rPr>
-              <a:t>22. </a:t>
+              <a:t>25. </a:t>
             </a:r>
             <a:r>
               <a:rPr lang="de-CH" sz="1400" dirty="0" err="1">
@@ -11637,7 +11645,7 @@
           </a:prstGeom>
           <a:extLst>
             <a:ext uri="{C572A759-6A51-4108-AA02-DFA0A04FC94B}">
-              <ma14:wrappingTextBoxFlag xmlns="" xmlns:m="http://schemas.openxmlformats.org/officeDocument/2006/math" xmlns:a14="http://schemas.microsoft.com/office/drawing/2010/main" xmlns:ma14="http://schemas.microsoft.com/office/mac/drawingml/2011/main" val="1"/>
+              <ma14:wrappingTextBoxFlag xmlns:ma14="http://schemas.microsoft.com/office/mac/drawingml/2011/main" xmlns:a14="http://schemas.microsoft.com/office/drawing/2010/main" xmlns:m="http://schemas.openxmlformats.org/officeDocument/2006/math" xmlns="" val="1"/>
             </a:ext>
           </a:extLst>
         </p:spPr>
@@ -11709,7 +11717,7 @@
           </a:ln>
           <a:extLst>
             <a:ext uri="{C572A759-6A51-4108-AA02-DFA0A04FC94B}">
-              <ma14:wrappingTextBoxFlag xmlns="" xmlns:m="http://schemas.openxmlformats.org/officeDocument/2006/math" xmlns:a14="http://schemas.microsoft.com/office/drawing/2010/main" xmlns:ma14="http://schemas.microsoft.com/office/mac/drawingml/2011/main" val="1"/>
+              <ma14:wrappingTextBoxFlag xmlns:ma14="http://schemas.microsoft.com/office/mac/drawingml/2011/main" xmlns:a14="http://schemas.microsoft.com/office/drawing/2010/main" xmlns:m="http://schemas.openxmlformats.org/officeDocument/2006/math" xmlns="" val="1"/>
             </a:ext>
           </a:extLst>
         </p:spPr>
@@ -11813,7 +11821,7 @@
         <p:spPr>
           <a:xfrm>
             <a:off x="966381" y="5285332"/>
-            <a:ext cx="5547593" cy="1291194"/>
+            <a:ext cx="5547593" cy="1323439"/>
           </a:xfrm>
           <a:prstGeom prst="rect">
             <a:avLst/>
@@ -11823,7 +11831,7 @@
           </a:ln>
           <a:extLst>
             <a:ext uri="{C572A759-6A51-4108-AA02-DFA0A04FC94B}">
-              <ma14:wrappingTextBoxFlag xmlns="" xmlns:m="http://schemas.openxmlformats.org/officeDocument/2006/math" xmlns:a14="http://schemas.microsoft.com/office/drawing/2010/main" xmlns:ma14="http://schemas.microsoft.com/office/mac/drawingml/2011/main" val="1"/>
+              <ma14:wrappingTextBoxFlag xmlns:ma14="http://schemas.microsoft.com/office/mac/drawingml/2011/main" xmlns:a14="http://schemas.microsoft.com/office/drawing/2010/main" xmlns:m="http://schemas.openxmlformats.org/officeDocument/2006/math" xmlns="" val="1"/>
             </a:ext>
           </a:extLst>
         </p:spPr>
@@ -11845,10 +11853,11 @@
               </a:defRPr>
             </a:pPr>
             <a:r>
+              <a:rPr dirty="0"/>
               <a:t>Paper “</a:t>
             </a:r>
             <a:r>
-              <a:rPr b="1">
+              <a:rPr b="1" dirty="0">
                 <a:solidFill>
                   <a:srgbClr val="FF0000"/>
                 </a:solidFill>
@@ -11856,6 +11865,7 @@
               <a:t>Practical Anomaly Detection in Internet Services: An ISP centric approach</a:t>
             </a:r>
             <a:r>
+              <a:rPr dirty="0"/>
               <a:t>” </a:t>
             </a:r>
           </a:p>
@@ -11868,7 +11878,16 @@
               </a:defRPr>
             </a:pPr>
             <a:r>
-              <a:t>Published at AnNet Workshop (In conjunction with IEEE NOMS)</a:t>
+              <a:rPr dirty="0"/>
+              <a:t>Published at </a:t>
+            </a:r>
+            <a:r>
+              <a:rPr dirty="0" err="1"/>
+              <a:t>AnNet</a:t>
+            </a:r>
+            <a:r>
+              <a:rPr dirty="0"/>
+              <a:t> Workshop (In conjunction with IEEE NOMS)</a:t>
             </a:r>
           </a:p>
           <a:p>
@@ -11880,6 +11899,7 @@
               </a:defRPr>
             </a:pPr>
             <a:r>
+              <a:rPr dirty="0"/>
               <a:t>Seoul, South Korea (6–10 May 2024)</a:t>
             </a:r>
           </a:p>
@@ -11892,8 +11912,24 @@
               </a:defRPr>
             </a:pPr>
             <a:r>
-              <a:t>DOI: 10.1109/NOMS59830.2024.10575071</a:t>
-            </a:r>
+              <a:rPr lang="de-CH" dirty="0"/>
+              <a:t>Open </a:t>
+            </a:r>
+            <a:r>
+              <a:rPr lang="de-CH" dirty="0" err="1"/>
+              <a:t>access</a:t>
+            </a:r>
+            <a:r>
+              <a:rPr lang="de-CH" dirty="0"/>
+              <a:t>: </a:t>
+            </a:r>
+            <a:r>
+              <a:rPr lang="de-CH" dirty="0">
+                <a:hlinkClick r:id="rId3"/>
+              </a:rPr>
+              <a:t>https://hal.science/hal-04655324</a:t>
+            </a:r>
+            <a:endParaRPr dirty="0"/>
           </a:p>
         </p:txBody>
       </p:sp>
@@ -11906,7 +11942,7 @@
           <p:nvPr/>
         </p:nvPicPr>
         <p:blipFill>
-          <a:blip r:embed="rId3"/>
+          <a:blip r:embed="rId4"/>
           <a:stretch>
             <a:fillRect/>
           </a:stretch>
@@ -11933,7 +11969,7 @@
           <p:nvPr/>
         </p:nvPicPr>
         <p:blipFill>
-          <a:blip r:embed="rId4"/>
+          <a:blip r:embed="rId5"/>
           <a:stretch>
             <a:fillRect/>
           </a:stretch>

</xml_diff>

<commit_message>
merged input from Vincenzo
</commit_message>
<xml_diff>
--- a/120/NMOP/draft-netana-nmop-network-anomaly-architecture-semantics-lifecycle.pptx
+++ b/120/NMOP/draft-netana-nmop-network-anomaly-architecture-semantics-lifecycle.pptx
@@ -15,7 +15,7 @@
     <p:sldId id="2145706226" r:id="rId6"/>
     <p:sldId id="2145706261" r:id="rId7"/>
     <p:sldId id="2145706258" r:id="rId8"/>
-    <p:sldId id="2145706240" r:id="rId9"/>
+    <p:sldId id="2145706286" r:id="rId9"/>
     <p:sldId id="263" r:id="rId10"/>
     <p:sldId id="264" r:id="rId11"/>
     <p:sldId id="2145706262" r:id="rId12"/>
@@ -1215,7 +1215,7 @@
       <a:pPr>
         <a:defRPr sz="1800"/>
       </a:pPr>
-      <a:endParaRPr lang="de-DE"/>
+      <a:endParaRPr lang="en-US"/>
     </a:p>
   </c:txPr>
   <c:externalData r:id="rId1">
@@ -1421,7 +1421,7 @@
       <a:pPr>
         <a:defRPr sz="1800"/>
       </a:pPr>
-      <a:endParaRPr lang="de-DE"/>
+      <a:endParaRPr lang="en-US"/>
     </a:p>
   </c:txPr>
   <c:externalData r:id="rId1">
@@ -1512,7 +1512,7 @@
           <a:p>
             <a:fld id="{E5E705E9-673F-4AC4-B29E-A7B26F3B8523}" type="datetimeFigureOut">
               <a:rPr lang="de-CH" smtClean="0"/>
-              <a:t>25.07.2024</a:t>
+              <a:t>26.07.2024</a:t>
             </a:fld>
             <a:endParaRPr lang="de-CH"/>
           </a:p>
@@ -2800,7 +2800,7 @@
           <a:p>
             <a:fld id="{9E9B238C-2335-4007-98C9-471C02CC43B6}" type="datetimeFigureOut">
               <a:rPr lang="de-CH" smtClean="0"/>
-              <a:t>25.07.2024</a:t>
+              <a:t>26.07.2024</a:t>
             </a:fld>
             <a:endParaRPr lang="de-CH"/>
           </a:p>
@@ -3000,7 +3000,7 @@
           <a:p>
             <a:fld id="{9E9B238C-2335-4007-98C9-471C02CC43B6}" type="datetimeFigureOut">
               <a:rPr lang="de-CH" smtClean="0"/>
-              <a:t>25.07.2024</a:t>
+              <a:t>26.07.2024</a:t>
             </a:fld>
             <a:endParaRPr lang="de-CH"/>
           </a:p>
@@ -3210,7 +3210,7 @@
           <a:p>
             <a:fld id="{9E9B238C-2335-4007-98C9-471C02CC43B6}" type="datetimeFigureOut">
               <a:rPr lang="de-CH" smtClean="0"/>
-              <a:t>25.07.2024</a:t>
+              <a:t>26.07.2024</a:t>
             </a:fld>
             <a:endParaRPr lang="de-CH"/>
           </a:p>
@@ -3639,7 +3639,7 @@
           <a:p>
             <a:fld id="{9E9B238C-2335-4007-98C9-471C02CC43B6}" type="datetimeFigureOut">
               <a:rPr lang="de-CH" smtClean="0"/>
-              <a:t>25.07.2024</a:t>
+              <a:t>26.07.2024</a:t>
             </a:fld>
             <a:endParaRPr lang="de-CH"/>
           </a:p>
@@ -3915,7 +3915,7 @@
           <a:p>
             <a:fld id="{9E9B238C-2335-4007-98C9-471C02CC43B6}" type="datetimeFigureOut">
               <a:rPr lang="de-CH" smtClean="0"/>
-              <a:t>25.07.2024</a:t>
+              <a:t>26.07.2024</a:t>
             </a:fld>
             <a:endParaRPr lang="de-CH"/>
           </a:p>
@@ -4183,7 +4183,7 @@
           <a:p>
             <a:fld id="{9E9B238C-2335-4007-98C9-471C02CC43B6}" type="datetimeFigureOut">
               <a:rPr lang="de-CH" smtClean="0"/>
-              <a:t>25.07.2024</a:t>
+              <a:t>26.07.2024</a:t>
             </a:fld>
             <a:endParaRPr lang="de-CH"/>
           </a:p>
@@ -4598,7 +4598,7 @@
           <a:p>
             <a:fld id="{9E9B238C-2335-4007-98C9-471C02CC43B6}" type="datetimeFigureOut">
               <a:rPr lang="de-CH" smtClean="0"/>
-              <a:t>25.07.2024</a:t>
+              <a:t>26.07.2024</a:t>
             </a:fld>
             <a:endParaRPr lang="de-CH"/>
           </a:p>
@@ -4740,7 +4740,7 @@
           <a:p>
             <a:fld id="{9E9B238C-2335-4007-98C9-471C02CC43B6}" type="datetimeFigureOut">
               <a:rPr lang="de-CH" smtClean="0"/>
-              <a:t>25.07.2024</a:t>
+              <a:t>26.07.2024</a:t>
             </a:fld>
             <a:endParaRPr lang="de-CH"/>
           </a:p>
@@ -4853,7 +4853,7 @@
           <a:p>
             <a:fld id="{9E9B238C-2335-4007-98C9-471C02CC43B6}" type="datetimeFigureOut">
               <a:rPr lang="de-CH" smtClean="0"/>
-              <a:t>25.07.2024</a:t>
+              <a:t>26.07.2024</a:t>
             </a:fld>
             <a:endParaRPr lang="de-CH"/>
           </a:p>
@@ -5166,7 +5166,7 @@
           <a:p>
             <a:fld id="{9E9B238C-2335-4007-98C9-471C02CC43B6}" type="datetimeFigureOut">
               <a:rPr lang="de-CH" smtClean="0"/>
-              <a:t>25.07.2024</a:t>
+              <a:t>26.07.2024</a:t>
             </a:fld>
             <a:endParaRPr lang="de-CH"/>
           </a:p>
@@ -5455,7 +5455,7 @@
           <a:p>
             <a:fld id="{9E9B238C-2335-4007-98C9-471C02CC43B6}" type="datetimeFigureOut">
               <a:rPr lang="de-CH" smtClean="0"/>
-              <a:t>25.07.2024</a:t>
+              <a:t>26.07.2024</a:t>
             </a:fld>
             <a:endParaRPr lang="de-CH"/>
           </a:p>
@@ -5698,7 +5698,7 @@
           <a:p>
             <a:fld id="{9E9B238C-2335-4007-98C9-471C02CC43B6}" type="datetimeFigureOut">
               <a:rPr lang="de-CH" smtClean="0"/>
-              <a:t>25.07.2024</a:t>
+              <a:t>26.07.2024</a:t>
             </a:fld>
             <a:endParaRPr lang="de-CH"/>
           </a:p>
@@ -6599,734 +6599,6 @@
       </p:grpSpPr>
       <p:sp>
         <p:nvSpPr>
-          <p:cNvPr id="226" name="Google Shape;226;p9"/>
-          <p:cNvSpPr txBox="1"/>
-          <p:nvPr/>
-        </p:nvSpPr>
-        <p:spPr>
-          <a:xfrm>
-            <a:off x="838198" y="1484344"/>
-            <a:ext cx="4373880" cy="2329677"/>
-          </a:xfrm>
-          <a:prstGeom prst="rect">
-            <a:avLst/>
-          </a:prstGeom>
-          <a:noFill/>
-          <a:ln>
-            <a:noFill/>
-          </a:ln>
-        </p:spPr>
-        <p:txBody>
-          <a:bodyPr spcFirstLastPara="1" wrap="square" lIns="91425" tIns="45700" rIns="91425" bIns="45700" anchor="t" anchorCtr="0">
-            <a:spAutoFit/>
-          </a:bodyPr>
-          <a:lstStyle/>
-          <a:p>
-            <a:pPr marL="0" marR="0" lvl="0" indent="0" algn="l" rtl="0">
-              <a:lnSpc>
-                <a:spcPct val="107000"/>
-              </a:lnSpc>
-              <a:spcBef>
-                <a:spcPts val="0"/>
-              </a:spcBef>
-              <a:spcAft>
-                <a:spcPts val="0"/>
-              </a:spcAft>
-              <a:buNone/>
-            </a:pPr>
-            <a:r>
-              <a:rPr lang="en-US" sz="850" b="0" i="0" u="none" strike="noStrike" cap="none">
-                <a:solidFill>
-                  <a:schemeClr val="dk1"/>
-                </a:solidFill>
-                <a:latin typeface="Courier New"/>
-                <a:ea typeface="Courier New"/>
-                <a:cs typeface="Courier New"/>
-                <a:sym typeface="Courier New"/>
-              </a:rPr>
-              <a:t>module: ietf-network-anomaly-metadata</a:t>
-            </a:r>
-            <a:endParaRPr/>
-          </a:p>
-          <a:p>
-            <a:pPr marL="0" marR="0" lvl="0" indent="0" algn="l" rtl="0">
-              <a:lnSpc>
-                <a:spcPct val="107000"/>
-              </a:lnSpc>
-              <a:spcBef>
-                <a:spcPts val="0"/>
-              </a:spcBef>
-              <a:spcAft>
-                <a:spcPts val="0"/>
-              </a:spcAft>
-              <a:buNone/>
-            </a:pPr>
-            <a:r>
-              <a:rPr lang="en-US" sz="850" b="0" i="0" u="none" strike="noStrike" cap="none">
-                <a:solidFill>
-                  <a:schemeClr val="dk1"/>
-                </a:solidFill>
-                <a:latin typeface="Courier New"/>
-                <a:ea typeface="Courier New"/>
-                <a:cs typeface="Courier New"/>
-                <a:sym typeface="Courier New"/>
-              </a:rPr>
-              <a:t>  +--rw network-anomalies</a:t>
-            </a:r>
-            <a:endParaRPr/>
-          </a:p>
-          <a:p>
-            <a:pPr marL="0" marR="0" lvl="0" indent="0" algn="l" rtl="0">
-              <a:lnSpc>
-                <a:spcPct val="107000"/>
-              </a:lnSpc>
-              <a:spcBef>
-                <a:spcPts val="0"/>
-              </a:spcBef>
-              <a:spcAft>
-                <a:spcPts val="0"/>
-              </a:spcAft>
-              <a:buNone/>
-            </a:pPr>
-            <a:r>
-              <a:rPr lang="en-US" sz="850" b="0" i="0" u="none" strike="noStrike" cap="none">
-                <a:solidFill>
-                  <a:schemeClr val="dk1"/>
-                </a:solidFill>
-                <a:latin typeface="Courier New"/>
-                <a:ea typeface="Courier New"/>
-                <a:cs typeface="Courier New"/>
-                <a:sym typeface="Courier New"/>
-              </a:rPr>
-              <a:t>    +--rw network-anomaly* [id version]</a:t>
-            </a:r>
-            <a:endParaRPr/>
-          </a:p>
-          <a:p>
-            <a:pPr marL="0" marR="0" lvl="0" indent="0" algn="l" rtl="0">
-              <a:lnSpc>
-                <a:spcPct val="107000"/>
-              </a:lnSpc>
-              <a:spcBef>
-                <a:spcPts val="0"/>
-              </a:spcBef>
-              <a:spcAft>
-                <a:spcPts val="0"/>
-              </a:spcAft>
-              <a:buNone/>
-            </a:pPr>
-            <a:r>
-              <a:rPr lang="en-US" sz="850" b="0" i="0" u="none" strike="noStrike" cap="none">
-                <a:solidFill>
-                  <a:schemeClr val="dk1"/>
-                </a:solidFill>
-                <a:latin typeface="Courier New"/>
-                <a:ea typeface="Courier New"/>
-                <a:cs typeface="Courier New"/>
-                <a:sym typeface="Courier New"/>
-              </a:rPr>
-              <a:t>      +--rw id             yang:uuid</a:t>
-            </a:r>
-            <a:endParaRPr sz="850" b="0" i="0" u="none" strike="noStrike" cap="none">
-              <a:solidFill>
-                <a:schemeClr val="dk1"/>
-              </a:solidFill>
-              <a:latin typeface="Courier New"/>
-              <a:ea typeface="Courier New"/>
-              <a:cs typeface="Courier New"/>
-              <a:sym typeface="Courier New"/>
-            </a:endParaRPr>
-          </a:p>
-          <a:p>
-            <a:pPr marL="0" marR="0" lvl="0" indent="0" algn="l" rtl="0">
-              <a:lnSpc>
-                <a:spcPct val="107000"/>
-              </a:lnSpc>
-              <a:spcBef>
-                <a:spcPts val="0"/>
-              </a:spcBef>
-              <a:spcAft>
-                <a:spcPts val="0"/>
-              </a:spcAft>
-              <a:buNone/>
-            </a:pPr>
-            <a:r>
-              <a:rPr lang="en-US" sz="850" b="0" i="0" u="none" strike="noStrike" cap="none">
-                <a:solidFill>
-                  <a:schemeClr val="dk1"/>
-                </a:solidFill>
-                <a:latin typeface="Courier New"/>
-                <a:ea typeface="Courier New"/>
-                <a:cs typeface="Courier New"/>
-                <a:sym typeface="Courier New"/>
-              </a:rPr>
-              <a:t>      +--rw version        uint32</a:t>
-            </a:r>
-            <a:endParaRPr/>
-          </a:p>
-          <a:p>
-            <a:pPr marL="0" marR="0" lvl="0" indent="0" algn="l" rtl="0">
-              <a:lnSpc>
-                <a:spcPct val="107000"/>
-              </a:lnSpc>
-              <a:spcBef>
-                <a:spcPts val="0"/>
-              </a:spcBef>
-              <a:spcAft>
-                <a:spcPts val="0"/>
-              </a:spcAft>
-              <a:buNone/>
-            </a:pPr>
-            <a:r>
-              <a:rPr lang="en-US" sz="850" b="0" i="0" u="none" strike="noStrike" cap="none">
-                <a:solidFill>
-                  <a:schemeClr val="dk1"/>
-                </a:solidFill>
-                <a:latin typeface="Courier New"/>
-                <a:ea typeface="Courier New"/>
-                <a:cs typeface="Courier New"/>
-                <a:sym typeface="Courier New"/>
-              </a:rPr>
-              <a:t>      +--rw description?   string</a:t>
-            </a:r>
-            <a:endParaRPr/>
-          </a:p>
-          <a:p>
-            <a:pPr marL="0" marR="0" lvl="0" indent="0" algn="l" rtl="0">
-              <a:lnSpc>
-                <a:spcPct val="107000"/>
-              </a:lnSpc>
-              <a:spcBef>
-                <a:spcPts val="0"/>
-              </a:spcBef>
-              <a:spcAft>
-                <a:spcPts val="0"/>
-              </a:spcAft>
-              <a:buNone/>
-            </a:pPr>
-            <a:r>
-              <a:rPr lang="en-US" sz="850" b="0" i="0" u="none" strike="noStrike" cap="none">
-                <a:solidFill>
-                  <a:schemeClr val="dk1"/>
-                </a:solidFill>
-                <a:latin typeface="Courier New"/>
-                <a:ea typeface="Courier New"/>
-                <a:cs typeface="Courier New"/>
-                <a:sym typeface="Courier New"/>
-              </a:rPr>
-              <a:t>      +--rw state          identityref</a:t>
-            </a:r>
-            <a:endParaRPr sz="850" b="0" i="0" u="none" strike="noStrike" cap="none">
-              <a:solidFill>
-                <a:schemeClr val="dk1"/>
-              </a:solidFill>
-              <a:latin typeface="Courier New"/>
-              <a:ea typeface="Courier New"/>
-              <a:cs typeface="Courier New"/>
-              <a:sym typeface="Courier New"/>
-            </a:endParaRPr>
-          </a:p>
-          <a:p>
-            <a:pPr marL="0" marR="0" lvl="0" indent="0" algn="l" rtl="0">
-              <a:lnSpc>
-                <a:spcPct val="107000"/>
-              </a:lnSpc>
-              <a:spcBef>
-                <a:spcPts val="0"/>
-              </a:spcBef>
-              <a:spcAft>
-                <a:spcPts val="0"/>
-              </a:spcAft>
-              <a:buNone/>
-            </a:pPr>
-            <a:r>
-              <a:rPr lang="en-US" sz="850" b="0" i="0" u="none" strike="noStrike" cap="none">
-                <a:solidFill>
-                  <a:schemeClr val="dk1"/>
-                </a:solidFill>
-                <a:latin typeface="Courier New"/>
-                <a:ea typeface="Courier New"/>
-                <a:cs typeface="Courier New"/>
-                <a:sym typeface="Courier New"/>
-              </a:rPr>
-              <a:t>      +--rw annotator</a:t>
-            </a:r>
-            <a:endParaRPr/>
-          </a:p>
-          <a:p>
-            <a:pPr marL="0" marR="0" lvl="0" indent="0" algn="l" rtl="0">
-              <a:lnSpc>
-                <a:spcPct val="107000"/>
-              </a:lnSpc>
-              <a:spcBef>
-                <a:spcPts val="0"/>
-              </a:spcBef>
-              <a:spcAft>
-                <a:spcPts val="0"/>
-              </a:spcAft>
-              <a:buNone/>
-            </a:pPr>
-            <a:r>
-              <a:rPr lang="en-US" sz="850" b="0" i="0" u="none" strike="noStrike" cap="none">
-                <a:solidFill>
-                  <a:schemeClr val="dk1"/>
-                </a:solidFill>
-                <a:latin typeface="Courier New"/>
-                <a:ea typeface="Courier New"/>
-                <a:cs typeface="Courier New"/>
-                <a:sym typeface="Courier New"/>
-              </a:rPr>
-              <a:t>      |  +--rw (annotator-type)</a:t>
-            </a:r>
-            <a:endParaRPr/>
-          </a:p>
-          <a:p>
-            <a:pPr marL="0" marR="0" lvl="0" indent="0" algn="l" rtl="0">
-              <a:lnSpc>
-                <a:spcPct val="107000"/>
-              </a:lnSpc>
-              <a:spcBef>
-                <a:spcPts val="0"/>
-              </a:spcBef>
-              <a:spcAft>
-                <a:spcPts val="0"/>
-              </a:spcAft>
-              <a:buNone/>
-            </a:pPr>
-            <a:r>
-              <a:rPr lang="en-US" sz="850" b="0" i="0" u="none" strike="noStrike" cap="none">
-                <a:solidFill>
-                  <a:schemeClr val="dk1"/>
-                </a:solidFill>
-                <a:latin typeface="Courier New"/>
-                <a:ea typeface="Courier New"/>
-                <a:cs typeface="Courier New"/>
-                <a:sym typeface="Courier New"/>
-              </a:rPr>
-              <a:t>      |  |  +--:(human)</a:t>
-            </a:r>
-            <a:endParaRPr/>
-          </a:p>
-          <a:p>
-            <a:pPr marL="0" marR="0" lvl="0" indent="0" algn="l" rtl="0">
-              <a:lnSpc>
-                <a:spcPct val="107000"/>
-              </a:lnSpc>
-              <a:spcBef>
-                <a:spcPts val="0"/>
-              </a:spcBef>
-              <a:spcAft>
-                <a:spcPts val="0"/>
-              </a:spcAft>
-              <a:buNone/>
-            </a:pPr>
-            <a:r>
-              <a:rPr lang="en-US" sz="850" b="0" i="0" u="none" strike="noStrike" cap="none">
-                <a:solidFill>
-                  <a:schemeClr val="dk1"/>
-                </a:solidFill>
-                <a:latin typeface="Courier New"/>
-                <a:ea typeface="Courier New"/>
-                <a:cs typeface="Courier New"/>
-                <a:sym typeface="Courier New"/>
-              </a:rPr>
-              <a:t>      |  |  |  +--rw human        empty</a:t>
-            </a:r>
-            <a:endParaRPr/>
-          </a:p>
-          <a:p>
-            <a:pPr marL="0" marR="0" lvl="0" indent="0" algn="l" rtl="0">
-              <a:lnSpc>
-                <a:spcPct val="107000"/>
-              </a:lnSpc>
-              <a:spcBef>
-                <a:spcPts val="0"/>
-              </a:spcBef>
-              <a:spcAft>
-                <a:spcPts val="0"/>
-              </a:spcAft>
-              <a:buNone/>
-            </a:pPr>
-            <a:r>
-              <a:rPr lang="en-US" sz="850" b="0" i="0" u="none" strike="noStrike" cap="none">
-                <a:solidFill>
-                  <a:schemeClr val="dk1"/>
-                </a:solidFill>
-                <a:latin typeface="Courier New"/>
-                <a:ea typeface="Courier New"/>
-                <a:cs typeface="Courier New"/>
-                <a:sym typeface="Courier New"/>
-              </a:rPr>
-              <a:t>      |  |  +--:(algorithm)</a:t>
-            </a:r>
-            <a:endParaRPr/>
-          </a:p>
-          <a:p>
-            <a:pPr marL="0" marR="0" lvl="0" indent="0" algn="l" rtl="0">
-              <a:lnSpc>
-                <a:spcPct val="107000"/>
-              </a:lnSpc>
-              <a:spcBef>
-                <a:spcPts val="0"/>
-              </a:spcBef>
-              <a:spcAft>
-                <a:spcPts val="0"/>
-              </a:spcAft>
-              <a:buNone/>
-            </a:pPr>
-            <a:r>
-              <a:rPr lang="en-US" sz="850" b="0" i="0" u="none" strike="noStrike" cap="none">
-                <a:solidFill>
-                  <a:schemeClr val="dk1"/>
-                </a:solidFill>
-                <a:latin typeface="Courier New"/>
-                <a:ea typeface="Courier New"/>
-                <a:cs typeface="Courier New"/>
-                <a:sym typeface="Courier New"/>
-              </a:rPr>
-              <a:t>      |  |     +--rw algorithm    empty</a:t>
-            </a:r>
-            <a:endParaRPr/>
-          </a:p>
-          <a:p>
-            <a:pPr marL="0" marR="0" lvl="0" indent="0" algn="l" rtl="0">
-              <a:lnSpc>
-                <a:spcPct val="107000"/>
-              </a:lnSpc>
-              <a:spcBef>
-                <a:spcPts val="0"/>
-              </a:spcBef>
-              <a:spcAft>
-                <a:spcPts val="0"/>
-              </a:spcAft>
-              <a:buNone/>
-            </a:pPr>
-            <a:r>
-              <a:rPr lang="en-US" sz="850" b="0" i="0" u="none" strike="noStrike" cap="none">
-                <a:solidFill>
-                  <a:schemeClr val="dk1"/>
-                </a:solidFill>
-                <a:latin typeface="Courier New"/>
-                <a:ea typeface="Courier New"/>
-                <a:cs typeface="Courier New"/>
-                <a:sym typeface="Courier New"/>
-              </a:rPr>
-              <a:t>      |  +--rw name?              empty</a:t>
-            </a:r>
-            <a:endParaRPr/>
-          </a:p>
-          <a:p>
-            <a:pPr marL="0" marR="0" lvl="0" indent="0" algn="l" rtl="0">
-              <a:lnSpc>
-                <a:spcPct val="107000"/>
-              </a:lnSpc>
-              <a:spcBef>
-                <a:spcPts val="0"/>
-              </a:spcBef>
-              <a:spcAft>
-                <a:spcPts val="0"/>
-              </a:spcAft>
-              <a:buNone/>
-            </a:pPr>
-            <a:r>
-              <a:rPr lang="en-US" sz="850" b="0" i="0" u="none" strike="noStrike" cap="none">
-                <a:solidFill>
-                  <a:schemeClr val="dk1"/>
-                </a:solidFill>
-                <a:latin typeface="Courier New"/>
-                <a:ea typeface="Courier New"/>
-                <a:cs typeface="Courier New"/>
-                <a:sym typeface="Courier New"/>
-              </a:rPr>
-              <a:t>      +--rw symptoms* [symptom_id]</a:t>
-            </a:r>
-            <a:endParaRPr/>
-          </a:p>
-          <a:p>
-            <a:pPr marL="0" marR="0" lvl="0" indent="0" algn="l" rtl="0">
-              <a:lnSpc>
-                <a:spcPct val="107000"/>
-              </a:lnSpc>
-              <a:spcBef>
-                <a:spcPts val="0"/>
-              </a:spcBef>
-              <a:spcAft>
-                <a:spcPts val="0"/>
-              </a:spcAft>
-              <a:buNone/>
-            </a:pPr>
-            <a:r>
-              <a:rPr lang="en-US" sz="850" b="0" i="0" u="none" strike="noStrike" cap="none">
-                <a:solidFill>
-                  <a:schemeClr val="dk1"/>
-                </a:solidFill>
-                <a:latin typeface="Courier New"/>
-                <a:ea typeface="Courier New"/>
-                <a:cs typeface="Courier New"/>
-                <a:sym typeface="Courier New"/>
-              </a:rPr>
-              <a:t>        +--rw symptom_id    yang:uuid</a:t>
-            </a:r>
-            <a:endParaRPr sz="850" b="0" i="0" u="none" strike="noStrike" cap="none">
-              <a:solidFill>
-                <a:schemeClr val="dk1"/>
-              </a:solidFill>
-              <a:latin typeface="Courier New"/>
-              <a:ea typeface="Courier New"/>
-              <a:cs typeface="Courier New"/>
-              <a:sym typeface="Courier New"/>
-            </a:endParaRPr>
-          </a:p>
-        </p:txBody>
-      </p:sp>
-      <p:sp>
-        <p:nvSpPr>
-          <p:cNvPr id="227" name="Google Shape;227;p9"/>
-          <p:cNvSpPr txBox="1">
-            <a:spLocks noGrp="1"/>
-          </p:cNvSpPr>
-          <p:nvPr>
-            <p:ph type="body" idx="1"/>
-          </p:nvPr>
-        </p:nvSpPr>
-        <p:spPr>
-          <a:xfrm>
-            <a:off x="6193410" y="1929384"/>
-            <a:ext cx="5229402" cy="3823716"/>
-          </a:xfrm>
-          <a:prstGeom prst="rect">
-            <a:avLst/>
-          </a:prstGeom>
-          <a:noFill/>
-          <a:ln>
-            <a:noFill/>
-          </a:ln>
-        </p:spPr>
-        <p:txBody>
-          <a:bodyPr spcFirstLastPara="1" wrap="square" lIns="91425" tIns="45700" rIns="91425" bIns="45700" anchor="t" anchorCtr="0">
-            <a:noAutofit/>
-          </a:bodyPr>
-          <a:lstStyle/>
-          <a:p>
-            <a:pPr marL="228600" lvl="0" indent="-228600" algn="l" rtl="0">
-              <a:lnSpc>
-                <a:spcPct val="90000"/>
-              </a:lnSpc>
-              <a:spcBef>
-                <a:spcPts val="0"/>
-              </a:spcBef>
-              <a:spcAft>
-                <a:spcPts val="0"/>
-              </a:spcAft>
-              <a:buClr>
-                <a:srgbClr val="FF0000"/>
-              </a:buClr>
-              <a:buSzPts val="2000"/>
-              <a:buChar char="•"/>
-            </a:pPr>
-            <a:r>
-              <a:rPr lang="en-US" sz="2000" b="1" dirty="0">
-                <a:solidFill>
-                  <a:srgbClr val="FF0000"/>
-                </a:solidFill>
-              </a:rPr>
-              <a:t>ID and Description</a:t>
-            </a:r>
-            <a:r>
-              <a:rPr lang="en-US" sz="2000" dirty="0"/>
-              <a:t> uniquely identifies the detected network anomaly (as a container of symptoms).</a:t>
-            </a:r>
-            <a:endParaRPr dirty="0"/>
-          </a:p>
-          <a:p>
-            <a:pPr marL="228600" lvl="0" indent="-228600" algn="l" rtl="0">
-              <a:lnSpc>
-                <a:spcPct val="90000"/>
-              </a:lnSpc>
-              <a:spcBef>
-                <a:spcPts val="1000"/>
-              </a:spcBef>
-              <a:spcAft>
-                <a:spcPts val="0"/>
-              </a:spcAft>
-              <a:buClr>
-                <a:srgbClr val="FF0000"/>
-              </a:buClr>
-              <a:buSzPts val="2000"/>
-              <a:buChar char="•"/>
-            </a:pPr>
-            <a:r>
-              <a:rPr lang="en-US" sz="2000" b="1" dirty="0">
-                <a:solidFill>
-                  <a:srgbClr val="FF0000"/>
-                </a:solidFill>
-              </a:rPr>
-              <a:t>Description and State </a:t>
-            </a:r>
-            <a:r>
-              <a:rPr lang="en-US" sz="2000" dirty="0"/>
-              <a:t>provide general information regarding the anomaly and . </a:t>
-            </a:r>
-            <a:endParaRPr dirty="0"/>
-          </a:p>
-          <a:p>
-            <a:pPr marL="228600" lvl="0" indent="-228600" algn="l" rtl="0">
-              <a:lnSpc>
-                <a:spcPct val="90000"/>
-              </a:lnSpc>
-              <a:spcBef>
-                <a:spcPts val="1000"/>
-              </a:spcBef>
-              <a:spcAft>
-                <a:spcPts val="0"/>
-              </a:spcAft>
-              <a:buClr>
-                <a:srgbClr val="FF0000"/>
-              </a:buClr>
-              <a:buSzPts val="2000"/>
-              <a:buChar char="•"/>
-            </a:pPr>
-            <a:r>
-              <a:rPr lang="en-US" sz="2000" b="1" dirty="0">
-                <a:solidFill>
-                  <a:srgbClr val="FF0000"/>
-                </a:solidFill>
-              </a:rPr>
-              <a:t>Annotator </a:t>
-            </a:r>
-            <a:r>
-              <a:rPr lang="en-US" sz="2000" dirty="0"/>
-              <a:t>describes the entity that observed the network anomaly: this can be a human or an algorithm (anomaly detection system). </a:t>
-            </a:r>
-            <a:endParaRPr dirty="0"/>
-          </a:p>
-          <a:p>
-            <a:pPr marL="228600" lvl="0" indent="-228600" algn="l" rtl="0">
-              <a:lnSpc>
-                <a:spcPct val="90000"/>
-              </a:lnSpc>
-              <a:spcBef>
-                <a:spcPts val="1000"/>
-              </a:spcBef>
-              <a:spcAft>
-                <a:spcPts val="0"/>
-              </a:spcAft>
-              <a:buClr>
-                <a:srgbClr val="FF0000"/>
-              </a:buClr>
-              <a:buSzPts val="2000"/>
-              <a:buChar char="•"/>
-            </a:pPr>
-            <a:r>
-              <a:rPr lang="en-US" sz="2000" b="1" dirty="0">
-                <a:solidFill>
-                  <a:srgbClr val="FF0000"/>
-                </a:solidFill>
-              </a:rPr>
-              <a:t>Symptoms </a:t>
-            </a:r>
-            <a:r>
-              <a:rPr lang="en-US" sz="2000" dirty="0"/>
-              <a:t>provides a list of symptoms (based on </a:t>
-            </a:r>
-            <a:r>
-              <a:rPr lang="en-US" sz="2000" dirty="0" err="1"/>
-              <a:t>ietf</a:t>
-            </a:r>
-            <a:r>
-              <a:rPr lang="en-US" sz="2000" dirty="0"/>
-              <a:t>-symptom-metadata) that are part of this network anomaly.</a:t>
-            </a:r>
-            <a:endParaRPr dirty="0"/>
-          </a:p>
-        </p:txBody>
-      </p:sp>
-      <p:sp>
-        <p:nvSpPr>
-          <p:cNvPr id="228" name="Google Shape;228;p9"/>
-          <p:cNvSpPr/>
-          <p:nvPr/>
-        </p:nvSpPr>
-        <p:spPr>
-          <a:xfrm>
-            <a:off x="1063625" y="1810474"/>
-            <a:ext cx="3038400" cy="416400"/>
-          </a:xfrm>
-          <a:prstGeom prst="rect">
-            <a:avLst/>
-          </a:prstGeom>
-          <a:solidFill>
-            <a:schemeClr val="accent6">
-              <a:alpha val="9803"/>
-            </a:schemeClr>
-          </a:solidFill>
-          <a:ln w="25400" cap="flat" cmpd="sng">
-            <a:solidFill>
-              <a:schemeClr val="accent6"/>
-            </a:solidFill>
-            <a:prstDash val="solid"/>
-            <a:miter lim="800000"/>
-            <a:headEnd type="none" w="sm" len="sm"/>
-            <a:tailEnd type="none" w="sm" len="sm"/>
-          </a:ln>
-        </p:spPr>
-        <p:txBody>
-          <a:bodyPr spcFirstLastPara="1" wrap="square" lIns="91425" tIns="45700" rIns="91425" bIns="45700" anchor="ctr" anchorCtr="0">
-            <a:noAutofit/>
-          </a:bodyPr>
-          <a:lstStyle/>
-          <a:p>
-            <a:pPr marL="0" marR="0" lvl="0" indent="0" algn="ctr" rtl="0">
-              <a:spcBef>
-                <a:spcPts val="0"/>
-              </a:spcBef>
-              <a:spcAft>
-                <a:spcPts val="0"/>
-              </a:spcAft>
-              <a:buNone/>
-            </a:pPr>
-            <a:endParaRPr sz="1800" b="0" i="0" u="none" strike="noStrike" cap="none">
-              <a:solidFill>
-                <a:schemeClr val="lt1"/>
-              </a:solidFill>
-              <a:latin typeface="Calibri"/>
-              <a:ea typeface="Calibri"/>
-              <a:cs typeface="Calibri"/>
-              <a:sym typeface="Calibri"/>
-            </a:endParaRPr>
-          </a:p>
-        </p:txBody>
-      </p:sp>
-      <p:cxnSp>
-        <p:nvCxnSpPr>
-          <p:cNvPr id="229" name="Google Shape;229;p9"/>
-          <p:cNvCxnSpPr>
-            <a:stCxn id="228" idx="3"/>
-          </p:cNvCxnSpPr>
-          <p:nvPr/>
-        </p:nvCxnSpPr>
-        <p:spPr>
-          <a:xfrm>
-            <a:off x="4102025" y="2018674"/>
-            <a:ext cx="2091300" cy="90300"/>
-          </a:xfrm>
-          <a:prstGeom prst="straightConnector1">
-            <a:avLst/>
-          </a:prstGeom>
-          <a:noFill/>
-          <a:ln w="25400" cap="flat" cmpd="sng">
-            <a:solidFill>
-              <a:schemeClr val="accent6"/>
-            </a:solidFill>
-            <a:prstDash val="solid"/>
-            <a:miter lim="800000"/>
-            <a:headEnd type="none" w="sm" len="sm"/>
-            <a:tailEnd type="none" w="sm" len="sm"/>
-          </a:ln>
-        </p:spPr>
-      </p:cxnSp>
-      <p:sp>
-        <p:nvSpPr>
           <p:cNvPr id="230" name="Google Shape;230;p9"/>
           <p:cNvSpPr txBox="1">
             <a:spLocks noGrp="1"/>
@@ -7482,13 +6754,888 @@
       </p:sp>
       <p:sp>
         <p:nvSpPr>
-          <p:cNvPr id="232" name="Google Shape;232;p9"/>
+          <p:cNvPr id="16" name="Google Shape;226;p9">
+            <a:extLst>
+              <a:ext uri="{FF2B5EF4-FFF2-40B4-BE49-F238E27FC236}">
+                <a16:creationId xmlns:a16="http://schemas.microsoft.com/office/drawing/2014/main" id="{67C1976E-DEC1-4995-AC2A-E245AB7416D8}"/>
+              </a:ext>
+            </a:extLst>
+          </p:cNvPr>
+          <p:cNvSpPr txBox="1"/>
+          <p:nvPr/>
+        </p:nvSpPr>
+        <p:spPr>
+          <a:xfrm>
+            <a:off x="838198" y="3655037"/>
+            <a:ext cx="4373880" cy="2329677"/>
+          </a:xfrm>
+          <a:prstGeom prst="rect">
+            <a:avLst/>
+          </a:prstGeom>
+          <a:noFill/>
+          <a:ln>
+            <a:noFill/>
+          </a:ln>
+        </p:spPr>
+        <p:txBody>
+          <a:bodyPr spcFirstLastPara="1" wrap="square" lIns="91425" tIns="45700" rIns="91425" bIns="45700" anchor="t" anchorCtr="0">
+            <a:spAutoFit/>
+          </a:bodyPr>
+          <a:lstStyle/>
+          <a:p>
+            <a:pPr marL="0" marR="0" lvl="0" indent="0" algn="l" rtl="0">
+              <a:lnSpc>
+                <a:spcPct val="107000"/>
+              </a:lnSpc>
+              <a:spcBef>
+                <a:spcPts val="0"/>
+              </a:spcBef>
+              <a:spcAft>
+                <a:spcPts val="0"/>
+              </a:spcAft>
+              <a:buNone/>
+            </a:pPr>
+            <a:r>
+              <a:rPr lang="en-US" sz="850" b="0" i="0" u="none" strike="noStrike" cap="none">
+                <a:solidFill>
+                  <a:schemeClr val="dk1"/>
+                </a:solidFill>
+                <a:latin typeface="Courier New"/>
+                <a:ea typeface="Courier New"/>
+                <a:cs typeface="Courier New"/>
+                <a:sym typeface="Courier New"/>
+              </a:rPr>
+              <a:t>module: ietf-network-anomaly-metadata</a:t>
+            </a:r>
+            <a:endParaRPr/>
+          </a:p>
+          <a:p>
+            <a:pPr marL="0" marR="0" lvl="0" indent="0" algn="l" rtl="0">
+              <a:lnSpc>
+                <a:spcPct val="107000"/>
+              </a:lnSpc>
+              <a:spcBef>
+                <a:spcPts val="0"/>
+              </a:spcBef>
+              <a:spcAft>
+                <a:spcPts val="0"/>
+              </a:spcAft>
+              <a:buNone/>
+            </a:pPr>
+            <a:r>
+              <a:rPr lang="en-US" sz="850" b="0" i="0" u="none" strike="noStrike" cap="none">
+                <a:solidFill>
+                  <a:schemeClr val="dk1"/>
+                </a:solidFill>
+                <a:latin typeface="Courier New"/>
+                <a:ea typeface="Courier New"/>
+                <a:cs typeface="Courier New"/>
+                <a:sym typeface="Courier New"/>
+              </a:rPr>
+              <a:t>  +--rw network-anomalies</a:t>
+            </a:r>
+            <a:endParaRPr/>
+          </a:p>
+          <a:p>
+            <a:pPr marL="0" marR="0" lvl="0" indent="0" algn="l" rtl="0">
+              <a:lnSpc>
+                <a:spcPct val="107000"/>
+              </a:lnSpc>
+              <a:spcBef>
+                <a:spcPts val="0"/>
+              </a:spcBef>
+              <a:spcAft>
+                <a:spcPts val="0"/>
+              </a:spcAft>
+              <a:buNone/>
+            </a:pPr>
+            <a:r>
+              <a:rPr lang="en-US" sz="850" b="0" i="0" u="none" strike="noStrike" cap="none">
+                <a:solidFill>
+                  <a:schemeClr val="dk1"/>
+                </a:solidFill>
+                <a:latin typeface="Courier New"/>
+                <a:ea typeface="Courier New"/>
+                <a:cs typeface="Courier New"/>
+                <a:sym typeface="Courier New"/>
+              </a:rPr>
+              <a:t>    +--rw network-anomaly* [id version]</a:t>
+            </a:r>
+            <a:endParaRPr/>
+          </a:p>
+          <a:p>
+            <a:pPr marL="0" marR="0" lvl="0" indent="0" algn="l" rtl="0">
+              <a:lnSpc>
+                <a:spcPct val="107000"/>
+              </a:lnSpc>
+              <a:spcBef>
+                <a:spcPts val="0"/>
+              </a:spcBef>
+              <a:spcAft>
+                <a:spcPts val="0"/>
+              </a:spcAft>
+              <a:buNone/>
+            </a:pPr>
+            <a:r>
+              <a:rPr lang="en-US" sz="850" b="0" i="0" u="none" strike="noStrike" cap="none">
+                <a:solidFill>
+                  <a:schemeClr val="dk1"/>
+                </a:solidFill>
+                <a:latin typeface="Courier New"/>
+                <a:ea typeface="Courier New"/>
+                <a:cs typeface="Courier New"/>
+                <a:sym typeface="Courier New"/>
+              </a:rPr>
+              <a:t>      +--rw id             yang:uuid</a:t>
+            </a:r>
+            <a:endParaRPr sz="850" b="0" i="0" u="none" strike="noStrike" cap="none">
+              <a:solidFill>
+                <a:schemeClr val="dk1"/>
+              </a:solidFill>
+              <a:latin typeface="Courier New"/>
+              <a:ea typeface="Courier New"/>
+              <a:cs typeface="Courier New"/>
+              <a:sym typeface="Courier New"/>
+            </a:endParaRPr>
+          </a:p>
+          <a:p>
+            <a:pPr marL="0" marR="0" lvl="0" indent="0" algn="l" rtl="0">
+              <a:lnSpc>
+                <a:spcPct val="107000"/>
+              </a:lnSpc>
+              <a:spcBef>
+                <a:spcPts val="0"/>
+              </a:spcBef>
+              <a:spcAft>
+                <a:spcPts val="0"/>
+              </a:spcAft>
+              <a:buNone/>
+            </a:pPr>
+            <a:r>
+              <a:rPr lang="en-US" sz="850" b="0" i="0" u="none" strike="noStrike" cap="none">
+                <a:solidFill>
+                  <a:schemeClr val="dk1"/>
+                </a:solidFill>
+                <a:latin typeface="Courier New"/>
+                <a:ea typeface="Courier New"/>
+                <a:cs typeface="Courier New"/>
+                <a:sym typeface="Courier New"/>
+              </a:rPr>
+              <a:t>      +--rw version        uint32</a:t>
+            </a:r>
+            <a:endParaRPr/>
+          </a:p>
+          <a:p>
+            <a:pPr marL="0" marR="0" lvl="0" indent="0" algn="l" rtl="0">
+              <a:lnSpc>
+                <a:spcPct val="107000"/>
+              </a:lnSpc>
+              <a:spcBef>
+                <a:spcPts val="0"/>
+              </a:spcBef>
+              <a:spcAft>
+                <a:spcPts val="0"/>
+              </a:spcAft>
+              <a:buNone/>
+            </a:pPr>
+            <a:r>
+              <a:rPr lang="en-US" sz="850" b="0" i="0" u="none" strike="noStrike" cap="none">
+                <a:solidFill>
+                  <a:schemeClr val="dk1"/>
+                </a:solidFill>
+                <a:latin typeface="Courier New"/>
+                <a:ea typeface="Courier New"/>
+                <a:cs typeface="Courier New"/>
+                <a:sym typeface="Courier New"/>
+              </a:rPr>
+              <a:t>      +--rw description?   string</a:t>
+            </a:r>
+            <a:endParaRPr/>
+          </a:p>
+          <a:p>
+            <a:pPr marL="0" marR="0" lvl="0" indent="0" algn="l" rtl="0">
+              <a:lnSpc>
+                <a:spcPct val="107000"/>
+              </a:lnSpc>
+              <a:spcBef>
+                <a:spcPts val="0"/>
+              </a:spcBef>
+              <a:spcAft>
+                <a:spcPts val="0"/>
+              </a:spcAft>
+              <a:buNone/>
+            </a:pPr>
+            <a:r>
+              <a:rPr lang="en-US" sz="850" b="0" i="0" u="none" strike="noStrike" cap="none">
+                <a:solidFill>
+                  <a:schemeClr val="dk1"/>
+                </a:solidFill>
+                <a:latin typeface="Courier New"/>
+                <a:ea typeface="Courier New"/>
+                <a:cs typeface="Courier New"/>
+                <a:sym typeface="Courier New"/>
+              </a:rPr>
+              <a:t>      +--rw state          identityref</a:t>
+            </a:r>
+            <a:endParaRPr sz="850" b="0" i="0" u="none" strike="noStrike" cap="none">
+              <a:solidFill>
+                <a:schemeClr val="dk1"/>
+              </a:solidFill>
+              <a:latin typeface="Courier New"/>
+              <a:ea typeface="Courier New"/>
+              <a:cs typeface="Courier New"/>
+              <a:sym typeface="Courier New"/>
+            </a:endParaRPr>
+          </a:p>
+          <a:p>
+            <a:pPr marL="0" marR="0" lvl="0" indent="0" algn="l" rtl="0">
+              <a:lnSpc>
+                <a:spcPct val="107000"/>
+              </a:lnSpc>
+              <a:spcBef>
+                <a:spcPts val="0"/>
+              </a:spcBef>
+              <a:spcAft>
+                <a:spcPts val="0"/>
+              </a:spcAft>
+              <a:buNone/>
+            </a:pPr>
+            <a:r>
+              <a:rPr lang="en-US" sz="850" b="0" i="0" u="none" strike="noStrike" cap="none">
+                <a:solidFill>
+                  <a:schemeClr val="dk1"/>
+                </a:solidFill>
+                <a:latin typeface="Courier New"/>
+                <a:ea typeface="Courier New"/>
+                <a:cs typeface="Courier New"/>
+                <a:sym typeface="Courier New"/>
+              </a:rPr>
+              <a:t>      +--rw annotator</a:t>
+            </a:r>
+            <a:endParaRPr/>
+          </a:p>
+          <a:p>
+            <a:pPr marL="0" marR="0" lvl="0" indent="0" algn="l" rtl="0">
+              <a:lnSpc>
+                <a:spcPct val="107000"/>
+              </a:lnSpc>
+              <a:spcBef>
+                <a:spcPts val="0"/>
+              </a:spcBef>
+              <a:spcAft>
+                <a:spcPts val="0"/>
+              </a:spcAft>
+              <a:buNone/>
+            </a:pPr>
+            <a:r>
+              <a:rPr lang="en-US" sz="850" b="0" i="0" u="none" strike="noStrike" cap="none">
+                <a:solidFill>
+                  <a:schemeClr val="dk1"/>
+                </a:solidFill>
+                <a:latin typeface="Courier New"/>
+                <a:ea typeface="Courier New"/>
+                <a:cs typeface="Courier New"/>
+                <a:sym typeface="Courier New"/>
+              </a:rPr>
+              <a:t>      |  +--rw (annotator-type)</a:t>
+            </a:r>
+            <a:endParaRPr/>
+          </a:p>
+          <a:p>
+            <a:pPr marL="0" marR="0" lvl="0" indent="0" algn="l" rtl="0">
+              <a:lnSpc>
+                <a:spcPct val="107000"/>
+              </a:lnSpc>
+              <a:spcBef>
+                <a:spcPts val="0"/>
+              </a:spcBef>
+              <a:spcAft>
+                <a:spcPts val="0"/>
+              </a:spcAft>
+              <a:buNone/>
+            </a:pPr>
+            <a:r>
+              <a:rPr lang="en-US" sz="850" b="0" i="0" u="none" strike="noStrike" cap="none">
+                <a:solidFill>
+                  <a:schemeClr val="dk1"/>
+                </a:solidFill>
+                <a:latin typeface="Courier New"/>
+                <a:ea typeface="Courier New"/>
+                <a:cs typeface="Courier New"/>
+                <a:sym typeface="Courier New"/>
+              </a:rPr>
+              <a:t>      |  |  +--:(human)</a:t>
+            </a:r>
+            <a:endParaRPr/>
+          </a:p>
+          <a:p>
+            <a:pPr marL="0" marR="0" lvl="0" indent="0" algn="l" rtl="0">
+              <a:lnSpc>
+                <a:spcPct val="107000"/>
+              </a:lnSpc>
+              <a:spcBef>
+                <a:spcPts val="0"/>
+              </a:spcBef>
+              <a:spcAft>
+                <a:spcPts val="0"/>
+              </a:spcAft>
+              <a:buNone/>
+            </a:pPr>
+            <a:r>
+              <a:rPr lang="en-US" sz="850" b="0" i="0" u="none" strike="noStrike" cap="none">
+                <a:solidFill>
+                  <a:schemeClr val="dk1"/>
+                </a:solidFill>
+                <a:latin typeface="Courier New"/>
+                <a:ea typeface="Courier New"/>
+                <a:cs typeface="Courier New"/>
+                <a:sym typeface="Courier New"/>
+              </a:rPr>
+              <a:t>      |  |  |  +--rw human        empty</a:t>
+            </a:r>
+            <a:endParaRPr/>
+          </a:p>
+          <a:p>
+            <a:pPr marL="0" marR="0" lvl="0" indent="0" algn="l" rtl="0">
+              <a:lnSpc>
+                <a:spcPct val="107000"/>
+              </a:lnSpc>
+              <a:spcBef>
+                <a:spcPts val="0"/>
+              </a:spcBef>
+              <a:spcAft>
+                <a:spcPts val="0"/>
+              </a:spcAft>
+              <a:buNone/>
+            </a:pPr>
+            <a:r>
+              <a:rPr lang="en-US" sz="850" b="0" i="0" u="none" strike="noStrike" cap="none">
+                <a:solidFill>
+                  <a:schemeClr val="dk1"/>
+                </a:solidFill>
+                <a:latin typeface="Courier New"/>
+                <a:ea typeface="Courier New"/>
+                <a:cs typeface="Courier New"/>
+                <a:sym typeface="Courier New"/>
+              </a:rPr>
+              <a:t>      |  |  +--:(algorithm)</a:t>
+            </a:r>
+            <a:endParaRPr/>
+          </a:p>
+          <a:p>
+            <a:pPr marL="0" marR="0" lvl="0" indent="0" algn="l" rtl="0">
+              <a:lnSpc>
+                <a:spcPct val="107000"/>
+              </a:lnSpc>
+              <a:spcBef>
+                <a:spcPts val="0"/>
+              </a:spcBef>
+              <a:spcAft>
+                <a:spcPts val="0"/>
+              </a:spcAft>
+              <a:buNone/>
+            </a:pPr>
+            <a:r>
+              <a:rPr lang="en-US" sz="850" b="0" i="0" u="none" strike="noStrike" cap="none">
+                <a:solidFill>
+                  <a:schemeClr val="dk1"/>
+                </a:solidFill>
+                <a:latin typeface="Courier New"/>
+                <a:ea typeface="Courier New"/>
+                <a:cs typeface="Courier New"/>
+                <a:sym typeface="Courier New"/>
+              </a:rPr>
+              <a:t>      |  |     +--rw algorithm    empty</a:t>
+            </a:r>
+            <a:endParaRPr/>
+          </a:p>
+          <a:p>
+            <a:pPr marL="0" marR="0" lvl="0" indent="0" algn="l" rtl="0">
+              <a:lnSpc>
+                <a:spcPct val="107000"/>
+              </a:lnSpc>
+              <a:spcBef>
+                <a:spcPts val="0"/>
+              </a:spcBef>
+              <a:spcAft>
+                <a:spcPts val="0"/>
+              </a:spcAft>
+              <a:buNone/>
+            </a:pPr>
+            <a:r>
+              <a:rPr lang="en-US" sz="850" b="0" i="0" u="none" strike="noStrike" cap="none">
+                <a:solidFill>
+                  <a:schemeClr val="dk1"/>
+                </a:solidFill>
+                <a:latin typeface="Courier New"/>
+                <a:ea typeface="Courier New"/>
+                <a:cs typeface="Courier New"/>
+                <a:sym typeface="Courier New"/>
+              </a:rPr>
+              <a:t>      |  +--rw name?              empty</a:t>
+            </a:r>
+            <a:endParaRPr/>
+          </a:p>
+          <a:p>
+            <a:pPr marL="0" marR="0" lvl="0" indent="0" algn="l" rtl="0">
+              <a:lnSpc>
+                <a:spcPct val="107000"/>
+              </a:lnSpc>
+              <a:spcBef>
+                <a:spcPts val="0"/>
+              </a:spcBef>
+              <a:spcAft>
+                <a:spcPts val="0"/>
+              </a:spcAft>
+              <a:buNone/>
+            </a:pPr>
+            <a:r>
+              <a:rPr lang="en-US" sz="850" b="0" i="0" u="none" strike="noStrike" cap="none">
+                <a:solidFill>
+                  <a:schemeClr val="dk1"/>
+                </a:solidFill>
+                <a:latin typeface="Courier New"/>
+                <a:ea typeface="Courier New"/>
+                <a:cs typeface="Courier New"/>
+                <a:sym typeface="Courier New"/>
+              </a:rPr>
+              <a:t>      +--rw symptoms* [symptom_id]</a:t>
+            </a:r>
+            <a:endParaRPr/>
+          </a:p>
+          <a:p>
+            <a:pPr marL="0" marR="0" lvl="0" indent="0" algn="l" rtl="0">
+              <a:lnSpc>
+                <a:spcPct val="107000"/>
+              </a:lnSpc>
+              <a:spcBef>
+                <a:spcPts val="0"/>
+              </a:spcBef>
+              <a:spcAft>
+                <a:spcPts val="0"/>
+              </a:spcAft>
+              <a:buNone/>
+            </a:pPr>
+            <a:r>
+              <a:rPr lang="en-US" sz="850" b="0" i="0" u="none" strike="noStrike" cap="none">
+                <a:solidFill>
+                  <a:schemeClr val="dk1"/>
+                </a:solidFill>
+                <a:latin typeface="Courier New"/>
+                <a:ea typeface="Courier New"/>
+                <a:cs typeface="Courier New"/>
+                <a:sym typeface="Courier New"/>
+              </a:rPr>
+              <a:t>        +--rw symptom_id    yang:uuid</a:t>
+            </a:r>
+            <a:endParaRPr sz="850" b="0" i="0" u="none" strike="noStrike" cap="none">
+              <a:solidFill>
+                <a:schemeClr val="dk1"/>
+              </a:solidFill>
+              <a:latin typeface="Courier New"/>
+              <a:ea typeface="Courier New"/>
+              <a:cs typeface="Courier New"/>
+              <a:sym typeface="Courier New"/>
+            </a:endParaRPr>
+          </a:p>
+        </p:txBody>
+      </p:sp>
+      <p:sp>
+        <p:nvSpPr>
+          <p:cNvPr id="17" name="Google Shape;227;p9">
+            <a:extLst>
+              <a:ext uri="{FF2B5EF4-FFF2-40B4-BE49-F238E27FC236}">
+                <a16:creationId xmlns:a16="http://schemas.microsoft.com/office/drawing/2014/main" id="{CEA9526A-4F2B-4D15-9C72-45091122001E}"/>
+              </a:ext>
+            </a:extLst>
+          </p:cNvPr>
+          <p:cNvSpPr txBox="1">
+            <a:spLocks/>
+          </p:cNvSpPr>
+          <p:nvPr/>
+        </p:nvSpPr>
+        <p:spPr>
+          <a:xfrm>
+            <a:off x="6193410" y="2819928"/>
+            <a:ext cx="5229402" cy="3823716"/>
+          </a:xfrm>
+          <a:prstGeom prst="rect">
+            <a:avLst/>
+          </a:prstGeom>
+          <a:noFill/>
+          <a:ln>
+            <a:noFill/>
+          </a:ln>
+        </p:spPr>
+        <p:txBody>
+          <a:bodyPr spcFirstLastPara="1" vert="horz" wrap="square" lIns="91425" tIns="45700" rIns="91425" bIns="45700" rtlCol="0" anchor="t" anchorCtr="0">
+            <a:noAutofit/>
+          </a:bodyPr>
+          <a:lstStyle>
+            <a:lvl1pPr marL="228600" indent="-228600" algn="l" defTabSz="914400" rtl="0" eaLnBrk="1" latinLnBrk="0" hangingPunct="1">
+              <a:lnSpc>
+                <a:spcPct val="90000"/>
+              </a:lnSpc>
+              <a:spcBef>
+                <a:spcPts val="1000"/>
+              </a:spcBef>
+              <a:buFont typeface="Arial" panose="020B0604020202020204" pitchFamily="34" charset="0"/>
+              <a:buChar char="•"/>
+              <a:defRPr sz="2800" kern="1200">
+                <a:solidFill>
+                  <a:schemeClr val="tx1"/>
+                </a:solidFill>
+                <a:latin typeface="+mn-lt"/>
+                <a:ea typeface="+mn-ea"/>
+                <a:cs typeface="+mn-cs"/>
+              </a:defRPr>
+            </a:lvl1pPr>
+            <a:lvl2pPr marL="685800" indent="-228600" algn="l" defTabSz="914400" rtl="0" eaLnBrk="1" latinLnBrk="0" hangingPunct="1">
+              <a:lnSpc>
+                <a:spcPct val="90000"/>
+              </a:lnSpc>
+              <a:spcBef>
+                <a:spcPts val="500"/>
+              </a:spcBef>
+              <a:buFont typeface="Arial" panose="020B0604020202020204" pitchFamily="34" charset="0"/>
+              <a:buChar char="•"/>
+              <a:defRPr sz="2400" kern="1200">
+                <a:solidFill>
+                  <a:schemeClr val="tx1"/>
+                </a:solidFill>
+                <a:latin typeface="+mn-lt"/>
+                <a:ea typeface="+mn-ea"/>
+                <a:cs typeface="+mn-cs"/>
+              </a:defRPr>
+            </a:lvl2pPr>
+            <a:lvl3pPr marL="1143000" indent="-228600" algn="l" defTabSz="914400" rtl="0" eaLnBrk="1" latinLnBrk="0" hangingPunct="1">
+              <a:lnSpc>
+                <a:spcPct val="90000"/>
+              </a:lnSpc>
+              <a:spcBef>
+                <a:spcPts val="500"/>
+              </a:spcBef>
+              <a:buFont typeface="Arial" panose="020B0604020202020204" pitchFamily="34" charset="0"/>
+              <a:buChar char="•"/>
+              <a:defRPr sz="2000" kern="1200">
+                <a:solidFill>
+                  <a:schemeClr val="tx1"/>
+                </a:solidFill>
+                <a:latin typeface="+mn-lt"/>
+                <a:ea typeface="+mn-ea"/>
+                <a:cs typeface="+mn-cs"/>
+              </a:defRPr>
+            </a:lvl3pPr>
+            <a:lvl4pPr marL="1600200" indent="-228600" algn="l" defTabSz="914400" rtl="0" eaLnBrk="1" latinLnBrk="0" hangingPunct="1">
+              <a:lnSpc>
+                <a:spcPct val="90000"/>
+              </a:lnSpc>
+              <a:spcBef>
+                <a:spcPts val="500"/>
+              </a:spcBef>
+              <a:buFont typeface="Arial" panose="020B0604020202020204" pitchFamily="34" charset="0"/>
+              <a:buChar char="•"/>
+              <a:defRPr sz="1800" kern="1200">
+                <a:solidFill>
+                  <a:schemeClr val="tx1"/>
+                </a:solidFill>
+                <a:latin typeface="+mn-lt"/>
+                <a:ea typeface="+mn-ea"/>
+                <a:cs typeface="+mn-cs"/>
+              </a:defRPr>
+            </a:lvl4pPr>
+            <a:lvl5pPr marL="2057400" indent="-228600" algn="l" defTabSz="914400" rtl="0" eaLnBrk="1" latinLnBrk="0" hangingPunct="1">
+              <a:lnSpc>
+                <a:spcPct val="90000"/>
+              </a:lnSpc>
+              <a:spcBef>
+                <a:spcPts val="500"/>
+              </a:spcBef>
+              <a:buFont typeface="Arial" panose="020B0604020202020204" pitchFamily="34" charset="0"/>
+              <a:buChar char="•"/>
+              <a:defRPr sz="1800" kern="1200">
+                <a:solidFill>
+                  <a:schemeClr val="tx1"/>
+                </a:solidFill>
+                <a:latin typeface="+mn-lt"/>
+                <a:ea typeface="+mn-ea"/>
+                <a:cs typeface="+mn-cs"/>
+              </a:defRPr>
+            </a:lvl5pPr>
+            <a:lvl6pPr marL="2514600" indent="-228600" algn="l" defTabSz="914400" rtl="0" eaLnBrk="1" latinLnBrk="0" hangingPunct="1">
+              <a:lnSpc>
+                <a:spcPct val="90000"/>
+              </a:lnSpc>
+              <a:spcBef>
+                <a:spcPts val="500"/>
+              </a:spcBef>
+              <a:buFont typeface="Arial" panose="020B0604020202020204" pitchFamily="34" charset="0"/>
+              <a:buChar char="•"/>
+              <a:defRPr sz="1800" kern="1200">
+                <a:solidFill>
+                  <a:schemeClr val="tx1"/>
+                </a:solidFill>
+                <a:latin typeface="+mn-lt"/>
+                <a:ea typeface="+mn-ea"/>
+                <a:cs typeface="+mn-cs"/>
+              </a:defRPr>
+            </a:lvl6pPr>
+            <a:lvl7pPr marL="2971800" indent="-228600" algn="l" defTabSz="914400" rtl="0" eaLnBrk="1" latinLnBrk="0" hangingPunct="1">
+              <a:lnSpc>
+                <a:spcPct val="90000"/>
+              </a:lnSpc>
+              <a:spcBef>
+                <a:spcPts val="500"/>
+              </a:spcBef>
+              <a:buFont typeface="Arial" panose="020B0604020202020204" pitchFamily="34" charset="0"/>
+              <a:buChar char="•"/>
+              <a:defRPr sz="1800" kern="1200">
+                <a:solidFill>
+                  <a:schemeClr val="tx1"/>
+                </a:solidFill>
+                <a:latin typeface="+mn-lt"/>
+                <a:ea typeface="+mn-ea"/>
+                <a:cs typeface="+mn-cs"/>
+              </a:defRPr>
+            </a:lvl7pPr>
+            <a:lvl8pPr marL="3429000" indent="-228600" algn="l" defTabSz="914400" rtl="0" eaLnBrk="1" latinLnBrk="0" hangingPunct="1">
+              <a:lnSpc>
+                <a:spcPct val="90000"/>
+              </a:lnSpc>
+              <a:spcBef>
+                <a:spcPts val="500"/>
+              </a:spcBef>
+              <a:buFont typeface="Arial" panose="020B0604020202020204" pitchFamily="34" charset="0"/>
+              <a:buChar char="•"/>
+              <a:defRPr sz="1800" kern="1200">
+                <a:solidFill>
+                  <a:schemeClr val="tx1"/>
+                </a:solidFill>
+                <a:latin typeface="+mn-lt"/>
+                <a:ea typeface="+mn-ea"/>
+                <a:cs typeface="+mn-cs"/>
+              </a:defRPr>
+            </a:lvl8pPr>
+            <a:lvl9pPr marL="3886200" indent="-228600" algn="l" defTabSz="914400" rtl="0" eaLnBrk="1" latinLnBrk="0" hangingPunct="1">
+              <a:lnSpc>
+                <a:spcPct val="90000"/>
+              </a:lnSpc>
+              <a:spcBef>
+                <a:spcPts val="500"/>
+              </a:spcBef>
+              <a:buFont typeface="Arial" panose="020B0604020202020204" pitchFamily="34" charset="0"/>
+              <a:buChar char="•"/>
+              <a:defRPr sz="1800" kern="1200">
+                <a:solidFill>
+                  <a:schemeClr val="tx1"/>
+                </a:solidFill>
+                <a:latin typeface="+mn-lt"/>
+                <a:ea typeface="+mn-ea"/>
+                <a:cs typeface="+mn-cs"/>
+              </a:defRPr>
+            </a:lvl9pPr>
+          </a:lstStyle>
+          <a:p>
+            <a:pPr>
+              <a:spcBef>
+                <a:spcPts val="0"/>
+              </a:spcBef>
+              <a:buClr>
+                <a:srgbClr val="FF0000"/>
+              </a:buClr>
+              <a:buSzPts val="2000"/>
+            </a:pPr>
+            <a:r>
+              <a:rPr lang="en-US" sz="2000" b="1" dirty="0">
+                <a:solidFill>
+                  <a:srgbClr val="FF0000"/>
+                </a:solidFill>
+              </a:rPr>
+              <a:t>ID and Description</a:t>
+            </a:r>
+            <a:r>
+              <a:rPr lang="en-US" sz="2000" dirty="0"/>
+              <a:t> uniquely identifies the detected network anomaly (as a container of symptoms).</a:t>
+            </a:r>
+            <a:endParaRPr lang="en-US" dirty="0"/>
+          </a:p>
+          <a:p>
+            <a:pPr>
+              <a:buClr>
+                <a:srgbClr val="FF0000"/>
+              </a:buClr>
+              <a:buSzPts val="2000"/>
+            </a:pPr>
+            <a:r>
+              <a:rPr lang="en-US" sz="2000" b="1" dirty="0">
+                <a:solidFill>
+                  <a:srgbClr val="FF0000"/>
+                </a:solidFill>
+              </a:rPr>
+              <a:t>Description and State </a:t>
+            </a:r>
+            <a:r>
+              <a:rPr lang="en-US" sz="2000" dirty="0"/>
+              <a:t>provide general information regarding the anomaly and its current state in the lifecycle. </a:t>
+            </a:r>
+            <a:endParaRPr lang="en-US" dirty="0"/>
+          </a:p>
+          <a:p>
+            <a:pPr>
+              <a:buClr>
+                <a:srgbClr val="FF0000"/>
+              </a:buClr>
+              <a:buSzPts val="2000"/>
+            </a:pPr>
+            <a:r>
+              <a:rPr lang="en-US" sz="2000" b="1" dirty="0">
+                <a:solidFill>
+                  <a:srgbClr val="FF0000"/>
+                </a:solidFill>
+              </a:rPr>
+              <a:t>Annotator </a:t>
+            </a:r>
+            <a:r>
+              <a:rPr lang="en-US" sz="2000" dirty="0"/>
+              <a:t>describes the entity that observed the network anomaly: this can be a human or an algorithm (anomaly detection system). </a:t>
+            </a:r>
+            <a:endParaRPr lang="en-US" dirty="0"/>
+          </a:p>
+          <a:p>
+            <a:pPr>
+              <a:buClr>
+                <a:srgbClr val="FF0000"/>
+              </a:buClr>
+              <a:buSzPts val="2000"/>
+            </a:pPr>
+            <a:r>
+              <a:rPr lang="en-US" sz="2000" b="1" dirty="0">
+                <a:solidFill>
+                  <a:srgbClr val="FF0000"/>
+                </a:solidFill>
+              </a:rPr>
+              <a:t>Symptoms </a:t>
+            </a:r>
+            <a:r>
+              <a:rPr lang="en-US" sz="2000" dirty="0"/>
+              <a:t>provides a list of symptoms that are part of this network anomaly.</a:t>
+            </a:r>
+            <a:endParaRPr lang="en-US" dirty="0"/>
+          </a:p>
+        </p:txBody>
+      </p:sp>
+      <p:sp>
+        <p:nvSpPr>
+          <p:cNvPr id="18" name="Google Shape;228;p9">
+            <a:extLst>
+              <a:ext uri="{FF2B5EF4-FFF2-40B4-BE49-F238E27FC236}">
+                <a16:creationId xmlns:a16="http://schemas.microsoft.com/office/drawing/2014/main" id="{2A1CF3E5-A639-4F23-B857-8061698A6574}"/>
+              </a:ext>
+            </a:extLst>
+          </p:cNvPr>
           <p:cNvSpPr/>
           <p:nvPr/>
         </p:nvSpPr>
         <p:spPr>
           <a:xfrm>
-            <a:off x="1063625" y="2506394"/>
+            <a:off x="1063625" y="3981167"/>
+            <a:ext cx="3038400" cy="416400"/>
+          </a:xfrm>
+          <a:prstGeom prst="rect">
+            <a:avLst/>
+          </a:prstGeom>
+          <a:solidFill>
+            <a:schemeClr val="accent6">
+              <a:alpha val="9803"/>
+            </a:schemeClr>
+          </a:solidFill>
+          <a:ln w="25400" cap="flat" cmpd="sng">
+            <a:solidFill>
+              <a:schemeClr val="accent6"/>
+            </a:solidFill>
+            <a:prstDash val="solid"/>
+            <a:miter lim="800000"/>
+            <a:headEnd type="none" w="sm" len="sm"/>
+            <a:tailEnd type="none" w="sm" len="sm"/>
+          </a:ln>
+        </p:spPr>
+        <p:txBody>
+          <a:bodyPr spcFirstLastPara="1" wrap="square" lIns="91425" tIns="45700" rIns="91425" bIns="45700" anchor="ctr" anchorCtr="0">
+            <a:noAutofit/>
+          </a:bodyPr>
+          <a:lstStyle/>
+          <a:p>
+            <a:pPr marL="0" marR="0" lvl="0" indent="0" algn="ctr" rtl="0">
+              <a:spcBef>
+                <a:spcPts val="0"/>
+              </a:spcBef>
+              <a:spcAft>
+                <a:spcPts val="0"/>
+              </a:spcAft>
+              <a:buNone/>
+            </a:pPr>
+            <a:endParaRPr sz="1800" b="0" i="0" u="none" strike="noStrike" cap="none">
+              <a:solidFill>
+                <a:schemeClr val="lt1"/>
+              </a:solidFill>
+              <a:latin typeface="Calibri"/>
+              <a:ea typeface="Calibri"/>
+              <a:cs typeface="Calibri"/>
+              <a:sym typeface="Calibri"/>
+            </a:endParaRPr>
+          </a:p>
+        </p:txBody>
+      </p:sp>
+      <p:cxnSp>
+        <p:nvCxnSpPr>
+          <p:cNvPr id="19" name="Google Shape;229;p9">
+            <a:extLst>
+              <a:ext uri="{FF2B5EF4-FFF2-40B4-BE49-F238E27FC236}">
+                <a16:creationId xmlns:a16="http://schemas.microsoft.com/office/drawing/2014/main" id="{A2E10AD7-A85A-4568-A2DD-403671F055EA}"/>
+              </a:ext>
+            </a:extLst>
+          </p:cNvPr>
+          <p:cNvCxnSpPr>
+            <a:cxnSpLocks/>
+            <a:stCxn id="18" idx="3"/>
+          </p:cNvCxnSpPr>
+          <p:nvPr/>
+        </p:nvCxnSpPr>
+        <p:spPr>
+          <a:xfrm flipV="1">
+            <a:off x="4102025" y="3037398"/>
+            <a:ext cx="2091300" cy="1151969"/>
+          </a:xfrm>
+          <a:prstGeom prst="straightConnector1">
+            <a:avLst/>
+          </a:prstGeom>
+          <a:noFill/>
+          <a:ln w="25400" cap="flat" cmpd="sng">
+            <a:solidFill>
+              <a:schemeClr val="accent6"/>
+            </a:solidFill>
+            <a:prstDash val="solid"/>
+            <a:miter lim="800000"/>
+            <a:headEnd type="none" w="sm" len="sm"/>
+            <a:tailEnd type="none" w="sm" len="sm"/>
+          </a:ln>
+        </p:spPr>
+      </p:cxnSp>
+      <p:sp>
+        <p:nvSpPr>
+          <p:cNvPr id="20" name="Google Shape;232;p9">
+            <a:extLst>
+              <a:ext uri="{FF2B5EF4-FFF2-40B4-BE49-F238E27FC236}">
+                <a16:creationId xmlns:a16="http://schemas.microsoft.com/office/drawing/2014/main" id="{B28AB3E9-9BBA-4658-9F85-3E9DC4650EAC}"/>
+              </a:ext>
+            </a:extLst>
+          </p:cNvPr>
+          <p:cNvSpPr/>
+          <p:nvPr/>
+        </p:nvSpPr>
+        <p:spPr>
+          <a:xfrm>
+            <a:off x="1063625" y="4677087"/>
             <a:ext cx="3038475" cy="955944"/>
           </a:xfrm>
           <a:prstGeom prst="rect">
@@ -7538,16 +7685,23 @@
       </p:sp>
       <p:cxnSp>
         <p:nvCxnSpPr>
-          <p:cNvPr id="233" name="Google Shape;233;p9"/>
+          <p:cNvPr id="21" name="Google Shape;233;p9">
+            <a:extLst>
+              <a:ext uri="{FF2B5EF4-FFF2-40B4-BE49-F238E27FC236}">
+                <a16:creationId xmlns:a16="http://schemas.microsoft.com/office/drawing/2014/main" id="{4D339B9C-52F3-4624-9E82-F3940FEF2CA2}"/>
+              </a:ext>
+            </a:extLst>
+          </p:cNvPr>
           <p:cNvCxnSpPr>
-            <a:stCxn id="232" idx="3"/>
+            <a:cxnSpLocks/>
+            <a:stCxn id="20" idx="3"/>
           </p:cNvCxnSpPr>
           <p:nvPr/>
         </p:nvCxnSpPr>
         <p:spPr>
-          <a:xfrm>
-            <a:off x="4102100" y="2984366"/>
-            <a:ext cx="1993800" cy="716700"/>
+          <a:xfrm flipV="1">
+            <a:off x="4102100" y="4874150"/>
+            <a:ext cx="2091225" cy="280909"/>
           </a:xfrm>
           <a:prstGeom prst="straightConnector1">
             <a:avLst/>
@@ -7566,13 +7720,19 @@
       </p:cxnSp>
       <p:sp>
         <p:nvSpPr>
-          <p:cNvPr id="234" name="Google Shape;234;p9"/>
+          <p:cNvPr id="22" name="Google Shape;234;p9">
+            <a:extLst>
+              <a:ext uri="{FF2B5EF4-FFF2-40B4-BE49-F238E27FC236}">
+                <a16:creationId xmlns:a16="http://schemas.microsoft.com/office/drawing/2014/main" id="{4A8FBB71-6B90-4FF8-AA47-64DC275D2F7B}"/>
+              </a:ext>
+            </a:extLst>
+          </p:cNvPr>
           <p:cNvSpPr/>
           <p:nvPr/>
         </p:nvSpPr>
         <p:spPr>
           <a:xfrm>
-            <a:off x="1063625" y="3480070"/>
+            <a:off x="1063625" y="5650763"/>
             <a:ext cx="3038475" cy="287068"/>
           </a:xfrm>
           <a:prstGeom prst="rect">
@@ -7622,13 +7782,19 @@
       </p:sp>
       <p:sp>
         <p:nvSpPr>
-          <p:cNvPr id="235" name="Google Shape;235;p9"/>
+          <p:cNvPr id="23" name="Google Shape;235;p9">
+            <a:extLst>
+              <a:ext uri="{FF2B5EF4-FFF2-40B4-BE49-F238E27FC236}">
+                <a16:creationId xmlns:a16="http://schemas.microsoft.com/office/drawing/2014/main" id="{F06A127A-ABB9-4A18-8E08-5C62D1509B7F}"/>
+              </a:ext>
+            </a:extLst>
+          </p:cNvPr>
           <p:cNvSpPr/>
           <p:nvPr/>
         </p:nvSpPr>
         <p:spPr>
           <a:xfrm>
-            <a:off x="1063625" y="2253473"/>
+            <a:off x="1063625" y="4424166"/>
             <a:ext cx="3038400" cy="241200"/>
           </a:xfrm>
           <a:prstGeom prst="rect">
@@ -7678,16 +7844,23 @@
       </p:sp>
       <p:cxnSp>
         <p:nvCxnSpPr>
-          <p:cNvPr id="236" name="Google Shape;236;p9"/>
+          <p:cNvPr id="24" name="Google Shape;236;p9">
+            <a:extLst>
+              <a:ext uri="{FF2B5EF4-FFF2-40B4-BE49-F238E27FC236}">
+                <a16:creationId xmlns:a16="http://schemas.microsoft.com/office/drawing/2014/main" id="{DDA3444A-7D7D-46CB-BC46-0F99E772AE55}"/>
+              </a:ext>
+            </a:extLst>
+          </p:cNvPr>
           <p:cNvCxnSpPr>
-            <a:stCxn id="235" idx="3"/>
+            <a:cxnSpLocks/>
+            <a:stCxn id="23" idx="3"/>
           </p:cNvCxnSpPr>
           <p:nvPr/>
         </p:nvCxnSpPr>
         <p:spPr>
-          <a:xfrm>
-            <a:off x="4102025" y="2374073"/>
-            <a:ext cx="2091300" cy="402600"/>
+          <a:xfrm flipV="1">
+            <a:off x="4102025" y="3981167"/>
+            <a:ext cx="2091300" cy="563599"/>
           </a:xfrm>
           <a:prstGeom prst="straightConnector1">
             <a:avLst/>
@@ -7706,16 +7879,23 @@
       </p:cxnSp>
       <p:cxnSp>
         <p:nvCxnSpPr>
-          <p:cNvPr id="237" name="Google Shape;237;p9"/>
+          <p:cNvPr id="25" name="Google Shape;237;p9">
+            <a:extLst>
+              <a:ext uri="{FF2B5EF4-FFF2-40B4-BE49-F238E27FC236}">
+                <a16:creationId xmlns:a16="http://schemas.microsoft.com/office/drawing/2014/main" id="{9FE29884-CEF5-410B-B1A5-AA4F968E7EFF}"/>
+              </a:ext>
+            </a:extLst>
+          </p:cNvPr>
           <p:cNvCxnSpPr>
-            <a:stCxn id="234" idx="3"/>
+            <a:cxnSpLocks/>
+            <a:stCxn id="22" idx="3"/>
           </p:cNvCxnSpPr>
           <p:nvPr/>
         </p:nvCxnSpPr>
         <p:spPr>
           <a:xfrm>
-            <a:off x="4102100" y="3623604"/>
-            <a:ext cx="2091300" cy="1082100"/>
+            <a:off x="4102100" y="5794297"/>
+            <a:ext cx="2091225" cy="0"/>
           </a:xfrm>
           <a:prstGeom prst="straightConnector1">
             <a:avLst/>
@@ -7732,6 +7912,77 @@
           </a:ln>
         </p:spPr>
       </p:cxnSp>
+      <p:sp>
+        <p:nvSpPr>
+          <p:cNvPr id="26" name="TextBox 25">
+            <a:extLst>
+              <a:ext uri="{FF2B5EF4-FFF2-40B4-BE49-F238E27FC236}">
+                <a16:creationId xmlns:a16="http://schemas.microsoft.com/office/drawing/2014/main" id="{E52C51D8-18F7-4089-8B97-EB843D04BB4C}"/>
+              </a:ext>
+            </a:extLst>
+          </p:cNvPr>
+          <p:cNvSpPr txBox="1"/>
+          <p:nvPr/>
+        </p:nvSpPr>
+        <p:spPr>
+          <a:xfrm>
+            <a:off x="838198" y="1636099"/>
+            <a:ext cx="10301579" cy="1015663"/>
+          </a:xfrm>
+          <a:prstGeom prst="rect">
+            <a:avLst/>
+          </a:prstGeom>
+          <a:noFill/>
+        </p:spPr>
+        <p:txBody>
+          <a:bodyPr wrap="square" rtlCol="0">
+            <a:spAutoFit/>
+          </a:bodyPr>
+          <a:lstStyle/>
+          <a:p>
+            <a:r>
+              <a:rPr lang="en-US" sz="2000" dirty="0"/>
+              <a:t>This draft defines:</a:t>
+            </a:r>
+          </a:p>
+          <a:p>
+            <a:pPr marL="342900" indent="-342900">
+              <a:buFont typeface="Arial" panose="020B0604020202020204" pitchFamily="34" charset="0"/>
+              <a:buChar char="•"/>
+            </a:pPr>
+            <a:r>
+              <a:rPr lang="en-US" sz="2000" dirty="0"/>
+              <a:t>A </a:t>
+            </a:r>
+            <a:r>
+              <a:rPr lang="en-US" sz="2000" b="1" dirty="0"/>
+              <a:t>State machine for network anomalies</a:t>
+            </a:r>
+            <a:r>
+              <a:rPr lang="en-US" sz="2000" dirty="0"/>
+              <a:t> spanning across the whole lifecycle</a:t>
+            </a:r>
+          </a:p>
+          <a:p>
+            <a:pPr marL="342900" indent="-342900">
+              <a:buFont typeface="Arial" panose="020B0604020202020204" pitchFamily="34" charset="0"/>
+              <a:buChar char="•"/>
+            </a:pPr>
+            <a:r>
+              <a:rPr lang="en-US" sz="2000" dirty="0"/>
+              <a:t>A </a:t>
+            </a:r>
+            <a:r>
+              <a:rPr lang="en-US" sz="2000" b="1" dirty="0"/>
+              <a:t>YANG data model</a:t>
+            </a:r>
+            <a:r>
+              <a:rPr lang="en-US" sz="2000" dirty="0"/>
+              <a:t> describing the network anomaly as a collection of symptoms</a:t>
+            </a:r>
+          </a:p>
+        </p:txBody>
+      </p:sp>
     </p:spTree>
   </p:cSld>
   <p:clrMapOvr>
@@ -7984,8 +8235,8 @@
         </p:nvSpPr>
         <p:spPr>
           <a:xfrm>
-            <a:off x="7240555" y="151130"/>
-            <a:ext cx="4674637" cy="6529952"/>
+            <a:off x="7264407" y="983548"/>
+            <a:ext cx="4674637" cy="5688183"/>
           </a:xfrm>
           <a:prstGeom prst="rect">
             <a:avLst/>
@@ -8011,7 +8262,7 @@
               <a:buNone/>
             </a:pPr>
             <a:r>
-              <a:rPr lang="en-US" sz="2000" b="1" dirty="0"/>
+              <a:rPr lang="en-US" b="1" dirty="0"/>
               <a:t>Goals:</a:t>
             </a:r>
           </a:p>
@@ -8034,7 +8285,7 @@
               <a:buChar char="Ø"/>
             </a:pPr>
             <a:r>
-              <a:rPr lang="en-US" sz="2000" dirty="0"/>
+              <a:rPr lang="en-US" dirty="0"/>
               <a:t>Prove that YANG models contain all the necessary information</a:t>
             </a:r>
           </a:p>
@@ -8051,7 +8302,7 @@
               <a:buChar char="Ø"/>
             </a:pPr>
             <a:r>
-              <a:rPr lang="en-US" sz="2000" dirty="0"/>
+              <a:rPr lang="en-US" dirty="0"/>
               <a:t>Validate models across a wide range of use-cases</a:t>
             </a:r>
           </a:p>
@@ -8068,8 +8319,8 @@
               <a:buChar char="Ø"/>
             </a:pPr>
             <a:r>
-              <a:rPr lang="en-US" sz="2000" dirty="0"/>
-              <a:t>Show interoperability between </a:t>
+              <a:rPr lang="en-US" dirty="0"/>
+              <a:t>Show interoperability between stages</a:t>
             </a:r>
           </a:p>
           <a:p>
@@ -8086,10 +8337,10 @@
               <a:buNone/>
             </a:pPr>
             <a:r>
-              <a:rPr lang="en-US" sz="2000" b="1" dirty="0"/>
+              <a:rPr lang="en-US" b="1" dirty="0"/>
               <a:t>Done so far:</a:t>
             </a:r>
-            <a:endParaRPr sz="2000" b="1" dirty="0"/>
+            <a:endParaRPr b="1" dirty="0"/>
           </a:p>
           <a:p>
             <a:pPr marL="285750" lvl="0" indent="-285750">
@@ -8110,10 +8361,18 @@
               <a:buChar char="ü"/>
             </a:pPr>
             <a:r>
-              <a:rPr lang="en-US" sz="2000" dirty="0"/>
-              <a:t>Validation with real operational data (Cloud monitoring)</a:t>
-            </a:r>
-            <a:endParaRPr sz="2000" dirty="0"/>
+              <a:rPr lang="en-US" dirty="0"/>
+              <a:t>Validation with </a:t>
+            </a:r>
+            <a:r>
+              <a:rPr lang="en-US" b="1" dirty="0"/>
+              <a:t>real operational data </a:t>
+            </a:r>
+            <a:r>
+              <a:rPr lang="en-US" dirty="0"/>
+              <a:t>(Cloud monitoring)</a:t>
+            </a:r>
+            <a:endParaRPr dirty="0"/>
           </a:p>
           <a:p>
             <a:pPr marL="285750" lvl="0" indent="-285750">
@@ -8134,10 +8393,18 @@
               <a:buChar char="ü"/>
             </a:pPr>
             <a:r>
-              <a:rPr lang="en-US" sz="2000" dirty="0"/>
-              <a:t>Validation with rule-based Network Anomaly Detector (SAIN RFC9417/RFC9418)</a:t>
-            </a:r>
-            <a:endParaRPr sz="2000" dirty="0"/>
+              <a:rPr lang="en-US" dirty="0"/>
+              <a:t>Validating with rule-based Network Anomaly Detector (</a:t>
+            </a:r>
+            <a:r>
+              <a:rPr lang="en-US" b="1" dirty="0"/>
+              <a:t>SAIN RFC9417/RFC9418</a:t>
+            </a:r>
+            <a:r>
+              <a:rPr lang="en-US" dirty="0"/>
+              <a:t>)</a:t>
+            </a:r>
+            <a:endParaRPr dirty="0"/>
           </a:p>
           <a:p>
             <a:pPr marL="285750" lvl="0" indent="-285750">
@@ -8158,10 +8425,18 @@
               <a:buChar char="ü"/>
             </a:pPr>
             <a:r>
-              <a:rPr lang="en-US" sz="2000" dirty="0"/>
-              <a:t>Validation with a ML-based Network Anomaly Detector (Autoencoder)</a:t>
-            </a:r>
-            <a:endParaRPr sz="2000" dirty="0"/>
+              <a:rPr lang="en-US" dirty="0"/>
+              <a:t>Validation with a </a:t>
+            </a:r>
+            <a:r>
+              <a:rPr lang="en-US" b="1" dirty="0"/>
+              <a:t>ML-based Network Anomaly Detector</a:t>
+            </a:r>
+            <a:r>
+              <a:rPr lang="en-US" dirty="0"/>
+              <a:t> (Autoencoder)</a:t>
+            </a:r>
+            <a:endParaRPr dirty="0"/>
           </a:p>
           <a:p>
             <a:pPr marL="285750" lvl="0" indent="-285750">
@@ -8182,10 +8457,18 @@
               <a:buChar char="ü"/>
             </a:pPr>
             <a:r>
-              <a:rPr lang="en-US" sz="2000" dirty="0"/>
-              <a:t>Add support for Re-training of ML-based models</a:t>
-            </a:r>
-            <a:endParaRPr sz="2000" dirty="0"/>
+              <a:rPr lang="en-US" dirty="0"/>
+              <a:t>Add support for </a:t>
+            </a:r>
+            <a:r>
+              <a:rPr lang="en-US" b="1" dirty="0"/>
+              <a:t>Re-training</a:t>
+            </a:r>
+            <a:r>
+              <a:rPr lang="en-US" dirty="0"/>
+              <a:t> of ML-based models</a:t>
+            </a:r>
+            <a:endParaRPr dirty="0"/>
           </a:p>
           <a:p>
             <a:pPr marL="285750" lvl="0" indent="-285750">
@@ -8206,10 +8489,18 @@
               <a:buChar char="ü"/>
             </a:pPr>
             <a:r>
-              <a:rPr lang="en-US" sz="2000" dirty="0"/>
-              <a:t>Add partial support for Metadata Filtering and search</a:t>
-            </a:r>
-            <a:endParaRPr sz="2000" dirty="0"/>
+              <a:rPr lang="en-US" dirty="0"/>
+              <a:t>Add partial support for </a:t>
+            </a:r>
+            <a:r>
+              <a:rPr lang="en-US" b="1" dirty="0"/>
+              <a:t>Metadata Filtering</a:t>
+            </a:r>
+            <a:r>
+              <a:rPr lang="en-US" dirty="0"/>
+              <a:t> and search</a:t>
+            </a:r>
+            <a:endParaRPr dirty="0"/>
           </a:p>
           <a:p>
             <a:pPr marL="285750" lvl="0" indent="-285750">
@@ -8230,10 +8521,10 @@
               <a:buChar char="ü"/>
             </a:pPr>
             <a:r>
-              <a:rPr lang="en-US" sz="2000" dirty="0"/>
+              <a:rPr lang="en-US" dirty="0"/>
               <a:t>YANG model refinements to reflect the results of the coding</a:t>
             </a:r>
-            <a:endParaRPr sz="2000" dirty="0"/>
+            <a:endParaRPr dirty="0"/>
           </a:p>
           <a:p>
             <a:pPr marL="285750" lvl="0" indent="-285750">
@@ -8254,7 +8545,7 @@
               <a:buChar char="ü"/>
             </a:pPr>
             <a:r>
-              <a:rPr lang="en-US" sz="2000" dirty="0"/>
+              <a:rPr lang="en-US" dirty="0"/>
               <a:t>Automatic dashboard generation</a:t>
             </a:r>
           </a:p>
@@ -8274,8 +8565,8 @@
         </p:nvSpPr>
         <p:spPr>
           <a:xfrm>
-            <a:off x="838200" y="5580167"/>
-            <a:ext cx="6232696" cy="1000274"/>
+            <a:off x="639421" y="5543588"/>
+            <a:ext cx="6232696" cy="1158779"/>
           </a:xfrm>
           <a:prstGeom prst="rect">
             <a:avLst/>
@@ -8297,7 +8588,7 @@
               </a:spcBef>
             </a:pPr>
             <a:r>
-              <a:rPr lang="en-US" sz="2000" b="1" dirty="0">
+              <a:rPr lang="en-US" b="1" dirty="0">
                 <a:solidFill>
                   <a:srgbClr val="FF0000"/>
                 </a:solidFill>
@@ -8321,7 +8612,7 @@
               <a:buChar char="Ø"/>
             </a:pPr>
             <a:r>
-              <a:rPr lang="en-US" sz="2000" dirty="0"/>
+              <a:rPr lang="en-US" dirty="0"/>
               <a:t>Improve scalability</a:t>
             </a:r>
           </a:p>
@@ -8341,14 +8632,69 @@
               <a:buChar char="Ø"/>
             </a:pPr>
             <a:r>
-              <a:rPr lang="en-US" sz="2000" dirty="0"/>
-              <a:t>Validate with Swisscom Data</a:t>
-            </a:r>
-            <a:endParaRPr lang="en-US" sz="2000" dirty="0">
+              <a:rPr lang="en-US" dirty="0"/>
+              <a:t>Refine YANG Models</a:t>
+            </a:r>
+          </a:p>
+          <a:p>
+            <a:pPr marL="285750" indent="-285750">
+              <a:lnSpc>
+                <a:spcPct val="90000"/>
+              </a:lnSpc>
+              <a:spcBef>
+                <a:spcPts val="0"/>
+              </a:spcBef>
+              <a:buClr>
+                <a:schemeClr val="dk2"/>
+              </a:buClr>
+              <a:buSzPts val="1700"/>
+              <a:buFont typeface="Wingdings" panose="05000000000000000000" pitchFamily="2" charset="2"/>
+              <a:buChar char="Ø"/>
+            </a:pPr>
+            <a:r>
+              <a:rPr lang="en-US" dirty="0"/>
+              <a:t>Integrate and Validate with Swisscom Data</a:t>
+            </a:r>
+            <a:endParaRPr lang="en-US" dirty="0">
               <a:solidFill>
                 <a:schemeClr val="dk2"/>
               </a:solidFill>
             </a:endParaRPr>
+          </a:p>
+        </p:txBody>
+      </p:sp>
+      <p:sp>
+        <p:nvSpPr>
+          <p:cNvPr id="2" name="TextBox 1">
+            <a:extLst>
+              <a:ext uri="{FF2B5EF4-FFF2-40B4-BE49-F238E27FC236}">
+                <a16:creationId xmlns:a16="http://schemas.microsoft.com/office/drawing/2014/main" id="{BD015240-88C1-4269-9BA2-2422BA36D9E4}"/>
+              </a:ext>
+            </a:extLst>
+          </p:cNvPr>
+          <p:cNvSpPr txBox="1"/>
+          <p:nvPr/>
+        </p:nvSpPr>
+        <p:spPr>
+          <a:xfrm>
+            <a:off x="2915738" y="3458307"/>
+            <a:ext cx="1230978" cy="369332"/>
+          </a:xfrm>
+          <a:prstGeom prst="rect">
+            <a:avLst/>
+          </a:prstGeom>
+          <a:noFill/>
+        </p:spPr>
+        <p:txBody>
+          <a:bodyPr wrap="none" rtlCol="0">
+            <a:spAutoFit/>
+          </a:bodyPr>
+          <a:lstStyle/>
+          <a:p>
+            <a:r>
+              <a:rPr lang="en-US" dirty="0"/>
+              <a:t>Label Store</a:t>
+            </a:r>
           </a:p>
         </p:txBody>
       </p:sp>
@@ -19443,10 +19789,137 @@
       </p:grpSpPr>
       <p:sp>
         <p:nvSpPr>
-          <p:cNvPr id="17" name="TextBox 16">
+          <p:cNvPr id="11" name="Slide Number Placeholder 1">
             <a:extLst>
               <a:ext uri="{FF2B5EF4-FFF2-40B4-BE49-F238E27FC236}">
-                <a16:creationId xmlns:a16="http://schemas.microsoft.com/office/drawing/2014/main" id="{8F78EE4C-6EFD-4363-A98F-3E5608669DF5}"/>
+                <a16:creationId xmlns:a16="http://schemas.microsoft.com/office/drawing/2014/main" id="{512B43D3-8F19-488A-8D0D-979DD7EC8E7E}"/>
+              </a:ext>
+            </a:extLst>
+          </p:cNvPr>
+          <p:cNvSpPr>
+            <a:spLocks noGrp="1"/>
+          </p:cNvSpPr>
+          <p:nvPr>
+            <p:ph type="sldNum" sz="quarter" idx="12"/>
+          </p:nvPr>
+        </p:nvSpPr>
+        <p:spPr>
+          <a:xfrm>
+            <a:off x="11587892" y="6361637"/>
+            <a:ext cx="414251" cy="365125"/>
+          </a:xfrm>
+        </p:spPr>
+        <p:txBody>
+          <a:bodyPr/>
+          <a:lstStyle/>
+          <a:p>
+            <a:fld id="{FC4AC485-25DE-431E-B345-9C0A15BB7F8A}" type="slidenum">
+              <a:rPr lang="de-CH" sz="1400" smtClean="0"/>
+              <a:t>8</a:t>
+            </a:fld>
+            <a:endParaRPr lang="de-CH" sz="1400" dirty="0"/>
+          </a:p>
+        </p:txBody>
+      </p:sp>
+      <p:sp>
+        <p:nvSpPr>
+          <p:cNvPr id="6" name="Title 1">
+            <a:extLst>
+              <a:ext uri="{FF2B5EF4-FFF2-40B4-BE49-F238E27FC236}">
+                <a16:creationId xmlns:a16="http://schemas.microsoft.com/office/drawing/2014/main" id="{ABB61075-2877-B162-7D8F-97EC17B8DF39}"/>
+              </a:ext>
+            </a:extLst>
+          </p:cNvPr>
+          <p:cNvSpPr>
+            <a:spLocks noGrp="1"/>
+          </p:cNvSpPr>
+          <p:nvPr>
+            <p:ph type="title"/>
+          </p:nvPr>
+        </p:nvSpPr>
+        <p:spPr>
+          <a:xfrm>
+            <a:off x="838200" y="365125"/>
+            <a:ext cx="10515600" cy="1325563"/>
+          </a:xfrm>
+        </p:spPr>
+        <p:txBody>
+          <a:bodyPr>
+            <a:normAutofit/>
+          </a:bodyPr>
+          <a:lstStyle/>
+          <a:p>
+            <a:r>
+              <a:rPr lang="en-US" sz="2800" b="1" dirty="0"/>
+              <a:t>Semantic Metadata Annotation for Network Anomaly Detection</a:t>
+            </a:r>
+            <a:br>
+              <a:rPr lang="en-US" sz="3600" dirty="0"/>
+            </a:br>
+            <a:r>
+              <a:rPr lang="en-US" sz="2700" dirty="0">
+                <a:solidFill>
+                  <a:schemeClr val="bg2">
+                    <a:lumMod val="75000"/>
+                  </a:schemeClr>
+                </a:solidFill>
+              </a:rPr>
+              <a:t>draft-</a:t>
+            </a:r>
+            <a:r>
+              <a:rPr lang="en-US" sz="2700" dirty="0" err="1">
+                <a:solidFill>
+                  <a:schemeClr val="bg2">
+                    <a:lumMod val="75000"/>
+                  </a:schemeClr>
+                </a:solidFill>
+              </a:rPr>
+              <a:t>netana</a:t>
+            </a:r>
+            <a:r>
+              <a:rPr lang="en-US" sz="2700" dirty="0">
+                <a:solidFill>
+                  <a:schemeClr val="bg2">
+                    <a:lumMod val="75000"/>
+                  </a:schemeClr>
+                </a:solidFill>
+              </a:rPr>
+              <a:t>-</a:t>
+            </a:r>
+            <a:r>
+              <a:rPr lang="en-US" sz="2700" dirty="0" err="1">
+                <a:solidFill>
+                  <a:schemeClr val="bg2">
+                    <a:lumMod val="75000"/>
+                  </a:schemeClr>
+                </a:solidFill>
+              </a:rPr>
+              <a:t>nmop</a:t>
+            </a:r>
+            <a:r>
+              <a:rPr lang="en-US" sz="2700" dirty="0">
+                <a:solidFill>
+                  <a:schemeClr val="bg2">
+                    <a:lumMod val="75000"/>
+                  </a:schemeClr>
+                </a:solidFill>
+              </a:rPr>
+              <a:t>-network-anomaly-semantics</a:t>
+            </a:r>
+            <a:endParaRPr lang="en-US" sz="2700" dirty="0">
+              <a:solidFill>
+                <a:srgbClr val="FF0000"/>
+              </a:solidFill>
+            </a:endParaRPr>
+          </a:p>
+        </p:txBody>
+      </p:sp>
+      <p:sp>
+        <p:nvSpPr>
+          <p:cNvPr id="18" name="TextBox 17">
+            <a:extLst>
+              <a:ext uri="{FF2B5EF4-FFF2-40B4-BE49-F238E27FC236}">
+                <a16:creationId xmlns:a16="http://schemas.microsoft.com/office/drawing/2014/main" id="{6D06F6E4-BEAD-4B35-858F-91C350B4A2F6}"/>
               </a:ext>
             </a:extLst>
           </p:cNvPr>
@@ -19455,7 +19928,7 @@
         </p:nvSpPr>
         <p:spPr>
           <a:xfrm>
-            <a:off x="838198" y="1484344"/>
+            <a:off x="838198" y="2199959"/>
             <a:ext cx="4373880" cy="4569264"/>
           </a:xfrm>
           <a:prstGeom prst="rect">
@@ -20668,10 +21141,10 @@
       </p:sp>
       <p:sp>
         <p:nvSpPr>
-          <p:cNvPr id="3" name="Content Placeholder 2">
+          <p:cNvPr id="20" name="Content Placeholder 2">
             <a:extLst>
               <a:ext uri="{FF2B5EF4-FFF2-40B4-BE49-F238E27FC236}">
-                <a16:creationId xmlns:a16="http://schemas.microsoft.com/office/drawing/2014/main" id="{29C0DFD4-432D-4B0C-93DF-790441DCF5B9}"/>
+                <a16:creationId xmlns:a16="http://schemas.microsoft.com/office/drawing/2014/main" id="{734860EF-130F-4634-8547-DE5751008CEF}"/>
               </a:ext>
             </a:extLst>
           </p:cNvPr>
@@ -20684,8 +21157,8 @@
         </p:nvSpPr>
         <p:spPr>
           <a:xfrm>
-            <a:off x="6193410" y="1929384"/>
-            <a:ext cx="5229402" cy="3557849"/>
+            <a:off x="6193410" y="2382612"/>
+            <a:ext cx="5229402" cy="4432253"/>
           </a:xfrm>
         </p:spPr>
         <p:txBody>
@@ -20704,19 +21177,7 @@
             </a:r>
             <a:r>
               <a:rPr lang="en-US" sz="2000" dirty="0"/>
-              <a:t>uniquely identifies the detected anomaly. </a:t>
-            </a:r>
-            <a:r>
-              <a:rPr lang="en-US" sz="2000" b="1" dirty="0">
-                <a:solidFill>
-                  <a:srgbClr val="FF0000"/>
-                </a:solidFill>
-              </a:rPr>
-              <a:t>Event ID, start/end-time and confidence/concern-score </a:t>
-            </a:r>
-            <a:r>
-              <a:rPr lang="en-US" sz="2000" dirty="0"/>
-              <a:t>uniquely identifies the network event with its start and end time, how confident the system identified the anomaly and how concerned an operator should be.</a:t>
+              <a:t>uniquely identifies the detected symptom with its start and end time, how confident the system identified the anomaly and how concerned an operator should be.</a:t>
             </a:r>
             <a:endParaRPr lang="en-US" sz="2000" b="1" dirty="0">
               <a:solidFill>
@@ -20735,7 +21196,7 @@
             </a:r>
             <a:r>
               <a:rPr lang="en-US" sz="2000" dirty="0"/>
-              <a:t>allows to add customer information.</a:t>
+              <a:t>describe the semantic metadata of the symptom).</a:t>
             </a:r>
           </a:p>
           <a:p>
@@ -20763,7 +21224,7 @@
             </a:r>
             <a:r>
               <a:rPr lang="en-US" sz="2000" dirty="0"/>
-              <a:t>describes wherever the anomaly was detected by a human or algorithm and uniquely identifies the system who/which detected.</a:t>
+              <a:t>describes wherever the anomaly was detected by a human or algorithm and uniquely identifies the entity who/which detected.</a:t>
             </a:r>
           </a:p>
           <a:p>
@@ -20773,10 +21234,10 @@
       </p:sp>
       <p:sp>
         <p:nvSpPr>
-          <p:cNvPr id="19" name="Rectangle 18">
+          <p:cNvPr id="21" name="Rectangle 20">
             <a:extLst>
               <a:ext uri="{FF2B5EF4-FFF2-40B4-BE49-F238E27FC236}">
-                <a16:creationId xmlns:a16="http://schemas.microsoft.com/office/drawing/2014/main" id="{B0AC9776-B227-44FD-A2AC-1FDE0B6F1445}"/>
+                <a16:creationId xmlns:a16="http://schemas.microsoft.com/office/drawing/2014/main" id="{94F223BC-A3EC-49EC-9303-5EF3964548DD}"/>
               </a:ext>
             </a:extLst>
           </p:cNvPr>
@@ -20785,7 +21246,7 @@
         </p:nvSpPr>
         <p:spPr>
           <a:xfrm>
-            <a:off x="806550" y="1791478"/>
+            <a:off x="806550" y="2507093"/>
             <a:ext cx="4182687" cy="964841"/>
           </a:xfrm>
           <a:prstGeom prst="rect">
@@ -20829,10 +21290,10 @@
       </p:sp>
       <p:cxnSp>
         <p:nvCxnSpPr>
-          <p:cNvPr id="22" name="Straight Connector 21">
+          <p:cNvPr id="23" name="Straight Connector 22">
             <a:extLst>
               <a:ext uri="{FF2B5EF4-FFF2-40B4-BE49-F238E27FC236}">
-                <a16:creationId xmlns:a16="http://schemas.microsoft.com/office/drawing/2014/main" id="{5EE7A184-4440-4663-A713-45C43FB41FBD}"/>
+                <a16:creationId xmlns:a16="http://schemas.microsoft.com/office/drawing/2014/main" id="{8E96E406-FF4A-4814-9BCE-66D420325A70}"/>
               </a:ext>
             </a:extLst>
           </p:cNvPr>
@@ -20842,9 +21303,9 @@
           <p:nvPr/>
         </p:nvCxnSpPr>
         <p:spPr>
-          <a:xfrm>
-            <a:off x="4989235" y="2028576"/>
-            <a:ext cx="1204175" cy="64175"/>
+          <a:xfrm flipV="1">
+            <a:off x="4989235" y="2593825"/>
+            <a:ext cx="1245680" cy="150366"/>
           </a:xfrm>
           <a:prstGeom prst="line">
             <a:avLst/>
@@ -20872,137 +21333,10 @@
       </p:cxnSp>
       <p:sp>
         <p:nvSpPr>
-          <p:cNvPr id="11" name="Slide Number Placeholder 1">
+          <p:cNvPr id="28" name="Rectangle 27">
             <a:extLst>
               <a:ext uri="{FF2B5EF4-FFF2-40B4-BE49-F238E27FC236}">
-                <a16:creationId xmlns:a16="http://schemas.microsoft.com/office/drawing/2014/main" id="{512B43D3-8F19-488A-8D0D-979DD7EC8E7E}"/>
-              </a:ext>
-            </a:extLst>
-          </p:cNvPr>
-          <p:cNvSpPr>
-            <a:spLocks noGrp="1"/>
-          </p:cNvSpPr>
-          <p:nvPr>
-            <p:ph type="sldNum" sz="quarter" idx="12"/>
-          </p:nvPr>
-        </p:nvSpPr>
-        <p:spPr>
-          <a:xfrm>
-            <a:off x="11587892" y="6361637"/>
-            <a:ext cx="414251" cy="365125"/>
-          </a:xfrm>
-        </p:spPr>
-        <p:txBody>
-          <a:bodyPr/>
-          <a:lstStyle/>
-          <a:p>
-            <a:fld id="{FC4AC485-25DE-431E-B345-9C0A15BB7F8A}" type="slidenum">
-              <a:rPr lang="de-CH" sz="1400" smtClean="0"/>
-              <a:t>8</a:t>
-            </a:fld>
-            <a:endParaRPr lang="de-CH" sz="1400" dirty="0"/>
-          </a:p>
-        </p:txBody>
-      </p:sp>
-      <p:sp>
-        <p:nvSpPr>
-          <p:cNvPr id="6" name="Title 1">
-            <a:extLst>
-              <a:ext uri="{FF2B5EF4-FFF2-40B4-BE49-F238E27FC236}">
-                <a16:creationId xmlns:a16="http://schemas.microsoft.com/office/drawing/2014/main" id="{ABB61075-2877-B162-7D8F-97EC17B8DF39}"/>
-              </a:ext>
-            </a:extLst>
-          </p:cNvPr>
-          <p:cNvSpPr>
-            <a:spLocks noGrp="1"/>
-          </p:cNvSpPr>
-          <p:nvPr>
-            <p:ph type="title"/>
-          </p:nvPr>
-        </p:nvSpPr>
-        <p:spPr>
-          <a:xfrm>
-            <a:off x="838200" y="365125"/>
-            <a:ext cx="10515600" cy="1325563"/>
-          </a:xfrm>
-        </p:spPr>
-        <p:txBody>
-          <a:bodyPr>
-            <a:normAutofit/>
-          </a:bodyPr>
-          <a:lstStyle/>
-          <a:p>
-            <a:r>
-              <a:rPr lang="en-US" sz="2800" b="1" dirty="0"/>
-              <a:t>Semantic Metadata Annotation for Network Anomaly Detection</a:t>
-            </a:r>
-            <a:br>
-              <a:rPr lang="en-US" sz="3600" dirty="0"/>
-            </a:br>
-            <a:r>
-              <a:rPr lang="en-US" sz="2700" dirty="0">
-                <a:solidFill>
-                  <a:schemeClr val="bg2">
-                    <a:lumMod val="75000"/>
-                  </a:schemeClr>
-                </a:solidFill>
-              </a:rPr>
-              <a:t>draft-</a:t>
-            </a:r>
-            <a:r>
-              <a:rPr lang="en-US" sz="2700" dirty="0" err="1">
-                <a:solidFill>
-                  <a:schemeClr val="bg2">
-                    <a:lumMod val="75000"/>
-                  </a:schemeClr>
-                </a:solidFill>
-              </a:rPr>
-              <a:t>netana</a:t>
-            </a:r>
-            <a:r>
-              <a:rPr lang="en-US" sz="2700" dirty="0">
-                <a:solidFill>
-                  <a:schemeClr val="bg2">
-                    <a:lumMod val="75000"/>
-                  </a:schemeClr>
-                </a:solidFill>
-              </a:rPr>
-              <a:t>-</a:t>
-            </a:r>
-            <a:r>
-              <a:rPr lang="en-US" sz="2700" dirty="0" err="1">
-                <a:solidFill>
-                  <a:schemeClr val="bg2">
-                    <a:lumMod val="75000"/>
-                  </a:schemeClr>
-                </a:solidFill>
-              </a:rPr>
-              <a:t>nmop</a:t>
-            </a:r>
-            <a:r>
-              <a:rPr lang="en-US" sz="2700" dirty="0">
-                <a:solidFill>
-                  <a:schemeClr val="bg2">
-                    <a:lumMod val="75000"/>
-                  </a:schemeClr>
-                </a:solidFill>
-              </a:rPr>
-              <a:t>-network-anomaly-semantics</a:t>
-            </a:r>
-            <a:endParaRPr lang="en-US" sz="2700" dirty="0">
-              <a:solidFill>
-                <a:srgbClr val="FF0000"/>
-              </a:solidFill>
-            </a:endParaRPr>
-          </a:p>
-        </p:txBody>
-      </p:sp>
-      <p:sp>
-        <p:nvSpPr>
-          <p:cNvPr id="7" name="Rectangle 6">
-            <a:extLst>
-              <a:ext uri="{FF2B5EF4-FFF2-40B4-BE49-F238E27FC236}">
-                <a16:creationId xmlns:a16="http://schemas.microsoft.com/office/drawing/2014/main" id="{E751AA3A-A181-4E76-CC75-041686EB2C20}"/>
+                <a16:creationId xmlns:a16="http://schemas.microsoft.com/office/drawing/2014/main" id="{2DF76968-148D-48A3-85C7-C035A3377771}"/>
               </a:ext>
             </a:extLst>
           </p:cNvPr>
@@ -21011,7 +21345,7 @@
         </p:nvSpPr>
         <p:spPr>
           <a:xfrm>
-            <a:off x="806548" y="2756320"/>
+            <a:off x="806548" y="3471935"/>
             <a:ext cx="4182687" cy="455649"/>
           </a:xfrm>
           <a:prstGeom prst="rect">
@@ -21055,10 +21389,10 @@
       </p:sp>
       <p:cxnSp>
         <p:nvCxnSpPr>
-          <p:cNvPr id="13" name="Straight Connector 12">
+          <p:cNvPr id="29" name="Straight Connector 28">
             <a:extLst>
               <a:ext uri="{FF2B5EF4-FFF2-40B4-BE49-F238E27FC236}">
-                <a16:creationId xmlns:a16="http://schemas.microsoft.com/office/drawing/2014/main" id="{ABDEEB90-F9DE-4579-466A-4391823DABF7}"/>
+                <a16:creationId xmlns:a16="http://schemas.microsoft.com/office/drawing/2014/main" id="{88DF5D71-99F5-420F-BB04-8682B3D5E10D}"/>
               </a:ext>
             </a:extLst>
           </p:cNvPr>
@@ -21069,8 +21403,8 @@
         </p:nvCxnSpPr>
         <p:spPr>
           <a:xfrm>
-            <a:off x="5030740" y="2970860"/>
-            <a:ext cx="1204175" cy="1199924"/>
+            <a:off x="5030740" y="3686475"/>
+            <a:ext cx="1162670" cy="392542"/>
           </a:xfrm>
           <a:prstGeom prst="line">
             <a:avLst/>
@@ -21098,10 +21432,10 @@
       </p:cxnSp>
       <p:sp>
         <p:nvSpPr>
-          <p:cNvPr id="24" name="Rectangle 23">
+          <p:cNvPr id="30" name="Rectangle 29">
             <a:extLst>
               <a:ext uri="{FF2B5EF4-FFF2-40B4-BE49-F238E27FC236}">
-                <a16:creationId xmlns:a16="http://schemas.microsoft.com/office/drawing/2014/main" id="{1F53FB5C-08C3-503A-DD3F-DC336AED5134}"/>
+                <a16:creationId xmlns:a16="http://schemas.microsoft.com/office/drawing/2014/main" id="{09EC2BAD-49B4-4E79-84D5-60ED49428D0D}"/>
               </a:ext>
             </a:extLst>
           </p:cNvPr>
@@ -21110,7 +21444,7 @@
         </p:nvSpPr>
         <p:spPr>
           <a:xfrm>
-            <a:off x="806547" y="3211970"/>
+            <a:off x="806547" y="3927585"/>
             <a:ext cx="4182687" cy="1756218"/>
           </a:xfrm>
           <a:prstGeom prst="rect">
@@ -21154,10 +21488,10 @@
       </p:sp>
       <p:sp>
         <p:nvSpPr>
-          <p:cNvPr id="25" name="Rectangle 24">
+          <p:cNvPr id="31" name="Rectangle 30">
             <a:extLst>
               <a:ext uri="{FF2B5EF4-FFF2-40B4-BE49-F238E27FC236}">
-                <a16:creationId xmlns:a16="http://schemas.microsoft.com/office/drawing/2014/main" id="{69934E68-7859-6F55-01F2-D3CD39C036AD}"/>
+                <a16:creationId xmlns:a16="http://schemas.microsoft.com/office/drawing/2014/main" id="{30177438-6B40-4820-86B5-F00996C9E2A7}"/>
               </a:ext>
             </a:extLst>
           </p:cNvPr>
@@ -21166,7 +21500,7 @@
         </p:nvSpPr>
         <p:spPr>
           <a:xfrm>
-            <a:off x="814800" y="4963594"/>
+            <a:off x="814800" y="5679209"/>
             <a:ext cx="4182687" cy="1007441"/>
           </a:xfrm>
           <a:prstGeom prst="rect">
@@ -21210,23 +21544,23 @@
       </p:sp>
       <p:cxnSp>
         <p:nvCxnSpPr>
-          <p:cNvPr id="26" name="Straight Connector 25">
+          <p:cNvPr id="32" name="Straight Connector 31">
             <a:extLst>
               <a:ext uri="{FF2B5EF4-FFF2-40B4-BE49-F238E27FC236}">
-                <a16:creationId xmlns:a16="http://schemas.microsoft.com/office/drawing/2014/main" id="{26AA4EF1-0515-5E5A-5D45-BE133079F190}"/>
+                <a16:creationId xmlns:a16="http://schemas.microsoft.com/office/drawing/2014/main" id="{328E5F41-4899-4B93-9D4E-817EDB21435F}"/>
               </a:ext>
             </a:extLst>
           </p:cNvPr>
           <p:cNvCxnSpPr>
             <a:cxnSpLocks/>
-            <a:stCxn id="25" idx="3"/>
+            <a:stCxn id="31" idx="3"/>
           </p:cNvCxnSpPr>
           <p:nvPr/>
         </p:nvCxnSpPr>
         <p:spPr>
           <a:xfrm flipV="1">
-            <a:off x="4997487" y="5212260"/>
-            <a:ext cx="1237428" cy="255055"/>
+            <a:off x="4997487" y="5446643"/>
+            <a:ext cx="1195923" cy="736287"/>
           </a:xfrm>
           <a:prstGeom prst="line">
             <a:avLst/>
@@ -21254,23 +21588,23 @@
       </p:cxnSp>
       <p:cxnSp>
         <p:nvCxnSpPr>
-          <p:cNvPr id="27" name="Straight Connector 26">
+          <p:cNvPr id="33" name="Straight Connector 32">
             <a:extLst>
               <a:ext uri="{FF2B5EF4-FFF2-40B4-BE49-F238E27FC236}">
-                <a16:creationId xmlns:a16="http://schemas.microsoft.com/office/drawing/2014/main" id="{D1F71D91-0AD5-1DD4-6BC3-A469C348859D}"/>
+                <a16:creationId xmlns:a16="http://schemas.microsoft.com/office/drawing/2014/main" id="{9BA352CC-FAF8-418D-9042-904B161FDE84}"/>
               </a:ext>
             </a:extLst>
           </p:cNvPr>
           <p:cNvCxnSpPr>
             <a:cxnSpLocks/>
-            <a:stCxn id="24" idx="3"/>
+            <a:stCxn id="30" idx="3"/>
           </p:cNvCxnSpPr>
           <p:nvPr/>
         </p:nvCxnSpPr>
         <p:spPr>
           <a:xfrm>
-            <a:off x="4989234" y="4090079"/>
-            <a:ext cx="1245681" cy="471452"/>
+            <a:off x="4989234" y="4805694"/>
+            <a:ext cx="1204176" cy="0"/>
           </a:xfrm>
           <a:prstGeom prst="line">
             <a:avLst/>
@@ -21296,10 +21630,74 @@
           </a:fontRef>
         </p:style>
       </p:cxnSp>
+      <p:sp>
+        <p:nvSpPr>
+          <p:cNvPr id="15" name="Google Shape;221;p8">
+            <a:extLst>
+              <a:ext uri="{FF2B5EF4-FFF2-40B4-BE49-F238E27FC236}">
+                <a16:creationId xmlns:a16="http://schemas.microsoft.com/office/drawing/2014/main" id="{C06320DA-0631-416D-8F25-4A1182C54770}"/>
+              </a:ext>
+            </a:extLst>
+          </p:cNvPr>
+          <p:cNvSpPr txBox="1"/>
+          <p:nvPr/>
+        </p:nvSpPr>
+        <p:spPr>
+          <a:xfrm>
+            <a:off x="127822" y="1541463"/>
+            <a:ext cx="11906864" cy="461635"/>
+          </a:xfrm>
+          <a:prstGeom prst="rect">
+            <a:avLst/>
+          </a:prstGeom>
+          <a:solidFill>
+            <a:schemeClr val="lt2"/>
+          </a:solidFill>
+          <a:ln>
+            <a:noFill/>
+          </a:ln>
+        </p:spPr>
+        <p:txBody>
+          <a:bodyPr spcFirstLastPara="1" wrap="square" lIns="9144" tIns="91425" rIns="9144" bIns="91425" anchor="t" anchorCtr="0">
+            <a:spAutoFit/>
+          </a:bodyPr>
+          <a:lstStyle/>
+          <a:p>
+            <a:pPr marL="0" lvl="0" indent="0" algn="ctr" rtl="0">
+              <a:spcBef>
+                <a:spcPts val="0"/>
+              </a:spcBef>
+              <a:spcAft>
+                <a:spcPts val="0"/>
+              </a:spcAft>
+              <a:buNone/>
+            </a:pPr>
+            <a:r>
+              <a:rPr lang="en-US" b="1" dirty="0">
+                <a:solidFill>
+                  <a:schemeClr val="dk1"/>
+                </a:solidFill>
+                <a:ea typeface="Calibri"/>
+                <a:cs typeface="Calibri"/>
+                <a:sym typeface="Calibri"/>
+              </a:rPr>
+              <a:t>Goal: Enable the exchange of labelled dataset for network anomaly detection between operators, vendors and academia</a:t>
+            </a:r>
+            <a:endParaRPr b="1" dirty="0">
+              <a:solidFill>
+                <a:schemeClr val="dk1"/>
+              </a:solidFill>
+              <a:ea typeface="Calibri"/>
+              <a:cs typeface="Calibri"/>
+              <a:sym typeface="Calibri"/>
+            </a:endParaRPr>
+          </a:p>
+        </p:txBody>
+      </p:sp>
     </p:spTree>
     <p:extLst>
       <p:ext uri="{BB962C8B-B14F-4D97-AF65-F5344CB8AC3E}">
-        <p14:creationId xmlns:p14="http://schemas.microsoft.com/office/powerpoint/2010/main" val="540899312"/>
+        <p14:creationId xmlns:p14="http://schemas.microsoft.com/office/powerpoint/2010/main" val="1338224484"/>
       </p:ext>
     </p:extLst>
   </p:cSld>
@@ -21569,7 +21967,7 @@
         <p:spPr>
           <a:xfrm>
             <a:off x="7556501" y="609600"/>
-            <a:ext cx="4191000" cy="4415201"/>
+            <a:ext cx="4191000" cy="6117162"/>
           </a:xfrm>
           <a:prstGeom prst="rect">
             <a:avLst/>

</xml_diff>